<commit_message>
project 1, presentatie 1. 221004
</commit_message>
<xml_diff>
--- a/simpylc/presentatie project 1/Presentatie project 1.pptx
+++ b/simpylc/presentatie project 1/Presentatie project 1.pptx
@@ -8,9 +8,13 @@
     <p:sldId id="256" r:id="rId2"/>
     <p:sldId id="258" r:id="rId3"/>
     <p:sldId id="257" r:id="rId4"/>
-    <p:sldId id="263" r:id="rId5"/>
+    <p:sldId id="265" r:id="rId5"/>
     <p:sldId id="260" r:id="rId6"/>
-    <p:sldId id="262" r:id="rId7"/>
+    <p:sldId id="264" r:id="rId7"/>
+    <p:sldId id="266" r:id="rId8"/>
+    <p:sldId id="267" r:id="rId9"/>
+    <p:sldId id="263" r:id="rId10"/>
+    <p:sldId id="262" r:id="rId11"/>
   </p:sldIdLst>
   <p:sldSz cx="12192000" cy="6858000"/>
   <p:notesSz cx="6858000" cy="9144000"/>
@@ -3380,6 +3384,1374 @@
 </p:sld>
 </file>
 
+<file path=ppt/slides/slide10.xml><?xml version="1.0" encoding="utf-8"?>
+<p:sld xmlns:a="http://schemas.openxmlformats.org/drawingml/2006/main" xmlns:r="http://schemas.openxmlformats.org/officeDocument/2006/relationships" xmlns:p="http://schemas.openxmlformats.org/presentationml/2006/main">
+  <p:cSld>
+    <p:spTree>
+      <p:nvGrpSpPr>
+        <p:cNvPr id="1" name=""/>
+        <p:cNvGrpSpPr/>
+        <p:nvPr/>
+      </p:nvGrpSpPr>
+      <p:grpSpPr>
+        <a:xfrm>
+          <a:off x="0" y="0"/>
+          <a:ext cx="0" cy="0"/>
+          <a:chOff x="0" y="0"/>
+          <a:chExt cx="0" cy="0"/>
+        </a:xfrm>
+      </p:grpSpPr>
+      <p:sp>
+        <p:nvSpPr>
+          <p:cNvPr id="3" name="Stroomdiagram: Proces 2">
+            <a:extLst>
+              <a:ext uri="{FF2B5EF4-FFF2-40B4-BE49-F238E27FC236}">
+                <a16:creationId xmlns:a16="http://schemas.microsoft.com/office/drawing/2014/main" id="{D4BE89FB-D05C-4906-AB89-73A6F2A0FACF}"/>
+              </a:ext>
+            </a:extLst>
+          </p:cNvPr>
+          <p:cNvSpPr/>
+          <p:nvPr/>
+        </p:nvSpPr>
+        <p:spPr>
+          <a:xfrm>
+            <a:off x="3245046" y="332852"/>
+            <a:ext cx="2006600" cy="977900"/>
+          </a:xfrm>
+          <a:prstGeom prst="flowChartProcess">
+            <a:avLst/>
+          </a:prstGeom>
+        </p:spPr>
+        <p:style>
+          <a:lnRef idx="2">
+            <a:schemeClr val="accent6"/>
+          </a:lnRef>
+          <a:fillRef idx="1">
+            <a:schemeClr val="lt1"/>
+          </a:fillRef>
+          <a:effectRef idx="0">
+            <a:schemeClr val="accent6"/>
+          </a:effectRef>
+          <a:fontRef idx="minor">
+            <a:schemeClr val="dk1"/>
+          </a:fontRef>
+        </p:style>
+        <p:txBody>
+          <a:bodyPr rtlCol="0" anchor="ctr"/>
+          <a:lstStyle/>
+          <a:p>
+            <a:pPr algn="ctr"/>
+            <a:r>
+              <a:rPr lang="nl-NL" dirty="0"/>
+              <a:t>Reken met nieuwe gewichtsfactoren</a:t>
+            </a:r>
+          </a:p>
+        </p:txBody>
+      </p:sp>
+      <p:sp>
+        <p:nvSpPr>
+          <p:cNvPr id="4" name="Stroomdiagram: Beslissing 3">
+            <a:extLst>
+              <a:ext uri="{FF2B5EF4-FFF2-40B4-BE49-F238E27FC236}">
+                <a16:creationId xmlns:a16="http://schemas.microsoft.com/office/drawing/2014/main" id="{8A5504F3-D4BC-4D10-A052-B9619A4DA4E9}"/>
+              </a:ext>
+            </a:extLst>
+          </p:cNvPr>
+          <p:cNvSpPr/>
+          <p:nvPr/>
+        </p:nvSpPr>
+        <p:spPr>
+          <a:xfrm>
+            <a:off x="4198063" y="5025062"/>
+            <a:ext cx="2286000" cy="1714500"/>
+          </a:xfrm>
+          <a:prstGeom prst="flowChartDecision">
+            <a:avLst/>
+          </a:prstGeom>
+        </p:spPr>
+        <p:style>
+          <a:lnRef idx="2">
+            <a:schemeClr val="accent6"/>
+          </a:lnRef>
+          <a:fillRef idx="1">
+            <a:schemeClr val="lt1"/>
+          </a:fillRef>
+          <a:effectRef idx="0">
+            <a:schemeClr val="accent6"/>
+          </a:effectRef>
+          <a:fontRef idx="minor">
+            <a:schemeClr val="dk1"/>
+          </a:fontRef>
+        </p:style>
+        <p:txBody>
+          <a:bodyPr rtlCol="0" anchor="ctr"/>
+          <a:lstStyle/>
+          <a:p>
+            <a:pPr algn="ctr"/>
+            <a:r>
+              <a:rPr lang="nl-NL" dirty="0"/>
+              <a:t>Beter resultaat?</a:t>
+            </a:r>
+          </a:p>
+        </p:txBody>
+      </p:sp>
+      <p:cxnSp>
+        <p:nvCxnSpPr>
+          <p:cNvPr id="6" name="Rechte verbindingslijn met pijl 5">
+            <a:extLst>
+              <a:ext uri="{FF2B5EF4-FFF2-40B4-BE49-F238E27FC236}">
+                <a16:creationId xmlns:a16="http://schemas.microsoft.com/office/drawing/2014/main" id="{EBC96097-8CDA-4746-AD09-E0ECFA522A49}"/>
+              </a:ext>
+            </a:extLst>
+          </p:cNvPr>
+          <p:cNvCxnSpPr>
+            <a:cxnSpLocks/>
+            <a:stCxn id="4" idx="3"/>
+            <a:endCxn id="17" idx="1"/>
+          </p:cNvCxnSpPr>
+          <p:nvPr/>
+        </p:nvCxnSpPr>
+        <p:spPr>
+          <a:xfrm flipV="1">
+            <a:off x="6484063" y="5808690"/>
+            <a:ext cx="2024567" cy="73622"/>
+          </a:xfrm>
+          <a:prstGeom prst="straightConnector1">
+            <a:avLst/>
+          </a:prstGeom>
+          <a:ln w="63500">
+            <a:tailEnd type="triangle"/>
+          </a:ln>
+        </p:spPr>
+        <p:style>
+          <a:lnRef idx="1">
+            <a:schemeClr val="accent1"/>
+          </a:lnRef>
+          <a:fillRef idx="0">
+            <a:schemeClr val="accent1"/>
+          </a:fillRef>
+          <a:effectRef idx="0">
+            <a:schemeClr val="accent1"/>
+          </a:effectRef>
+          <a:fontRef idx="minor">
+            <a:schemeClr val="tx1"/>
+          </a:fontRef>
+        </p:style>
+      </p:cxnSp>
+      <p:cxnSp>
+        <p:nvCxnSpPr>
+          <p:cNvPr id="7" name="Rechte verbindingslijn met pijl 6">
+            <a:extLst>
+              <a:ext uri="{FF2B5EF4-FFF2-40B4-BE49-F238E27FC236}">
+                <a16:creationId xmlns:a16="http://schemas.microsoft.com/office/drawing/2014/main" id="{60A25F6A-6C9C-4000-8A18-2C3D06FDF50E}"/>
+              </a:ext>
+            </a:extLst>
+          </p:cNvPr>
+          <p:cNvCxnSpPr>
+            <a:cxnSpLocks/>
+            <a:stCxn id="4" idx="1"/>
+            <a:endCxn id="16" idx="3"/>
+          </p:cNvCxnSpPr>
+          <p:nvPr/>
+        </p:nvCxnSpPr>
+        <p:spPr>
+          <a:xfrm flipH="1">
+            <a:off x="3731777" y="5882312"/>
+            <a:ext cx="466286" cy="215634"/>
+          </a:xfrm>
+          <a:prstGeom prst="straightConnector1">
+            <a:avLst/>
+          </a:prstGeom>
+          <a:ln w="63500">
+            <a:tailEnd type="triangle"/>
+          </a:ln>
+        </p:spPr>
+        <p:style>
+          <a:lnRef idx="1">
+            <a:schemeClr val="accent1"/>
+          </a:lnRef>
+          <a:fillRef idx="0">
+            <a:schemeClr val="accent1"/>
+          </a:fillRef>
+          <a:effectRef idx="0">
+            <a:schemeClr val="accent1"/>
+          </a:effectRef>
+          <a:fontRef idx="minor">
+            <a:schemeClr val="tx1"/>
+          </a:fontRef>
+        </p:style>
+      </p:cxnSp>
+      <p:sp>
+        <p:nvSpPr>
+          <p:cNvPr id="10" name="Tekstvak 9">
+            <a:extLst>
+              <a:ext uri="{FF2B5EF4-FFF2-40B4-BE49-F238E27FC236}">
+                <a16:creationId xmlns:a16="http://schemas.microsoft.com/office/drawing/2014/main" id="{1C7D93DE-AF49-4C83-87B9-0347E7AB12B7}"/>
+              </a:ext>
+            </a:extLst>
+          </p:cNvPr>
+          <p:cNvSpPr txBox="1"/>
+          <p:nvPr/>
+        </p:nvSpPr>
+        <p:spPr>
+          <a:xfrm>
+            <a:off x="7396322" y="5142668"/>
+            <a:ext cx="482600" cy="369331"/>
+          </a:xfrm>
+          <a:prstGeom prst="rect">
+            <a:avLst/>
+          </a:prstGeom>
+          <a:noFill/>
+        </p:spPr>
+        <p:txBody>
+          <a:bodyPr wrap="square" rtlCol="0">
+            <a:spAutoFit/>
+          </a:bodyPr>
+          <a:lstStyle/>
+          <a:p>
+            <a:r>
+              <a:rPr lang="nl-NL" dirty="0"/>
+              <a:t>ja</a:t>
+            </a:r>
+          </a:p>
+        </p:txBody>
+      </p:sp>
+      <p:sp>
+        <p:nvSpPr>
+          <p:cNvPr id="11" name="Tekstvak 10">
+            <a:extLst>
+              <a:ext uri="{FF2B5EF4-FFF2-40B4-BE49-F238E27FC236}">
+                <a16:creationId xmlns:a16="http://schemas.microsoft.com/office/drawing/2014/main" id="{24BF1C36-AAC4-4746-A44B-7C7CD57863FB}"/>
+              </a:ext>
+            </a:extLst>
+          </p:cNvPr>
+          <p:cNvSpPr txBox="1"/>
+          <p:nvPr/>
+        </p:nvSpPr>
+        <p:spPr>
+          <a:xfrm>
+            <a:off x="3301565" y="5007896"/>
+            <a:ext cx="860425" cy="369329"/>
+          </a:xfrm>
+          <a:prstGeom prst="rect">
+            <a:avLst/>
+          </a:prstGeom>
+          <a:noFill/>
+        </p:spPr>
+        <p:txBody>
+          <a:bodyPr wrap="square" rtlCol="0">
+            <a:spAutoFit/>
+          </a:bodyPr>
+          <a:lstStyle/>
+          <a:p>
+            <a:r>
+              <a:rPr lang="nl-NL" dirty="0"/>
+              <a:t>nee</a:t>
+            </a:r>
+          </a:p>
+        </p:txBody>
+      </p:sp>
+      <p:sp>
+        <p:nvSpPr>
+          <p:cNvPr id="12" name="Stroomdiagram: Gegevens 11">
+            <a:extLst>
+              <a:ext uri="{FF2B5EF4-FFF2-40B4-BE49-F238E27FC236}">
+                <a16:creationId xmlns:a16="http://schemas.microsoft.com/office/drawing/2014/main" id="{9C281F35-D601-44A1-BAC2-7FA90105636A}"/>
+              </a:ext>
+            </a:extLst>
+          </p:cNvPr>
+          <p:cNvSpPr/>
+          <p:nvPr/>
+        </p:nvSpPr>
+        <p:spPr>
+          <a:xfrm>
+            <a:off x="1635760" y="1902913"/>
+            <a:ext cx="2006600" cy="1628764"/>
+          </a:xfrm>
+          <a:prstGeom prst="flowChartInputOutput">
+            <a:avLst/>
+          </a:prstGeom>
+          <a:solidFill>
+            <a:schemeClr val="bg1"/>
+          </a:solidFill>
+        </p:spPr>
+        <p:style>
+          <a:lnRef idx="2">
+            <a:schemeClr val="accent1">
+              <a:shade val="50000"/>
+            </a:schemeClr>
+          </a:lnRef>
+          <a:fillRef idx="1">
+            <a:schemeClr val="accent1"/>
+          </a:fillRef>
+          <a:effectRef idx="0">
+            <a:schemeClr val="accent1"/>
+          </a:effectRef>
+          <a:fontRef idx="minor">
+            <a:schemeClr val="lt1"/>
+          </a:fontRef>
+        </p:style>
+        <p:txBody>
+          <a:bodyPr rtlCol="0" anchor="ctr"/>
+          <a:lstStyle/>
+          <a:p>
+            <a:pPr algn="ctr"/>
+            <a:r>
+              <a:rPr lang="nl-NL" dirty="0">
+                <a:solidFill>
+                  <a:schemeClr val="tx1"/>
+                </a:solidFill>
+              </a:rPr>
+              <a:t>Berekende </a:t>
+            </a:r>
+          </a:p>
+          <a:p>
+            <a:pPr algn="ctr"/>
+            <a:r>
+              <a:rPr lang="nl-NL" dirty="0">
+                <a:solidFill>
+                  <a:schemeClr val="tx1"/>
+                </a:solidFill>
+              </a:rPr>
+              <a:t>stuurhoek</a:t>
+            </a:r>
+          </a:p>
+        </p:txBody>
+      </p:sp>
+      <p:sp>
+        <p:nvSpPr>
+          <p:cNvPr id="13" name="Stroomdiagram: Gegevens 12">
+            <a:extLst>
+              <a:ext uri="{FF2B5EF4-FFF2-40B4-BE49-F238E27FC236}">
+                <a16:creationId xmlns:a16="http://schemas.microsoft.com/office/drawing/2014/main" id="{2D1793F6-D3F9-4D8F-B10E-3F5649D67E7C}"/>
+              </a:ext>
+            </a:extLst>
+          </p:cNvPr>
+          <p:cNvSpPr/>
+          <p:nvPr/>
+        </p:nvSpPr>
+        <p:spPr>
+          <a:xfrm>
+            <a:off x="9114616" y="2606664"/>
+            <a:ext cx="2006600" cy="1628764"/>
+          </a:xfrm>
+          <a:prstGeom prst="flowChartInputOutput">
+            <a:avLst/>
+          </a:prstGeom>
+          <a:solidFill>
+            <a:schemeClr val="bg1"/>
+          </a:solidFill>
+        </p:spPr>
+        <p:style>
+          <a:lnRef idx="2">
+            <a:schemeClr val="accent1">
+              <a:shade val="50000"/>
+            </a:schemeClr>
+          </a:lnRef>
+          <a:fillRef idx="1">
+            <a:schemeClr val="accent1"/>
+          </a:fillRef>
+          <a:effectRef idx="0">
+            <a:schemeClr val="accent1"/>
+          </a:effectRef>
+          <a:fontRef idx="minor">
+            <a:schemeClr val="lt1"/>
+          </a:fontRef>
+        </p:style>
+        <p:txBody>
+          <a:bodyPr rtlCol="0" anchor="ctr"/>
+          <a:lstStyle/>
+          <a:p>
+            <a:pPr algn="ctr"/>
+            <a:r>
+              <a:rPr lang="nl-NL" dirty="0">
+                <a:solidFill>
+                  <a:schemeClr val="tx1"/>
+                </a:solidFill>
+              </a:rPr>
+              <a:t>Stuurhoek</a:t>
+            </a:r>
+          </a:p>
+          <a:p>
+            <a:pPr algn="ctr"/>
+            <a:r>
+              <a:rPr lang="nl-NL" dirty="0">
+                <a:solidFill>
+                  <a:schemeClr val="tx1"/>
+                </a:solidFill>
+              </a:rPr>
+              <a:t>Set Training</a:t>
+            </a:r>
+          </a:p>
+        </p:txBody>
+      </p:sp>
+      <p:sp>
+        <p:nvSpPr>
+          <p:cNvPr id="14" name="Stroomdiagram: Gegevens 13">
+            <a:extLst>
+              <a:ext uri="{FF2B5EF4-FFF2-40B4-BE49-F238E27FC236}">
+                <a16:creationId xmlns:a16="http://schemas.microsoft.com/office/drawing/2014/main" id="{26A2316D-04C1-44FD-8211-0866BBFC914C}"/>
+              </a:ext>
+            </a:extLst>
+          </p:cNvPr>
+          <p:cNvSpPr/>
+          <p:nvPr/>
+        </p:nvSpPr>
+        <p:spPr>
+          <a:xfrm>
+            <a:off x="9315276" y="329944"/>
+            <a:ext cx="2235198" cy="1628764"/>
+          </a:xfrm>
+          <a:prstGeom prst="flowChartInputOutput">
+            <a:avLst/>
+          </a:prstGeom>
+          <a:solidFill>
+            <a:schemeClr val="bg1"/>
+          </a:solidFill>
+        </p:spPr>
+        <p:style>
+          <a:lnRef idx="2">
+            <a:schemeClr val="accent1">
+              <a:shade val="50000"/>
+            </a:schemeClr>
+          </a:lnRef>
+          <a:fillRef idx="1">
+            <a:schemeClr val="accent1"/>
+          </a:fillRef>
+          <a:effectRef idx="0">
+            <a:schemeClr val="accent1"/>
+          </a:effectRef>
+          <a:fontRef idx="minor">
+            <a:schemeClr val="lt1"/>
+          </a:fontRef>
+        </p:style>
+        <p:txBody>
+          <a:bodyPr rtlCol="0" anchor="ctr"/>
+          <a:lstStyle/>
+          <a:p>
+            <a:pPr algn="ctr"/>
+            <a:r>
+              <a:rPr lang="nl-NL" dirty="0">
+                <a:solidFill>
+                  <a:schemeClr val="tx1"/>
+                </a:solidFill>
+              </a:rPr>
+              <a:t>sonar</a:t>
+            </a:r>
+          </a:p>
+          <a:p>
+            <a:pPr algn="ctr"/>
+            <a:r>
+              <a:rPr lang="nl-NL" dirty="0" err="1">
+                <a:solidFill>
+                  <a:schemeClr val="tx1"/>
+                </a:solidFill>
+              </a:rPr>
+              <a:t>trainingsset</a:t>
+            </a:r>
+            <a:endParaRPr lang="nl-NL" dirty="0">
+              <a:solidFill>
+                <a:schemeClr val="tx1"/>
+              </a:solidFill>
+            </a:endParaRPr>
+          </a:p>
+        </p:txBody>
+      </p:sp>
+      <p:cxnSp>
+        <p:nvCxnSpPr>
+          <p:cNvPr id="15" name="Rechte verbindingslijn met pijl 14">
+            <a:extLst>
+              <a:ext uri="{FF2B5EF4-FFF2-40B4-BE49-F238E27FC236}">
+                <a16:creationId xmlns:a16="http://schemas.microsoft.com/office/drawing/2014/main" id="{DAD226EA-C7A5-4AC3-A9E6-316299D02883}"/>
+              </a:ext>
+            </a:extLst>
+          </p:cNvPr>
+          <p:cNvCxnSpPr>
+            <a:cxnSpLocks/>
+            <a:stCxn id="14" idx="2"/>
+            <a:endCxn id="21" idx="3"/>
+          </p:cNvCxnSpPr>
+          <p:nvPr/>
+        </p:nvCxnSpPr>
+        <p:spPr>
+          <a:xfrm flipH="1" flipV="1">
+            <a:off x="8018463" y="991825"/>
+            <a:ext cx="1520333" cy="152501"/>
+          </a:xfrm>
+          <a:prstGeom prst="straightConnector1">
+            <a:avLst/>
+          </a:prstGeom>
+          <a:ln w="63500">
+            <a:tailEnd type="triangle"/>
+          </a:ln>
+        </p:spPr>
+        <p:style>
+          <a:lnRef idx="1">
+            <a:schemeClr val="accent1"/>
+          </a:lnRef>
+          <a:fillRef idx="0">
+            <a:schemeClr val="accent1"/>
+          </a:fillRef>
+          <a:effectRef idx="0">
+            <a:schemeClr val="accent1"/>
+          </a:effectRef>
+          <a:fontRef idx="minor">
+            <a:schemeClr val="tx1"/>
+          </a:fontRef>
+        </p:style>
+      </p:cxnSp>
+      <p:cxnSp>
+        <p:nvCxnSpPr>
+          <p:cNvPr id="19" name="Rechte verbindingslijn met pijl 18">
+            <a:extLst>
+              <a:ext uri="{FF2B5EF4-FFF2-40B4-BE49-F238E27FC236}">
+                <a16:creationId xmlns:a16="http://schemas.microsoft.com/office/drawing/2014/main" id="{21C21419-5533-4E69-A61F-AF7222878AAE}"/>
+              </a:ext>
+            </a:extLst>
+          </p:cNvPr>
+          <p:cNvCxnSpPr>
+            <a:cxnSpLocks/>
+            <a:stCxn id="3" idx="2"/>
+            <a:endCxn id="12" idx="0"/>
+          </p:cNvCxnSpPr>
+          <p:nvPr/>
+        </p:nvCxnSpPr>
+        <p:spPr>
+          <a:xfrm flipH="1">
+            <a:off x="2839720" y="1310752"/>
+            <a:ext cx="1408626" cy="592161"/>
+          </a:xfrm>
+          <a:prstGeom prst="straightConnector1">
+            <a:avLst/>
+          </a:prstGeom>
+          <a:ln w="63500">
+            <a:tailEnd type="triangle"/>
+          </a:ln>
+        </p:spPr>
+        <p:style>
+          <a:lnRef idx="1">
+            <a:schemeClr val="accent1"/>
+          </a:lnRef>
+          <a:fillRef idx="0">
+            <a:schemeClr val="accent1"/>
+          </a:fillRef>
+          <a:effectRef idx="0">
+            <a:schemeClr val="accent1"/>
+          </a:effectRef>
+          <a:fontRef idx="minor">
+            <a:schemeClr val="tx1"/>
+          </a:fontRef>
+        </p:style>
+      </p:cxnSp>
+      <p:cxnSp>
+        <p:nvCxnSpPr>
+          <p:cNvPr id="22" name="Rechte verbindingslijn met pijl 21">
+            <a:extLst>
+              <a:ext uri="{FF2B5EF4-FFF2-40B4-BE49-F238E27FC236}">
+                <a16:creationId xmlns:a16="http://schemas.microsoft.com/office/drawing/2014/main" id="{974022EF-0F1C-4B9A-8431-BC21B4D768AC}"/>
+              </a:ext>
+            </a:extLst>
+          </p:cNvPr>
+          <p:cNvCxnSpPr>
+            <a:cxnSpLocks/>
+            <a:stCxn id="12" idx="3"/>
+            <a:endCxn id="4" idx="0"/>
+          </p:cNvCxnSpPr>
+          <p:nvPr/>
+        </p:nvCxnSpPr>
+        <p:spPr>
+          <a:xfrm>
+            <a:off x="2438400" y="3531677"/>
+            <a:ext cx="2902663" cy="1493385"/>
+          </a:xfrm>
+          <a:prstGeom prst="straightConnector1">
+            <a:avLst/>
+          </a:prstGeom>
+          <a:ln w="63500">
+            <a:tailEnd type="triangle"/>
+          </a:ln>
+        </p:spPr>
+        <p:style>
+          <a:lnRef idx="1">
+            <a:schemeClr val="accent1"/>
+          </a:lnRef>
+          <a:fillRef idx="0">
+            <a:schemeClr val="accent1"/>
+          </a:fillRef>
+          <a:effectRef idx="0">
+            <a:schemeClr val="accent1"/>
+          </a:effectRef>
+          <a:fontRef idx="minor">
+            <a:schemeClr val="tx1"/>
+          </a:fontRef>
+        </p:style>
+      </p:cxnSp>
+      <p:cxnSp>
+        <p:nvCxnSpPr>
+          <p:cNvPr id="25" name="Rechte verbindingslijn met pijl 24">
+            <a:extLst>
+              <a:ext uri="{FF2B5EF4-FFF2-40B4-BE49-F238E27FC236}">
+                <a16:creationId xmlns:a16="http://schemas.microsoft.com/office/drawing/2014/main" id="{97F5BA44-DFD9-43A4-82CC-8728875ADA2D}"/>
+              </a:ext>
+            </a:extLst>
+          </p:cNvPr>
+          <p:cNvCxnSpPr>
+            <a:cxnSpLocks/>
+            <a:stCxn id="91" idx="3"/>
+            <a:endCxn id="4" idx="0"/>
+          </p:cNvCxnSpPr>
+          <p:nvPr/>
+        </p:nvCxnSpPr>
+        <p:spPr>
+          <a:xfrm>
+            <a:off x="4592051" y="3830855"/>
+            <a:ext cx="749012" cy="1194207"/>
+          </a:xfrm>
+          <a:prstGeom prst="straightConnector1">
+            <a:avLst/>
+          </a:prstGeom>
+          <a:ln w="63500">
+            <a:tailEnd type="triangle"/>
+          </a:ln>
+        </p:spPr>
+        <p:style>
+          <a:lnRef idx="1">
+            <a:schemeClr val="accent1"/>
+          </a:lnRef>
+          <a:fillRef idx="0">
+            <a:schemeClr val="accent1"/>
+          </a:fillRef>
+          <a:effectRef idx="0">
+            <a:schemeClr val="accent1"/>
+          </a:effectRef>
+          <a:fontRef idx="minor">
+            <a:schemeClr val="tx1"/>
+          </a:fontRef>
+        </p:style>
+      </p:cxnSp>
+      <p:sp>
+        <p:nvSpPr>
+          <p:cNvPr id="16" name="Stroomdiagram: Proces 15">
+            <a:extLst>
+              <a:ext uri="{FF2B5EF4-FFF2-40B4-BE49-F238E27FC236}">
+                <a16:creationId xmlns:a16="http://schemas.microsoft.com/office/drawing/2014/main" id="{43244513-258D-4E1F-B1B9-69EF5C4D28DB}"/>
+              </a:ext>
+            </a:extLst>
+          </p:cNvPr>
+          <p:cNvSpPr/>
+          <p:nvPr/>
+        </p:nvSpPr>
+        <p:spPr>
+          <a:xfrm>
+            <a:off x="1725177" y="5547248"/>
+            <a:ext cx="2006600" cy="1101396"/>
+          </a:xfrm>
+          <a:prstGeom prst="flowChartProcess">
+            <a:avLst/>
+          </a:prstGeom>
+        </p:spPr>
+        <p:style>
+          <a:lnRef idx="2">
+            <a:schemeClr val="accent6"/>
+          </a:lnRef>
+          <a:fillRef idx="1">
+            <a:schemeClr val="lt1"/>
+          </a:fillRef>
+          <a:effectRef idx="0">
+            <a:schemeClr val="accent6"/>
+          </a:effectRef>
+          <a:fontRef idx="minor">
+            <a:schemeClr val="dk1"/>
+          </a:fontRef>
+        </p:style>
+        <p:txBody>
+          <a:bodyPr rtlCol="0" anchor="ctr"/>
+          <a:lstStyle/>
+          <a:p>
+            <a:pPr algn="ctr"/>
+            <a:r>
+              <a:rPr lang="nl-NL" dirty="0"/>
+              <a:t>Pas gewichtsfactoren in </a:t>
+            </a:r>
+            <a:r>
+              <a:rPr lang="nl-NL" u="sng" dirty="0"/>
+              <a:t>ene</a:t>
+            </a:r>
+            <a:r>
+              <a:rPr lang="nl-NL" dirty="0"/>
+              <a:t> richting af</a:t>
+            </a:r>
+          </a:p>
+          <a:p>
+            <a:pPr algn="ctr"/>
+            <a:endParaRPr lang="nl-NL" dirty="0"/>
+          </a:p>
+        </p:txBody>
+      </p:sp>
+      <p:sp>
+        <p:nvSpPr>
+          <p:cNvPr id="17" name="Stroomdiagram: Proces 16">
+            <a:extLst>
+              <a:ext uri="{FF2B5EF4-FFF2-40B4-BE49-F238E27FC236}">
+                <a16:creationId xmlns:a16="http://schemas.microsoft.com/office/drawing/2014/main" id="{D4172E3A-2B14-4B42-BC99-6D84450BEF9B}"/>
+              </a:ext>
+            </a:extLst>
+          </p:cNvPr>
+          <p:cNvSpPr/>
+          <p:nvPr/>
+        </p:nvSpPr>
+        <p:spPr>
+          <a:xfrm>
+            <a:off x="8508630" y="5257991"/>
+            <a:ext cx="2006600" cy="1101397"/>
+          </a:xfrm>
+          <a:prstGeom prst="flowChartProcess">
+            <a:avLst/>
+          </a:prstGeom>
+        </p:spPr>
+        <p:style>
+          <a:lnRef idx="2">
+            <a:schemeClr val="accent6"/>
+          </a:lnRef>
+          <a:fillRef idx="1">
+            <a:schemeClr val="lt1"/>
+          </a:fillRef>
+          <a:effectRef idx="0">
+            <a:schemeClr val="accent6"/>
+          </a:effectRef>
+          <a:fontRef idx="minor">
+            <a:schemeClr val="dk1"/>
+          </a:fontRef>
+        </p:style>
+        <p:txBody>
+          <a:bodyPr rtlCol="0" anchor="ctr"/>
+          <a:lstStyle/>
+          <a:p>
+            <a:pPr algn="ctr"/>
+            <a:r>
+              <a:rPr lang="nl-NL" dirty="0"/>
+              <a:t>Pas gewichtsfactoren in </a:t>
+            </a:r>
+            <a:r>
+              <a:rPr lang="nl-NL" u="sng" dirty="0"/>
+              <a:t>andere</a:t>
+            </a:r>
+            <a:r>
+              <a:rPr lang="nl-NL" dirty="0"/>
+              <a:t> richting af</a:t>
+            </a:r>
+          </a:p>
+          <a:p>
+            <a:pPr algn="ctr"/>
+            <a:endParaRPr lang="nl-NL" dirty="0"/>
+          </a:p>
+        </p:txBody>
+      </p:sp>
+      <p:sp>
+        <p:nvSpPr>
+          <p:cNvPr id="21" name="Stroomdiagram: Proces 20">
+            <a:extLst>
+              <a:ext uri="{FF2B5EF4-FFF2-40B4-BE49-F238E27FC236}">
+                <a16:creationId xmlns:a16="http://schemas.microsoft.com/office/drawing/2014/main" id="{9EC709CC-15CC-473B-9D51-06A4D1AC8923}"/>
+              </a:ext>
+            </a:extLst>
+          </p:cNvPr>
+          <p:cNvSpPr/>
+          <p:nvPr/>
+        </p:nvSpPr>
+        <p:spPr>
+          <a:xfrm>
+            <a:off x="6011863" y="502875"/>
+            <a:ext cx="2006600" cy="977900"/>
+          </a:xfrm>
+          <a:prstGeom prst="flowChartProcess">
+            <a:avLst/>
+          </a:prstGeom>
+        </p:spPr>
+        <p:style>
+          <a:lnRef idx="2">
+            <a:schemeClr val="accent6"/>
+          </a:lnRef>
+          <a:fillRef idx="1">
+            <a:schemeClr val="lt1"/>
+          </a:fillRef>
+          <a:effectRef idx="0">
+            <a:schemeClr val="accent6"/>
+          </a:effectRef>
+          <a:fontRef idx="minor">
+            <a:schemeClr val="dk1"/>
+          </a:fontRef>
+        </p:style>
+        <p:txBody>
+          <a:bodyPr rtlCol="0" anchor="ctr"/>
+          <a:lstStyle/>
+          <a:p>
+            <a:pPr algn="ctr"/>
+            <a:r>
+              <a:rPr lang="nl-NL" dirty="0"/>
+              <a:t>3 sonarwaardes uit </a:t>
+            </a:r>
+            <a:r>
+              <a:rPr lang="nl-NL" dirty="0" err="1"/>
+              <a:t>trainingsset</a:t>
+            </a:r>
+            <a:endParaRPr lang="nl-NL" dirty="0"/>
+          </a:p>
+          <a:p>
+            <a:pPr algn="ctr"/>
+            <a:endParaRPr lang="nl-NL" dirty="0"/>
+          </a:p>
+        </p:txBody>
+      </p:sp>
+      <p:cxnSp>
+        <p:nvCxnSpPr>
+          <p:cNvPr id="24" name="Rechte verbindingslijn met pijl 23">
+            <a:extLst>
+              <a:ext uri="{FF2B5EF4-FFF2-40B4-BE49-F238E27FC236}">
+                <a16:creationId xmlns:a16="http://schemas.microsoft.com/office/drawing/2014/main" id="{86F86A8A-2FDD-46AF-BC9B-937F78402C58}"/>
+              </a:ext>
+            </a:extLst>
+          </p:cNvPr>
+          <p:cNvCxnSpPr>
+            <a:cxnSpLocks/>
+            <a:stCxn id="21" idx="1"/>
+            <a:endCxn id="3" idx="3"/>
+          </p:cNvCxnSpPr>
+          <p:nvPr/>
+        </p:nvCxnSpPr>
+        <p:spPr>
+          <a:xfrm flipH="1" flipV="1">
+            <a:off x="5251646" y="821802"/>
+            <a:ext cx="760217" cy="170023"/>
+          </a:xfrm>
+          <a:prstGeom prst="straightConnector1">
+            <a:avLst/>
+          </a:prstGeom>
+          <a:ln w="63500">
+            <a:tailEnd type="triangle"/>
+          </a:ln>
+        </p:spPr>
+        <p:style>
+          <a:lnRef idx="1">
+            <a:schemeClr val="accent1"/>
+          </a:lnRef>
+          <a:fillRef idx="0">
+            <a:schemeClr val="accent1"/>
+          </a:fillRef>
+          <a:effectRef idx="0">
+            <a:schemeClr val="accent1"/>
+          </a:effectRef>
+          <a:fontRef idx="minor">
+            <a:schemeClr val="tx1"/>
+          </a:fontRef>
+        </p:style>
+      </p:cxnSp>
+      <p:cxnSp>
+        <p:nvCxnSpPr>
+          <p:cNvPr id="41" name="Rechte verbindingslijn met pijl 40">
+            <a:extLst>
+              <a:ext uri="{FF2B5EF4-FFF2-40B4-BE49-F238E27FC236}">
+                <a16:creationId xmlns:a16="http://schemas.microsoft.com/office/drawing/2014/main" id="{4FBA68BD-2C8B-43B1-BEA4-C9B9FE15940B}"/>
+              </a:ext>
+            </a:extLst>
+          </p:cNvPr>
+          <p:cNvCxnSpPr>
+            <a:cxnSpLocks/>
+            <a:stCxn id="13" idx="2"/>
+            <a:endCxn id="91" idx="5"/>
+          </p:cNvCxnSpPr>
+          <p:nvPr/>
+        </p:nvCxnSpPr>
+        <p:spPr>
+          <a:xfrm flipH="1" flipV="1">
+            <a:off x="5545888" y="3096699"/>
+            <a:ext cx="3769388" cy="324347"/>
+          </a:xfrm>
+          <a:prstGeom prst="straightConnector1">
+            <a:avLst/>
+          </a:prstGeom>
+          <a:ln w="63500">
+            <a:tailEnd type="triangle"/>
+          </a:ln>
+        </p:spPr>
+        <p:style>
+          <a:lnRef idx="1">
+            <a:schemeClr val="accent1"/>
+          </a:lnRef>
+          <a:fillRef idx="0">
+            <a:schemeClr val="accent1"/>
+          </a:fillRef>
+          <a:effectRef idx="0">
+            <a:schemeClr val="accent1"/>
+          </a:effectRef>
+          <a:fontRef idx="minor">
+            <a:schemeClr val="tx1"/>
+          </a:fontRef>
+        </p:style>
+      </p:cxnSp>
+      <p:cxnSp>
+        <p:nvCxnSpPr>
+          <p:cNvPr id="66" name="Rechte verbindingslijn met pijl 65">
+            <a:extLst>
+              <a:ext uri="{FF2B5EF4-FFF2-40B4-BE49-F238E27FC236}">
+                <a16:creationId xmlns:a16="http://schemas.microsoft.com/office/drawing/2014/main" id="{73C26EA3-8EE1-4691-9CBC-1CBA028B9316}"/>
+              </a:ext>
+            </a:extLst>
+          </p:cNvPr>
+          <p:cNvCxnSpPr>
+            <a:cxnSpLocks/>
+            <a:stCxn id="16" idx="0"/>
+            <a:endCxn id="3" idx="2"/>
+          </p:cNvCxnSpPr>
+          <p:nvPr/>
+        </p:nvCxnSpPr>
+        <p:spPr>
+          <a:xfrm flipV="1">
+            <a:off x="2728477" y="1310752"/>
+            <a:ext cx="1519869" cy="4236496"/>
+          </a:xfrm>
+          <a:prstGeom prst="straightConnector1">
+            <a:avLst/>
+          </a:prstGeom>
+          <a:ln w="63500">
+            <a:tailEnd type="triangle"/>
+          </a:ln>
+        </p:spPr>
+        <p:style>
+          <a:lnRef idx="1">
+            <a:schemeClr val="accent1"/>
+          </a:lnRef>
+          <a:fillRef idx="0">
+            <a:schemeClr val="accent1"/>
+          </a:fillRef>
+          <a:effectRef idx="0">
+            <a:schemeClr val="accent1"/>
+          </a:effectRef>
+          <a:fontRef idx="minor">
+            <a:schemeClr val="tx1"/>
+          </a:fontRef>
+        </p:style>
+      </p:cxnSp>
+      <p:cxnSp>
+        <p:nvCxnSpPr>
+          <p:cNvPr id="69" name="Rechte verbindingslijn met pijl 68">
+            <a:extLst>
+              <a:ext uri="{FF2B5EF4-FFF2-40B4-BE49-F238E27FC236}">
+                <a16:creationId xmlns:a16="http://schemas.microsoft.com/office/drawing/2014/main" id="{67C14B19-C553-4DE0-BBC8-25A4C0764DB0}"/>
+              </a:ext>
+            </a:extLst>
+          </p:cNvPr>
+          <p:cNvCxnSpPr>
+            <a:cxnSpLocks/>
+            <a:stCxn id="17" idx="0"/>
+            <a:endCxn id="3" idx="2"/>
+          </p:cNvCxnSpPr>
+          <p:nvPr/>
+        </p:nvCxnSpPr>
+        <p:spPr>
+          <a:xfrm flipH="1" flipV="1">
+            <a:off x="4248346" y="1310752"/>
+            <a:ext cx="5263584" cy="3947239"/>
+          </a:xfrm>
+          <a:prstGeom prst="straightConnector1">
+            <a:avLst/>
+          </a:prstGeom>
+          <a:ln w="63500">
+            <a:tailEnd type="triangle"/>
+          </a:ln>
+        </p:spPr>
+        <p:style>
+          <a:lnRef idx="1">
+            <a:schemeClr val="accent1"/>
+          </a:lnRef>
+          <a:fillRef idx="0">
+            <a:schemeClr val="accent1"/>
+          </a:fillRef>
+          <a:effectRef idx="0">
+            <a:schemeClr val="accent1"/>
+          </a:effectRef>
+          <a:fontRef idx="minor">
+            <a:schemeClr val="tx1"/>
+          </a:fontRef>
+        </p:style>
+      </p:cxnSp>
+      <p:sp>
+        <p:nvSpPr>
+          <p:cNvPr id="84" name="Tekstvak 83">
+            <a:extLst>
+              <a:ext uri="{FF2B5EF4-FFF2-40B4-BE49-F238E27FC236}">
+                <a16:creationId xmlns:a16="http://schemas.microsoft.com/office/drawing/2014/main" id="{C3DADC57-9460-4866-9B4C-A102C3CE9564}"/>
+              </a:ext>
+            </a:extLst>
+          </p:cNvPr>
+          <p:cNvSpPr txBox="1"/>
+          <p:nvPr/>
+        </p:nvSpPr>
+        <p:spPr>
+          <a:xfrm>
+            <a:off x="1926387" y="421531"/>
+            <a:ext cx="1115996" cy="646331"/>
+          </a:xfrm>
+          <a:prstGeom prst="rect">
+            <a:avLst/>
+          </a:prstGeom>
+          <a:noFill/>
+        </p:spPr>
+        <p:txBody>
+          <a:bodyPr wrap="square" rtlCol="0">
+            <a:spAutoFit/>
+          </a:bodyPr>
+          <a:lstStyle/>
+          <a:p>
+            <a:r>
+              <a:rPr lang="nl-NL" dirty="0" err="1"/>
+              <a:t>Hidden</a:t>
+            </a:r>
+            <a:endParaRPr lang="nl-NL" dirty="0"/>
+          </a:p>
+          <a:p>
+            <a:r>
+              <a:rPr lang="nl-NL" dirty="0" err="1"/>
+              <a:t>layers</a:t>
+            </a:r>
+            <a:endParaRPr lang="nl-NL" dirty="0"/>
+          </a:p>
+        </p:txBody>
+      </p:sp>
+      <p:sp>
+        <p:nvSpPr>
+          <p:cNvPr id="85" name="Tekstvak 84">
+            <a:extLst>
+              <a:ext uri="{FF2B5EF4-FFF2-40B4-BE49-F238E27FC236}">
+                <a16:creationId xmlns:a16="http://schemas.microsoft.com/office/drawing/2014/main" id="{677E02A1-2E9B-4816-9709-8BB6E6886107}"/>
+              </a:ext>
+            </a:extLst>
+          </p:cNvPr>
+          <p:cNvSpPr txBox="1"/>
+          <p:nvPr/>
+        </p:nvSpPr>
+        <p:spPr>
+          <a:xfrm>
+            <a:off x="917189" y="2435608"/>
+            <a:ext cx="1115996" cy="646331"/>
+          </a:xfrm>
+          <a:prstGeom prst="rect">
+            <a:avLst/>
+          </a:prstGeom>
+          <a:noFill/>
+        </p:spPr>
+        <p:txBody>
+          <a:bodyPr wrap="square" rtlCol="0">
+            <a:spAutoFit/>
+          </a:bodyPr>
+          <a:lstStyle/>
+          <a:p>
+            <a:r>
+              <a:rPr lang="nl-NL" dirty="0"/>
+              <a:t>Output</a:t>
+            </a:r>
+          </a:p>
+          <a:p>
+            <a:r>
+              <a:rPr lang="nl-NL" dirty="0" err="1"/>
+              <a:t>layer</a:t>
+            </a:r>
+            <a:endParaRPr lang="nl-NL" dirty="0"/>
+          </a:p>
+        </p:txBody>
+      </p:sp>
+      <p:sp>
+        <p:nvSpPr>
+          <p:cNvPr id="86" name="Tekstvak 85">
+            <a:extLst>
+              <a:ext uri="{FF2B5EF4-FFF2-40B4-BE49-F238E27FC236}">
+                <a16:creationId xmlns:a16="http://schemas.microsoft.com/office/drawing/2014/main" id="{ED709283-D1AB-4502-9B40-850861D2313C}"/>
+              </a:ext>
+            </a:extLst>
+          </p:cNvPr>
+          <p:cNvSpPr txBox="1"/>
+          <p:nvPr/>
+        </p:nvSpPr>
+        <p:spPr>
+          <a:xfrm>
+            <a:off x="10586940" y="5235981"/>
+            <a:ext cx="1115996" cy="646331"/>
+          </a:xfrm>
+          <a:prstGeom prst="rect">
+            <a:avLst/>
+          </a:prstGeom>
+          <a:noFill/>
+        </p:spPr>
+        <p:txBody>
+          <a:bodyPr wrap="square" rtlCol="0">
+            <a:spAutoFit/>
+          </a:bodyPr>
+          <a:lstStyle/>
+          <a:p>
+            <a:r>
+              <a:rPr lang="nl-NL" dirty="0" err="1"/>
+              <a:t>Hidden</a:t>
+            </a:r>
+            <a:endParaRPr lang="nl-NL" dirty="0"/>
+          </a:p>
+          <a:p>
+            <a:r>
+              <a:rPr lang="nl-NL" dirty="0" err="1"/>
+              <a:t>layers</a:t>
+            </a:r>
+            <a:endParaRPr lang="nl-NL" dirty="0"/>
+          </a:p>
+        </p:txBody>
+      </p:sp>
+      <p:sp>
+        <p:nvSpPr>
+          <p:cNvPr id="87" name="Tekstvak 86">
+            <a:extLst>
+              <a:ext uri="{FF2B5EF4-FFF2-40B4-BE49-F238E27FC236}">
+                <a16:creationId xmlns:a16="http://schemas.microsoft.com/office/drawing/2014/main" id="{DD685F7F-5CCD-4B65-B1BA-1CCA06195FB3}"/>
+              </a:ext>
+            </a:extLst>
+          </p:cNvPr>
+          <p:cNvSpPr txBox="1"/>
+          <p:nvPr/>
+        </p:nvSpPr>
+        <p:spPr>
+          <a:xfrm>
+            <a:off x="1194969" y="4912816"/>
+            <a:ext cx="1115996" cy="646331"/>
+          </a:xfrm>
+          <a:prstGeom prst="rect">
+            <a:avLst/>
+          </a:prstGeom>
+          <a:noFill/>
+        </p:spPr>
+        <p:txBody>
+          <a:bodyPr wrap="square" rtlCol="0">
+            <a:spAutoFit/>
+          </a:bodyPr>
+          <a:lstStyle/>
+          <a:p>
+            <a:r>
+              <a:rPr lang="nl-NL" dirty="0" err="1"/>
+              <a:t>Hidden</a:t>
+            </a:r>
+            <a:endParaRPr lang="nl-NL" dirty="0"/>
+          </a:p>
+          <a:p>
+            <a:r>
+              <a:rPr lang="nl-NL" dirty="0" err="1"/>
+              <a:t>layers</a:t>
+            </a:r>
+            <a:endParaRPr lang="nl-NL" dirty="0"/>
+          </a:p>
+        </p:txBody>
+      </p:sp>
+      <p:sp>
+        <p:nvSpPr>
+          <p:cNvPr id="88" name="Tekstvak 87">
+            <a:extLst>
+              <a:ext uri="{FF2B5EF4-FFF2-40B4-BE49-F238E27FC236}">
+                <a16:creationId xmlns:a16="http://schemas.microsoft.com/office/drawing/2014/main" id="{6ABB1FE1-9A1B-47D4-9D7F-32D5C95FBBD4}"/>
+              </a:ext>
+            </a:extLst>
+          </p:cNvPr>
+          <p:cNvSpPr txBox="1"/>
+          <p:nvPr/>
+        </p:nvSpPr>
+        <p:spPr>
+          <a:xfrm>
+            <a:off x="5912653" y="-78776"/>
+            <a:ext cx="1115996" cy="646331"/>
+          </a:xfrm>
+          <a:prstGeom prst="rect">
+            <a:avLst/>
+          </a:prstGeom>
+          <a:noFill/>
+        </p:spPr>
+        <p:txBody>
+          <a:bodyPr wrap="square" rtlCol="0">
+            <a:spAutoFit/>
+          </a:bodyPr>
+          <a:lstStyle/>
+          <a:p>
+            <a:r>
+              <a:rPr lang="nl-NL" dirty="0"/>
+              <a:t>Input</a:t>
+            </a:r>
+          </a:p>
+          <a:p>
+            <a:r>
+              <a:rPr lang="nl-NL" dirty="0" err="1"/>
+              <a:t>layer</a:t>
+            </a:r>
+            <a:endParaRPr lang="nl-NL" dirty="0"/>
+          </a:p>
+        </p:txBody>
+      </p:sp>
+      <p:sp>
+        <p:nvSpPr>
+          <p:cNvPr id="89" name="Tekstvak 88">
+            <a:extLst>
+              <a:ext uri="{FF2B5EF4-FFF2-40B4-BE49-F238E27FC236}">
+                <a16:creationId xmlns:a16="http://schemas.microsoft.com/office/drawing/2014/main" id="{F2BE6DFE-5115-41F3-9093-A2F833EA3046}"/>
+              </a:ext>
+            </a:extLst>
+          </p:cNvPr>
+          <p:cNvSpPr txBox="1"/>
+          <p:nvPr/>
+        </p:nvSpPr>
+        <p:spPr>
+          <a:xfrm>
+            <a:off x="5607281" y="1695254"/>
+            <a:ext cx="1115996" cy="646331"/>
+          </a:xfrm>
+          <a:prstGeom prst="rect">
+            <a:avLst/>
+          </a:prstGeom>
+          <a:noFill/>
+        </p:spPr>
+        <p:txBody>
+          <a:bodyPr wrap="square" rtlCol="0">
+            <a:spAutoFit/>
+          </a:bodyPr>
+          <a:lstStyle/>
+          <a:p>
+            <a:r>
+              <a:rPr lang="nl-NL" dirty="0"/>
+              <a:t>Input</a:t>
+            </a:r>
+          </a:p>
+          <a:p>
+            <a:r>
+              <a:rPr lang="nl-NL" dirty="0" err="1"/>
+              <a:t>layer</a:t>
+            </a:r>
+            <a:endParaRPr lang="nl-NL" dirty="0"/>
+          </a:p>
+        </p:txBody>
+      </p:sp>
+      <p:sp>
+        <p:nvSpPr>
+          <p:cNvPr id="90" name="Tekstvak 89">
+            <a:extLst>
+              <a:ext uri="{FF2B5EF4-FFF2-40B4-BE49-F238E27FC236}">
+                <a16:creationId xmlns:a16="http://schemas.microsoft.com/office/drawing/2014/main" id="{E6609F7B-1DF2-4B08-A922-23E4DA7A8787}"/>
+              </a:ext>
+            </a:extLst>
+          </p:cNvPr>
+          <p:cNvSpPr txBox="1"/>
+          <p:nvPr/>
+        </p:nvSpPr>
+        <p:spPr>
+          <a:xfrm>
+            <a:off x="5577985" y="3287145"/>
+            <a:ext cx="1115996" cy="646331"/>
+          </a:xfrm>
+          <a:prstGeom prst="rect">
+            <a:avLst/>
+          </a:prstGeom>
+          <a:noFill/>
+        </p:spPr>
+        <p:txBody>
+          <a:bodyPr wrap="square" rtlCol="0">
+            <a:spAutoFit/>
+          </a:bodyPr>
+          <a:lstStyle/>
+          <a:p>
+            <a:r>
+              <a:rPr lang="nl-NL" dirty="0"/>
+              <a:t>Output</a:t>
+            </a:r>
+          </a:p>
+          <a:p>
+            <a:r>
+              <a:rPr lang="nl-NL" dirty="0" err="1"/>
+              <a:t>layer</a:t>
+            </a:r>
+            <a:endParaRPr lang="nl-NL" dirty="0"/>
+          </a:p>
+        </p:txBody>
+      </p:sp>
+      <p:sp>
+        <p:nvSpPr>
+          <p:cNvPr id="91" name="Stroomdiagram: Gegevens 90">
+            <a:extLst>
+              <a:ext uri="{FF2B5EF4-FFF2-40B4-BE49-F238E27FC236}">
+                <a16:creationId xmlns:a16="http://schemas.microsoft.com/office/drawing/2014/main" id="{D76AAF11-9842-4D2F-B0CA-B12D66A2691A}"/>
+              </a:ext>
+            </a:extLst>
+          </p:cNvPr>
+          <p:cNvSpPr/>
+          <p:nvPr/>
+        </p:nvSpPr>
+        <p:spPr>
+          <a:xfrm>
+            <a:off x="3828981" y="2362542"/>
+            <a:ext cx="1907674" cy="1468313"/>
+          </a:xfrm>
+          <a:prstGeom prst="flowChartInputOutput">
+            <a:avLst/>
+          </a:prstGeom>
+          <a:solidFill>
+            <a:schemeClr val="bg1"/>
+          </a:solidFill>
+        </p:spPr>
+        <p:style>
+          <a:lnRef idx="2">
+            <a:schemeClr val="accent1">
+              <a:shade val="50000"/>
+            </a:schemeClr>
+          </a:lnRef>
+          <a:fillRef idx="1">
+            <a:schemeClr val="accent1"/>
+          </a:fillRef>
+          <a:effectRef idx="0">
+            <a:schemeClr val="accent1"/>
+          </a:effectRef>
+          <a:fontRef idx="minor">
+            <a:schemeClr val="lt1"/>
+          </a:fontRef>
+        </p:style>
+        <p:txBody>
+          <a:bodyPr rtlCol="0" anchor="ctr"/>
+          <a:lstStyle/>
+          <a:p>
+            <a:pPr algn="ctr"/>
+            <a:r>
+              <a:rPr lang="nl-NL" dirty="0">
+                <a:solidFill>
+                  <a:schemeClr val="tx1"/>
+                </a:solidFill>
+              </a:rPr>
+              <a:t>Stuurhoek</a:t>
+            </a:r>
+          </a:p>
+          <a:p>
+            <a:pPr algn="ctr"/>
+            <a:r>
+              <a:rPr lang="nl-NL" dirty="0">
+                <a:solidFill>
+                  <a:schemeClr val="tx1"/>
+                </a:solidFill>
+              </a:rPr>
+              <a:t>Uit training</a:t>
+            </a:r>
+          </a:p>
+        </p:txBody>
+      </p:sp>
+    </p:spTree>
+    <p:extLst>
+      <p:ext uri="{BB962C8B-B14F-4D97-AF65-F5344CB8AC3E}">
+        <p14:creationId xmlns:p14="http://schemas.microsoft.com/office/powerpoint/2010/main" val="3061699450"/>
+      </p:ext>
+    </p:extLst>
+  </p:cSld>
+  <p:clrMapOvr>
+    <a:masterClrMapping/>
+  </p:clrMapOvr>
+</p:sld>
+</file>
+
 <file path=ppt/slides/slide2.xml><?xml version="1.0" encoding="utf-8"?>
 <p:sld xmlns:a="http://schemas.openxmlformats.org/drawingml/2006/main" xmlns:r="http://schemas.openxmlformats.org/officeDocument/2006/relationships" xmlns:p="http://schemas.openxmlformats.org/presentationml/2006/main">
   <p:cSld>
@@ -4020,7 +5392,7 @@
         </p:nvSpPr>
         <p:spPr>
           <a:xfrm>
-            <a:off x="9105900" y="4047668"/>
+            <a:off x="9204960" y="3722548"/>
             <a:ext cx="1813560" cy="1015663"/>
           </a:xfrm>
           <a:prstGeom prst="rect">
@@ -4130,176 +5502,32 @@
       </p:grpSpPr>
       <p:sp>
         <p:nvSpPr>
-          <p:cNvPr id="3" name="Tekstvak 2">
-            <a:extLst>
-              <a:ext uri="{FF2B5EF4-FFF2-40B4-BE49-F238E27FC236}">
-                <a16:creationId xmlns:a16="http://schemas.microsoft.com/office/drawing/2014/main" id="{8FDFFC97-85F7-4435-8EC8-8F2CAC29E79B}"/>
-              </a:ext>
-            </a:extLst>
-          </p:cNvPr>
-          <p:cNvSpPr txBox="1"/>
-          <p:nvPr/>
-        </p:nvSpPr>
-        <p:spPr>
-          <a:xfrm>
-            <a:off x="3048802" y="2692742"/>
-            <a:ext cx="6097604" cy="1477328"/>
-          </a:xfrm>
-          <a:prstGeom prst="rect">
-            <a:avLst/>
-          </a:prstGeom>
-          <a:noFill/>
-        </p:spPr>
-        <p:txBody>
-          <a:bodyPr wrap="square">
-            <a:spAutoFit/>
-          </a:bodyPr>
-          <a:lstStyle/>
-          <a:p>
-            <a:pPr marL="342900" lvl="0" indent="-342900">
-              <a:buFont typeface="Symbol" panose="05050102010706020507" pitchFamily="18" charset="2"/>
-              <a:buChar char="-"/>
-            </a:pPr>
-            <a:r>
-              <a:rPr lang="nl-NL" sz="1800" dirty="0">
-                <a:effectLst/>
-                <a:latin typeface="Calibri" panose="020F0502020204030204" pitchFamily="34" charset="0"/>
-                <a:ea typeface="Calibri" panose="020F0502020204030204" pitchFamily="34" charset="0"/>
-                <a:cs typeface="Calibri" panose="020F0502020204030204" pitchFamily="34" charset="0"/>
-              </a:rPr>
-              <a:t>Aanmaken </a:t>
-            </a:r>
-            <a:r>
-              <a:rPr lang="nl-NL" sz="1800" dirty="0" err="1">
-                <a:effectLst/>
-                <a:latin typeface="Calibri" panose="020F0502020204030204" pitchFamily="34" charset="0"/>
-                <a:ea typeface="Calibri" panose="020F0502020204030204" pitchFamily="34" charset="0"/>
-                <a:cs typeface="Calibri" panose="020F0502020204030204" pitchFamily="34" charset="0"/>
-              </a:rPr>
-              <a:t>trainingsset</a:t>
-            </a:r>
-            <a:endParaRPr lang="nl-NL" sz="1800" dirty="0">
-              <a:effectLst/>
-              <a:latin typeface="Calibri" panose="020F0502020204030204" pitchFamily="34" charset="0"/>
-              <a:ea typeface="Calibri" panose="020F0502020204030204" pitchFamily="34" charset="0"/>
-              <a:cs typeface="Calibri" panose="020F0502020204030204" pitchFamily="34" charset="0"/>
-            </a:endParaRPr>
-          </a:p>
-          <a:p>
-            <a:pPr marL="342900" lvl="0" indent="-342900">
-              <a:buFont typeface="Symbol" panose="05050102010706020507" pitchFamily="18" charset="2"/>
-              <a:buChar char="-"/>
-            </a:pPr>
-            <a:r>
-              <a:rPr lang="nl-NL" sz="1800" dirty="0">
-                <a:effectLst/>
-                <a:latin typeface="Calibri" panose="020F0502020204030204" pitchFamily="34" charset="0"/>
-                <a:ea typeface="Calibri" panose="020F0502020204030204" pitchFamily="34" charset="0"/>
-                <a:cs typeface="Calibri" panose="020F0502020204030204" pitchFamily="34" charset="0"/>
-              </a:rPr>
-              <a:t>Bouwen topologie netwerk, (</a:t>
-            </a:r>
-            <a:r>
-              <a:rPr lang="nl-NL" sz="1800" dirty="0" err="1">
-                <a:effectLst/>
-                <a:latin typeface="Calibri" panose="020F0502020204030204" pitchFamily="34" charset="0"/>
-                <a:ea typeface="Calibri" panose="020F0502020204030204" pitchFamily="34" charset="0"/>
-                <a:cs typeface="Calibri" panose="020F0502020204030204" pitchFamily="34" charset="0"/>
-              </a:rPr>
-              <a:t>layers</a:t>
-            </a:r>
-            <a:r>
-              <a:rPr lang="nl-NL" sz="1800" dirty="0">
-                <a:effectLst/>
-                <a:latin typeface="Calibri" panose="020F0502020204030204" pitchFamily="34" charset="0"/>
-                <a:ea typeface="Calibri" panose="020F0502020204030204" pitchFamily="34" charset="0"/>
-                <a:cs typeface="Calibri" panose="020F0502020204030204" pitchFamily="34" charset="0"/>
-              </a:rPr>
-              <a:t>, </a:t>
-            </a:r>
-            <a:r>
-              <a:rPr lang="nl-NL" sz="1800" dirty="0" err="1">
-                <a:effectLst/>
-                <a:latin typeface="Calibri" panose="020F0502020204030204" pitchFamily="34" charset="0"/>
-                <a:ea typeface="Calibri" panose="020F0502020204030204" pitchFamily="34" charset="0"/>
-                <a:cs typeface="Calibri" panose="020F0502020204030204" pitchFamily="34" charset="0"/>
-              </a:rPr>
-              <a:t>nodes</a:t>
-            </a:r>
-            <a:r>
-              <a:rPr lang="nl-NL" sz="1800" dirty="0">
-                <a:effectLst/>
-                <a:latin typeface="Calibri" panose="020F0502020204030204" pitchFamily="34" charset="0"/>
-                <a:ea typeface="Calibri" panose="020F0502020204030204" pitchFamily="34" charset="0"/>
-                <a:cs typeface="Calibri" panose="020F0502020204030204" pitchFamily="34" charset="0"/>
-              </a:rPr>
-              <a:t>, links )</a:t>
-            </a:r>
-          </a:p>
-          <a:p>
-            <a:pPr marL="342900" lvl="0" indent="-342900">
-              <a:buFont typeface="Symbol" panose="05050102010706020507" pitchFamily="18" charset="2"/>
-              <a:buChar char="-"/>
-            </a:pPr>
-            <a:r>
-              <a:rPr lang="nl-NL" sz="1800" dirty="0">
-                <a:effectLst/>
-                <a:latin typeface="Calibri" panose="020F0502020204030204" pitchFamily="34" charset="0"/>
-                <a:ea typeface="Calibri" panose="020F0502020204030204" pitchFamily="34" charset="0"/>
-                <a:cs typeface="Calibri" panose="020F0502020204030204" pitchFamily="34" charset="0"/>
-              </a:rPr>
-              <a:t>Preprocessing input data (sonar en </a:t>
-            </a:r>
-            <a:r>
-              <a:rPr lang="nl-NL" sz="1800" dirty="0" err="1">
-                <a:effectLst/>
-                <a:latin typeface="Calibri" panose="020F0502020204030204" pitchFamily="34" charset="0"/>
-                <a:ea typeface="Calibri" panose="020F0502020204030204" pitchFamily="34" charset="0"/>
-                <a:cs typeface="Calibri" panose="020F0502020204030204" pitchFamily="34" charset="0"/>
-              </a:rPr>
-              <a:t>lidar</a:t>
-            </a:r>
-            <a:r>
-              <a:rPr lang="nl-NL" sz="1800" dirty="0">
-                <a:effectLst/>
-                <a:latin typeface="Calibri" panose="020F0502020204030204" pitchFamily="34" charset="0"/>
-                <a:ea typeface="Calibri" panose="020F0502020204030204" pitchFamily="34" charset="0"/>
-                <a:cs typeface="Calibri" panose="020F0502020204030204" pitchFamily="34" charset="0"/>
-              </a:rPr>
-              <a:t> data)</a:t>
-            </a:r>
-          </a:p>
-          <a:p>
-            <a:pPr marL="342900" lvl="0" indent="-342900">
-              <a:buFont typeface="Symbol" panose="05050102010706020507" pitchFamily="18" charset="2"/>
-              <a:buChar char="-"/>
-            </a:pPr>
-            <a:r>
-              <a:rPr lang="nl-NL" sz="1800" dirty="0">
-                <a:effectLst/>
-                <a:latin typeface="Calibri" panose="020F0502020204030204" pitchFamily="34" charset="0"/>
-                <a:ea typeface="Calibri" panose="020F0502020204030204" pitchFamily="34" charset="0"/>
-                <a:cs typeface="Calibri" panose="020F0502020204030204" pitchFamily="34" charset="0"/>
-              </a:rPr>
-              <a:t>Trainen model van het model </a:t>
-            </a:r>
-          </a:p>
-          <a:p>
-            <a:pPr marL="342900" lvl="0" indent="-342900">
-              <a:spcAft>
-                <a:spcPts val="800"/>
-              </a:spcAft>
-              <a:buFont typeface="Symbol" panose="05050102010706020507" pitchFamily="18" charset="2"/>
-              <a:buChar char="-"/>
-            </a:pPr>
-            <a:r>
-              <a:rPr lang="nl-NL" sz="1800" dirty="0">
-                <a:effectLst/>
-                <a:latin typeface="Calibri" panose="020F0502020204030204" pitchFamily="34" charset="0"/>
-                <a:ea typeface="Calibri" panose="020F0502020204030204" pitchFamily="34" charset="0"/>
-                <a:cs typeface="Calibri" panose="020F0502020204030204" pitchFamily="34" charset="0"/>
-              </a:rPr>
-              <a:t>Validatie van het model </a:t>
+          <p:cNvPr id="2" name="Titel 1">
+            <a:extLst>
+              <a:ext uri="{FF2B5EF4-FFF2-40B4-BE49-F238E27FC236}">
+                <a16:creationId xmlns:a16="http://schemas.microsoft.com/office/drawing/2014/main" id="{651A5E02-6575-49F2-A37D-272F2DF0F254}"/>
+              </a:ext>
+            </a:extLst>
+          </p:cNvPr>
+          <p:cNvSpPr>
+            <a:spLocks noGrp="1"/>
+          </p:cNvSpPr>
+          <p:nvPr>
+            <p:ph type="title"/>
+          </p:nvPr>
+        </p:nvSpPr>
+        <p:spPr/>
+        <p:txBody>
+          <a:bodyPr/>
+          <a:lstStyle/>
+          <a:p>
+            <a:r>
+              <a:rPr lang="nl-NL" dirty="0" err="1"/>
+              <a:t>Trainingset</a:t>
+            </a:r>
+            <a:r>
+              <a:rPr lang="nl-NL" dirty="0"/>
+              <a:t> ??? Inputdata, preprocessing</a:t>
             </a:r>
           </a:p>
         </p:txBody>
@@ -4307,7 +5535,7 @@
     </p:spTree>
     <p:extLst>
       <p:ext uri="{BB962C8B-B14F-4D97-AF65-F5344CB8AC3E}">
-        <p14:creationId xmlns:p14="http://schemas.microsoft.com/office/powerpoint/2010/main" val="3047693261"/>
+        <p14:creationId xmlns:p14="http://schemas.microsoft.com/office/powerpoint/2010/main" val="2567964085"/>
       </p:ext>
     </p:extLst>
   </p:cSld>
@@ -4454,10 +5682,1192 @@
       </p:grpSpPr>
       <p:sp>
         <p:nvSpPr>
-          <p:cNvPr id="3" name="Stroomdiagram: Proces 2">
-            <a:extLst>
-              <a:ext uri="{FF2B5EF4-FFF2-40B4-BE49-F238E27FC236}">
-                <a16:creationId xmlns:a16="http://schemas.microsoft.com/office/drawing/2014/main" id="{D4BE89FB-D05C-4906-AB89-73A6F2A0FACF}"/>
+          <p:cNvPr id="2" name="Titel 1">
+            <a:extLst>
+              <a:ext uri="{FF2B5EF4-FFF2-40B4-BE49-F238E27FC236}">
+                <a16:creationId xmlns:a16="http://schemas.microsoft.com/office/drawing/2014/main" id="{7A824E01-556F-4E38-B8DE-A645FD814657}"/>
+              </a:ext>
+            </a:extLst>
+          </p:cNvPr>
+          <p:cNvSpPr>
+            <a:spLocks noGrp="1"/>
+          </p:cNvSpPr>
+          <p:nvPr>
+            <p:ph type="title"/>
+          </p:nvPr>
+        </p:nvSpPr>
+        <p:spPr/>
+        <p:txBody>
+          <a:bodyPr/>
+          <a:lstStyle/>
+          <a:p>
+            <a:pPr algn="ctr"/>
+            <a:r>
+              <a:rPr lang="nl-NL" b="1" dirty="0"/>
+              <a:t>Training model</a:t>
+            </a:r>
+          </a:p>
+        </p:txBody>
+      </p:sp>
+      <p:graphicFrame>
+        <p:nvGraphicFramePr>
+          <p:cNvPr id="4" name="Tabel 3">
+            <a:extLst>
+              <a:ext uri="{FF2B5EF4-FFF2-40B4-BE49-F238E27FC236}">
+                <a16:creationId xmlns:a16="http://schemas.microsoft.com/office/drawing/2014/main" id="{384ED1AA-A67A-42D0-9866-58AA8EDAD59F}"/>
+              </a:ext>
+            </a:extLst>
+          </p:cNvPr>
+          <p:cNvGraphicFramePr>
+            <a:graphicFrameLocks noGrp="1"/>
+          </p:cNvGraphicFramePr>
+          <p:nvPr>
+            <p:extLst>
+              <p:ext uri="{D42A27DB-BD31-4B8C-83A1-F6EECF244321}">
+                <p14:modId xmlns:p14="http://schemas.microsoft.com/office/powerpoint/2010/main" val="254600055"/>
+              </p:ext>
+            </p:extLst>
+          </p:nvPr>
+        </p:nvGraphicFramePr>
+        <p:xfrm>
+          <a:off x="351790" y="2691765"/>
+          <a:ext cx="3848100" cy="3282950"/>
+        </p:xfrm>
+        <a:graphic>
+          <a:graphicData uri="http://schemas.openxmlformats.org/drawingml/2006/table">
+            <a:tbl>
+              <a:tblPr>
+                <a:tableStyleId>{5C22544A-7EE6-4342-B048-85BDC9FD1C3A}</a:tableStyleId>
+              </a:tblPr>
+              <a:tblGrid>
+                <a:gridCol w="787400">
+                  <a:extLst>
+                    <a:ext uri="{9D8B030D-6E8A-4147-A177-3AD203B41FA5}">
+                      <a16:colId xmlns:a16="http://schemas.microsoft.com/office/drawing/2014/main" val="3471236307"/>
+                    </a:ext>
+                  </a:extLst>
+                </a:gridCol>
+                <a:gridCol w="800100">
+                  <a:extLst>
+                    <a:ext uri="{9D8B030D-6E8A-4147-A177-3AD203B41FA5}">
+                      <a16:colId xmlns:a16="http://schemas.microsoft.com/office/drawing/2014/main" val="3769218494"/>
+                    </a:ext>
+                  </a:extLst>
+                </a:gridCol>
+                <a:gridCol w="825500">
+                  <a:extLst>
+                    <a:ext uri="{9D8B030D-6E8A-4147-A177-3AD203B41FA5}">
+                      <a16:colId xmlns:a16="http://schemas.microsoft.com/office/drawing/2014/main" val="1608990806"/>
+                    </a:ext>
+                  </a:extLst>
+                </a:gridCol>
+                <a:gridCol w="1435100">
+                  <a:extLst>
+                    <a:ext uri="{9D8B030D-6E8A-4147-A177-3AD203B41FA5}">
+                      <a16:colId xmlns:a16="http://schemas.microsoft.com/office/drawing/2014/main" val="553858241"/>
+                    </a:ext>
+                  </a:extLst>
+                </a:gridCol>
+              </a:tblGrid>
+              <a:tr h="298450">
+                <a:tc>
+                  <a:txBody>
+                    <a:bodyPr/>
+                    <a:lstStyle/>
+                    <a:p>
+                      <a:pPr algn="l" fontAlgn="b"/>
+                      <a:r>
+                        <a:rPr lang="nl-NL" sz="1800" u="none" strike="noStrike">
+                          <a:effectLst/>
+                        </a:rPr>
+                        <a:t>Beam 1</a:t>
+                      </a:r>
+                      <a:endParaRPr lang="nl-NL" sz="1800" b="1" i="0" u="none" strike="noStrike">
+                        <a:solidFill>
+                          <a:srgbClr val="000000"/>
+                        </a:solidFill>
+                        <a:effectLst/>
+                        <a:latin typeface="Calibri" panose="020F0502020204030204" pitchFamily="34" charset="0"/>
+                      </a:endParaRPr>
+                    </a:p>
+                  </a:txBody>
+                  <a:tcPr marL="6350" marR="6350" marT="6350" marB="0" anchor="b"/>
+                </a:tc>
+                <a:tc>
+                  <a:txBody>
+                    <a:bodyPr/>
+                    <a:lstStyle/>
+                    <a:p>
+                      <a:pPr algn="l" fontAlgn="b"/>
+                      <a:r>
+                        <a:rPr lang="nl-NL" sz="1800" u="none" strike="noStrike">
+                          <a:effectLst/>
+                        </a:rPr>
+                        <a:t>Beam 2</a:t>
+                      </a:r>
+                      <a:endParaRPr lang="nl-NL" sz="1800" b="1" i="0" u="none" strike="noStrike">
+                        <a:solidFill>
+                          <a:srgbClr val="000000"/>
+                        </a:solidFill>
+                        <a:effectLst/>
+                        <a:latin typeface="Calibri" panose="020F0502020204030204" pitchFamily="34" charset="0"/>
+                      </a:endParaRPr>
+                    </a:p>
+                  </a:txBody>
+                  <a:tcPr marL="6350" marR="6350" marT="6350" marB="0" anchor="b"/>
+                </a:tc>
+                <a:tc>
+                  <a:txBody>
+                    <a:bodyPr/>
+                    <a:lstStyle/>
+                    <a:p>
+                      <a:pPr algn="l" fontAlgn="b"/>
+                      <a:r>
+                        <a:rPr lang="nl-NL" sz="1800" u="none" strike="noStrike">
+                          <a:effectLst/>
+                        </a:rPr>
+                        <a:t>Beam 3</a:t>
+                      </a:r>
+                      <a:endParaRPr lang="nl-NL" sz="1800" b="1" i="0" u="none" strike="noStrike">
+                        <a:solidFill>
+                          <a:srgbClr val="000000"/>
+                        </a:solidFill>
+                        <a:effectLst/>
+                        <a:latin typeface="Calibri" panose="020F0502020204030204" pitchFamily="34" charset="0"/>
+                      </a:endParaRPr>
+                    </a:p>
+                  </a:txBody>
+                  <a:tcPr marL="6350" marR="6350" marT="6350" marB="0" anchor="b"/>
+                </a:tc>
+                <a:tc>
+                  <a:txBody>
+                    <a:bodyPr/>
+                    <a:lstStyle/>
+                    <a:p>
+                      <a:pPr algn="l" fontAlgn="b"/>
+                      <a:r>
+                        <a:rPr lang="nl-NL" sz="1800" u="none" strike="noStrike">
+                          <a:effectLst/>
+                        </a:rPr>
+                        <a:t>Stearing Angle</a:t>
+                      </a:r>
+                      <a:endParaRPr lang="nl-NL" sz="1800" b="1" i="0" u="none" strike="noStrike">
+                        <a:solidFill>
+                          <a:srgbClr val="000000"/>
+                        </a:solidFill>
+                        <a:effectLst/>
+                        <a:latin typeface="Calibri" panose="020F0502020204030204" pitchFamily="34" charset="0"/>
+                      </a:endParaRPr>
+                    </a:p>
+                  </a:txBody>
+                  <a:tcPr marL="6350" marR="6350" marT="6350" marB="0" anchor="b"/>
+                </a:tc>
+                <a:extLst>
+                  <a:ext uri="{0D108BD9-81ED-4DB2-BD59-A6C34878D82A}">
+                    <a16:rowId xmlns:a16="http://schemas.microsoft.com/office/drawing/2014/main" val="162072874"/>
+                  </a:ext>
+                </a:extLst>
+              </a:tr>
+              <a:tr h="298450">
+                <a:tc>
+                  <a:txBody>
+                    <a:bodyPr/>
+                    <a:lstStyle/>
+                    <a:p>
+                      <a:pPr algn="r" fontAlgn="b"/>
+                      <a:r>
+                        <a:rPr lang="nl-NL" sz="1800" u="none" strike="noStrike">
+                          <a:effectLst/>
+                        </a:rPr>
+                        <a:t>1,4513</a:t>
+                      </a:r>
+                      <a:endParaRPr lang="nl-NL" sz="1800" b="0" i="0" u="none" strike="noStrike">
+                        <a:solidFill>
+                          <a:srgbClr val="000000"/>
+                        </a:solidFill>
+                        <a:effectLst/>
+                        <a:latin typeface="Calibri" panose="020F0502020204030204" pitchFamily="34" charset="0"/>
+                      </a:endParaRPr>
+                    </a:p>
+                  </a:txBody>
+                  <a:tcPr marL="6350" marR="6350" marT="6350" marB="0" anchor="b"/>
+                </a:tc>
+                <a:tc>
+                  <a:txBody>
+                    <a:bodyPr/>
+                    <a:lstStyle/>
+                    <a:p>
+                      <a:pPr algn="r" fontAlgn="b"/>
+                      <a:r>
+                        <a:rPr lang="nl-NL" sz="1800" u="none" strike="noStrike">
+                          <a:effectLst/>
+                        </a:rPr>
+                        <a:t>1,2711</a:t>
+                      </a:r>
+                      <a:endParaRPr lang="nl-NL" sz="1800" b="0" i="0" u="none" strike="noStrike">
+                        <a:solidFill>
+                          <a:srgbClr val="000000"/>
+                        </a:solidFill>
+                        <a:effectLst/>
+                        <a:latin typeface="Calibri" panose="020F0502020204030204" pitchFamily="34" charset="0"/>
+                      </a:endParaRPr>
+                    </a:p>
+                  </a:txBody>
+                  <a:tcPr marL="6350" marR="6350" marT="6350" marB="0" anchor="b"/>
+                </a:tc>
+                <a:tc>
+                  <a:txBody>
+                    <a:bodyPr/>
+                    <a:lstStyle/>
+                    <a:p>
+                      <a:pPr algn="r" fontAlgn="b"/>
+                      <a:r>
+                        <a:rPr lang="nl-NL" sz="1800" u="none" strike="noStrike">
+                          <a:effectLst/>
+                        </a:rPr>
+                        <a:t>1,7666</a:t>
+                      </a:r>
+                      <a:endParaRPr lang="nl-NL" sz="1800" b="0" i="0" u="none" strike="noStrike">
+                        <a:solidFill>
+                          <a:srgbClr val="000000"/>
+                        </a:solidFill>
+                        <a:effectLst/>
+                        <a:latin typeface="Calibri" panose="020F0502020204030204" pitchFamily="34" charset="0"/>
+                      </a:endParaRPr>
+                    </a:p>
+                  </a:txBody>
+                  <a:tcPr marL="6350" marR="6350" marT="6350" marB="0" anchor="b"/>
+                </a:tc>
+                <a:tc>
+                  <a:txBody>
+                    <a:bodyPr/>
+                    <a:lstStyle/>
+                    <a:p>
+                      <a:pPr algn="r" fontAlgn="b"/>
+                      <a:r>
+                        <a:rPr lang="nl-NL" sz="1800" u="none" strike="noStrike">
+                          <a:effectLst/>
+                        </a:rPr>
+                        <a:t>-22</a:t>
+                      </a:r>
+                      <a:endParaRPr lang="nl-NL" sz="1800" b="0" i="0" u="none" strike="noStrike">
+                        <a:solidFill>
+                          <a:srgbClr val="000000"/>
+                        </a:solidFill>
+                        <a:effectLst/>
+                        <a:latin typeface="Calibri" panose="020F0502020204030204" pitchFamily="34" charset="0"/>
+                      </a:endParaRPr>
+                    </a:p>
+                  </a:txBody>
+                  <a:tcPr marL="6350" marR="6350" marT="6350" marB="0" anchor="b"/>
+                </a:tc>
+                <a:extLst>
+                  <a:ext uri="{0D108BD9-81ED-4DB2-BD59-A6C34878D82A}">
+                    <a16:rowId xmlns:a16="http://schemas.microsoft.com/office/drawing/2014/main" val="938836832"/>
+                  </a:ext>
+                </a:extLst>
+              </a:tr>
+              <a:tr h="298450">
+                <a:tc>
+                  <a:txBody>
+                    <a:bodyPr/>
+                    <a:lstStyle/>
+                    <a:p>
+                      <a:pPr algn="r" fontAlgn="b"/>
+                      <a:r>
+                        <a:rPr lang="nl-NL" sz="1800" u="none" strike="noStrike">
+                          <a:effectLst/>
+                        </a:rPr>
+                        <a:t>1,4513</a:t>
+                      </a:r>
+                      <a:endParaRPr lang="nl-NL" sz="1800" b="0" i="0" u="none" strike="noStrike">
+                        <a:solidFill>
+                          <a:srgbClr val="000000"/>
+                        </a:solidFill>
+                        <a:effectLst/>
+                        <a:latin typeface="Calibri" panose="020F0502020204030204" pitchFamily="34" charset="0"/>
+                      </a:endParaRPr>
+                    </a:p>
+                  </a:txBody>
+                  <a:tcPr marL="6350" marR="6350" marT="6350" marB="0" anchor="b"/>
+                </a:tc>
+                <a:tc>
+                  <a:txBody>
+                    <a:bodyPr/>
+                    <a:lstStyle/>
+                    <a:p>
+                      <a:pPr algn="r" fontAlgn="b"/>
+                      <a:r>
+                        <a:rPr lang="nl-NL" sz="1800" u="none" strike="noStrike">
+                          <a:effectLst/>
+                        </a:rPr>
+                        <a:t>1,2711</a:t>
+                      </a:r>
+                      <a:endParaRPr lang="nl-NL" sz="1800" b="0" i="0" u="none" strike="noStrike">
+                        <a:solidFill>
+                          <a:srgbClr val="000000"/>
+                        </a:solidFill>
+                        <a:effectLst/>
+                        <a:latin typeface="Calibri" panose="020F0502020204030204" pitchFamily="34" charset="0"/>
+                      </a:endParaRPr>
+                    </a:p>
+                  </a:txBody>
+                  <a:tcPr marL="6350" marR="6350" marT="6350" marB="0" anchor="b"/>
+                </a:tc>
+                <a:tc>
+                  <a:txBody>
+                    <a:bodyPr/>
+                    <a:lstStyle/>
+                    <a:p>
+                      <a:pPr algn="r" fontAlgn="b"/>
+                      <a:r>
+                        <a:rPr lang="nl-NL" sz="1800" u="none" strike="noStrike">
+                          <a:effectLst/>
+                        </a:rPr>
+                        <a:t>1,7666</a:t>
+                      </a:r>
+                      <a:endParaRPr lang="nl-NL" sz="1800" b="0" i="0" u="none" strike="noStrike">
+                        <a:solidFill>
+                          <a:srgbClr val="000000"/>
+                        </a:solidFill>
+                        <a:effectLst/>
+                        <a:latin typeface="Calibri" panose="020F0502020204030204" pitchFamily="34" charset="0"/>
+                      </a:endParaRPr>
+                    </a:p>
+                  </a:txBody>
+                  <a:tcPr marL="6350" marR="6350" marT="6350" marB="0" anchor="b"/>
+                </a:tc>
+                <a:tc>
+                  <a:txBody>
+                    <a:bodyPr/>
+                    <a:lstStyle/>
+                    <a:p>
+                      <a:pPr algn="r" fontAlgn="b"/>
+                      <a:r>
+                        <a:rPr lang="nl-NL" sz="1800" u="none" strike="noStrike">
+                          <a:effectLst/>
+                        </a:rPr>
+                        <a:t>-22</a:t>
+                      </a:r>
+                      <a:endParaRPr lang="nl-NL" sz="1800" b="0" i="0" u="none" strike="noStrike">
+                        <a:solidFill>
+                          <a:srgbClr val="000000"/>
+                        </a:solidFill>
+                        <a:effectLst/>
+                        <a:latin typeface="Calibri" panose="020F0502020204030204" pitchFamily="34" charset="0"/>
+                      </a:endParaRPr>
+                    </a:p>
+                  </a:txBody>
+                  <a:tcPr marL="6350" marR="6350" marT="6350" marB="0" anchor="b"/>
+                </a:tc>
+                <a:extLst>
+                  <a:ext uri="{0D108BD9-81ED-4DB2-BD59-A6C34878D82A}">
+                    <a16:rowId xmlns:a16="http://schemas.microsoft.com/office/drawing/2014/main" val="2319624933"/>
+                  </a:ext>
+                </a:extLst>
+              </a:tr>
+              <a:tr h="298450">
+                <a:tc>
+                  <a:txBody>
+                    <a:bodyPr/>
+                    <a:lstStyle/>
+                    <a:p>
+                      <a:pPr algn="r" fontAlgn="b"/>
+                      <a:r>
+                        <a:rPr lang="nl-NL" sz="1800" u="none" strike="noStrike">
+                          <a:effectLst/>
+                        </a:rPr>
+                        <a:t>1,4496</a:t>
+                      </a:r>
+                      <a:endParaRPr lang="nl-NL" sz="1800" b="0" i="0" u="none" strike="noStrike">
+                        <a:solidFill>
+                          <a:srgbClr val="000000"/>
+                        </a:solidFill>
+                        <a:effectLst/>
+                        <a:latin typeface="Calibri" panose="020F0502020204030204" pitchFamily="34" charset="0"/>
+                      </a:endParaRPr>
+                    </a:p>
+                  </a:txBody>
+                  <a:tcPr marL="6350" marR="6350" marT="6350" marB="0" anchor="b"/>
+                </a:tc>
+                <a:tc>
+                  <a:txBody>
+                    <a:bodyPr/>
+                    <a:lstStyle/>
+                    <a:p>
+                      <a:pPr algn="r" fontAlgn="b"/>
+                      <a:r>
+                        <a:rPr lang="nl-NL" sz="1800" u="none" strike="noStrike">
+                          <a:effectLst/>
+                        </a:rPr>
+                        <a:t>1,2696</a:t>
+                      </a:r>
+                      <a:endParaRPr lang="nl-NL" sz="1800" b="0" i="0" u="none" strike="noStrike">
+                        <a:solidFill>
+                          <a:srgbClr val="000000"/>
+                        </a:solidFill>
+                        <a:effectLst/>
+                        <a:latin typeface="Calibri" panose="020F0502020204030204" pitchFamily="34" charset="0"/>
+                      </a:endParaRPr>
+                    </a:p>
+                  </a:txBody>
+                  <a:tcPr marL="6350" marR="6350" marT="6350" marB="0" anchor="b"/>
+                </a:tc>
+                <a:tc>
+                  <a:txBody>
+                    <a:bodyPr/>
+                    <a:lstStyle/>
+                    <a:p>
+                      <a:pPr algn="r" fontAlgn="b"/>
+                      <a:r>
+                        <a:rPr lang="nl-NL" sz="1800" u="none" strike="noStrike" dirty="0">
+                          <a:effectLst/>
+                        </a:rPr>
+                        <a:t>1,7655</a:t>
+                      </a:r>
+                      <a:endParaRPr lang="nl-NL" sz="1800" b="0" i="0" u="none" strike="noStrike" dirty="0">
+                        <a:solidFill>
+                          <a:srgbClr val="000000"/>
+                        </a:solidFill>
+                        <a:effectLst/>
+                        <a:latin typeface="Calibri" panose="020F0502020204030204" pitchFamily="34" charset="0"/>
+                      </a:endParaRPr>
+                    </a:p>
+                  </a:txBody>
+                  <a:tcPr marL="6350" marR="6350" marT="6350" marB="0" anchor="b"/>
+                </a:tc>
+                <a:tc>
+                  <a:txBody>
+                    <a:bodyPr/>
+                    <a:lstStyle/>
+                    <a:p>
+                      <a:pPr algn="r" fontAlgn="b"/>
+                      <a:r>
+                        <a:rPr lang="nl-NL" sz="1800" u="none" strike="noStrike">
+                          <a:effectLst/>
+                        </a:rPr>
+                        <a:t>-22</a:t>
+                      </a:r>
+                      <a:endParaRPr lang="nl-NL" sz="1800" b="0" i="0" u="none" strike="noStrike">
+                        <a:solidFill>
+                          <a:srgbClr val="000000"/>
+                        </a:solidFill>
+                        <a:effectLst/>
+                        <a:latin typeface="Calibri" panose="020F0502020204030204" pitchFamily="34" charset="0"/>
+                      </a:endParaRPr>
+                    </a:p>
+                  </a:txBody>
+                  <a:tcPr marL="6350" marR="6350" marT="6350" marB="0" anchor="b"/>
+                </a:tc>
+                <a:extLst>
+                  <a:ext uri="{0D108BD9-81ED-4DB2-BD59-A6C34878D82A}">
+                    <a16:rowId xmlns:a16="http://schemas.microsoft.com/office/drawing/2014/main" val="1385689259"/>
+                  </a:ext>
+                </a:extLst>
+              </a:tr>
+              <a:tr h="298450">
+                <a:tc>
+                  <a:txBody>
+                    <a:bodyPr/>
+                    <a:lstStyle/>
+                    <a:p>
+                      <a:pPr algn="r" fontAlgn="b"/>
+                      <a:r>
+                        <a:rPr lang="nl-NL" sz="1800" u="none" strike="noStrike">
+                          <a:effectLst/>
+                        </a:rPr>
+                        <a:t>1,448</a:t>
+                      </a:r>
+                      <a:endParaRPr lang="nl-NL" sz="1800" b="0" i="0" u="none" strike="noStrike">
+                        <a:solidFill>
+                          <a:srgbClr val="000000"/>
+                        </a:solidFill>
+                        <a:effectLst/>
+                        <a:latin typeface="Calibri" panose="020F0502020204030204" pitchFamily="34" charset="0"/>
+                      </a:endParaRPr>
+                    </a:p>
+                  </a:txBody>
+                  <a:tcPr marL="6350" marR="6350" marT="6350" marB="0" anchor="b"/>
+                </a:tc>
+                <a:tc>
+                  <a:txBody>
+                    <a:bodyPr/>
+                    <a:lstStyle/>
+                    <a:p>
+                      <a:pPr algn="r" fontAlgn="b"/>
+                      <a:r>
+                        <a:rPr lang="nl-NL" sz="1800" u="none" strike="noStrike">
+                          <a:effectLst/>
+                        </a:rPr>
+                        <a:t>1,2683</a:t>
+                      </a:r>
+                      <a:endParaRPr lang="nl-NL" sz="1800" b="0" i="0" u="none" strike="noStrike">
+                        <a:solidFill>
+                          <a:srgbClr val="000000"/>
+                        </a:solidFill>
+                        <a:effectLst/>
+                        <a:latin typeface="Calibri" panose="020F0502020204030204" pitchFamily="34" charset="0"/>
+                      </a:endParaRPr>
+                    </a:p>
+                  </a:txBody>
+                  <a:tcPr marL="6350" marR="6350" marT="6350" marB="0" anchor="b"/>
+                </a:tc>
+                <a:tc>
+                  <a:txBody>
+                    <a:bodyPr/>
+                    <a:lstStyle/>
+                    <a:p>
+                      <a:pPr algn="r" fontAlgn="b"/>
+                      <a:r>
+                        <a:rPr lang="nl-NL" sz="1800" u="none" strike="noStrike">
+                          <a:effectLst/>
+                        </a:rPr>
+                        <a:t>1,7643</a:t>
+                      </a:r>
+                      <a:endParaRPr lang="nl-NL" sz="1800" b="0" i="0" u="none" strike="noStrike">
+                        <a:solidFill>
+                          <a:srgbClr val="000000"/>
+                        </a:solidFill>
+                        <a:effectLst/>
+                        <a:latin typeface="Calibri" panose="020F0502020204030204" pitchFamily="34" charset="0"/>
+                      </a:endParaRPr>
+                    </a:p>
+                  </a:txBody>
+                  <a:tcPr marL="6350" marR="6350" marT="6350" marB="0" anchor="b"/>
+                </a:tc>
+                <a:tc>
+                  <a:txBody>
+                    <a:bodyPr/>
+                    <a:lstStyle/>
+                    <a:p>
+                      <a:pPr algn="r" fontAlgn="b"/>
+                      <a:r>
+                        <a:rPr lang="nl-NL" sz="1800" u="none" strike="noStrike">
+                          <a:effectLst/>
+                        </a:rPr>
+                        <a:t>-22</a:t>
+                      </a:r>
+                      <a:endParaRPr lang="nl-NL" sz="1800" b="0" i="0" u="none" strike="noStrike">
+                        <a:solidFill>
+                          <a:srgbClr val="000000"/>
+                        </a:solidFill>
+                        <a:effectLst/>
+                        <a:latin typeface="Calibri" panose="020F0502020204030204" pitchFamily="34" charset="0"/>
+                      </a:endParaRPr>
+                    </a:p>
+                  </a:txBody>
+                  <a:tcPr marL="6350" marR="6350" marT="6350" marB="0" anchor="b"/>
+                </a:tc>
+                <a:extLst>
+                  <a:ext uri="{0D108BD9-81ED-4DB2-BD59-A6C34878D82A}">
+                    <a16:rowId xmlns:a16="http://schemas.microsoft.com/office/drawing/2014/main" val="1854830904"/>
+                  </a:ext>
+                </a:extLst>
+              </a:tr>
+              <a:tr h="298450">
+                <a:tc>
+                  <a:txBody>
+                    <a:bodyPr/>
+                    <a:lstStyle/>
+                    <a:p>
+                      <a:pPr algn="r" fontAlgn="b"/>
+                      <a:r>
+                        <a:rPr lang="nl-NL" sz="1800" u="none" strike="noStrike">
+                          <a:effectLst/>
+                        </a:rPr>
+                        <a:t>1,448</a:t>
+                      </a:r>
+                      <a:endParaRPr lang="nl-NL" sz="1800" b="0" i="0" u="none" strike="noStrike">
+                        <a:solidFill>
+                          <a:srgbClr val="000000"/>
+                        </a:solidFill>
+                        <a:effectLst/>
+                        <a:latin typeface="Calibri" panose="020F0502020204030204" pitchFamily="34" charset="0"/>
+                      </a:endParaRPr>
+                    </a:p>
+                  </a:txBody>
+                  <a:tcPr marL="6350" marR="6350" marT="6350" marB="0" anchor="b"/>
+                </a:tc>
+                <a:tc>
+                  <a:txBody>
+                    <a:bodyPr/>
+                    <a:lstStyle/>
+                    <a:p>
+                      <a:pPr algn="r" fontAlgn="b"/>
+                      <a:r>
+                        <a:rPr lang="nl-NL" sz="1800" u="none" strike="noStrike">
+                          <a:effectLst/>
+                        </a:rPr>
+                        <a:t>1,2683</a:t>
+                      </a:r>
+                      <a:endParaRPr lang="nl-NL" sz="1800" b="0" i="0" u="none" strike="noStrike">
+                        <a:solidFill>
+                          <a:srgbClr val="000000"/>
+                        </a:solidFill>
+                        <a:effectLst/>
+                        <a:latin typeface="Calibri" panose="020F0502020204030204" pitchFamily="34" charset="0"/>
+                      </a:endParaRPr>
+                    </a:p>
+                  </a:txBody>
+                  <a:tcPr marL="6350" marR="6350" marT="6350" marB="0" anchor="b"/>
+                </a:tc>
+                <a:tc>
+                  <a:txBody>
+                    <a:bodyPr/>
+                    <a:lstStyle/>
+                    <a:p>
+                      <a:pPr algn="r" fontAlgn="b"/>
+                      <a:r>
+                        <a:rPr lang="nl-NL" sz="1800" u="none" strike="noStrike">
+                          <a:effectLst/>
+                        </a:rPr>
+                        <a:t>1,7643</a:t>
+                      </a:r>
+                      <a:endParaRPr lang="nl-NL" sz="1800" b="0" i="0" u="none" strike="noStrike">
+                        <a:solidFill>
+                          <a:srgbClr val="000000"/>
+                        </a:solidFill>
+                        <a:effectLst/>
+                        <a:latin typeface="Calibri" panose="020F0502020204030204" pitchFamily="34" charset="0"/>
+                      </a:endParaRPr>
+                    </a:p>
+                  </a:txBody>
+                  <a:tcPr marL="6350" marR="6350" marT="6350" marB="0" anchor="b"/>
+                </a:tc>
+                <a:tc>
+                  <a:txBody>
+                    <a:bodyPr/>
+                    <a:lstStyle/>
+                    <a:p>
+                      <a:pPr algn="r" fontAlgn="b"/>
+                      <a:r>
+                        <a:rPr lang="nl-NL" sz="1800" u="none" strike="noStrike">
+                          <a:effectLst/>
+                        </a:rPr>
+                        <a:t>-22</a:t>
+                      </a:r>
+                      <a:endParaRPr lang="nl-NL" sz="1800" b="0" i="0" u="none" strike="noStrike">
+                        <a:solidFill>
+                          <a:srgbClr val="000000"/>
+                        </a:solidFill>
+                        <a:effectLst/>
+                        <a:latin typeface="Calibri" panose="020F0502020204030204" pitchFamily="34" charset="0"/>
+                      </a:endParaRPr>
+                    </a:p>
+                  </a:txBody>
+                  <a:tcPr marL="6350" marR="6350" marT="6350" marB="0" anchor="b"/>
+                </a:tc>
+                <a:extLst>
+                  <a:ext uri="{0D108BD9-81ED-4DB2-BD59-A6C34878D82A}">
+                    <a16:rowId xmlns:a16="http://schemas.microsoft.com/office/drawing/2014/main" val="2072847274"/>
+                  </a:ext>
+                </a:extLst>
+              </a:tr>
+              <a:tr h="298450">
+                <a:tc>
+                  <a:txBody>
+                    <a:bodyPr/>
+                    <a:lstStyle/>
+                    <a:p>
+                      <a:pPr algn="r" fontAlgn="b"/>
+                      <a:r>
+                        <a:rPr lang="nl-NL" sz="1800" u="none" strike="noStrike">
+                          <a:effectLst/>
+                        </a:rPr>
+                        <a:t>1,4421</a:t>
+                      </a:r>
+                      <a:endParaRPr lang="nl-NL" sz="1800" b="0" i="0" u="none" strike="noStrike">
+                        <a:solidFill>
+                          <a:srgbClr val="000000"/>
+                        </a:solidFill>
+                        <a:effectLst/>
+                        <a:latin typeface="Calibri" panose="020F0502020204030204" pitchFamily="34" charset="0"/>
+                      </a:endParaRPr>
+                    </a:p>
+                  </a:txBody>
+                  <a:tcPr marL="6350" marR="6350" marT="6350" marB="0" anchor="b"/>
+                </a:tc>
+                <a:tc>
+                  <a:txBody>
+                    <a:bodyPr/>
+                    <a:lstStyle/>
+                    <a:p>
+                      <a:pPr algn="r" fontAlgn="b"/>
+                      <a:r>
+                        <a:rPr lang="nl-NL" sz="1800" u="none" strike="noStrike">
+                          <a:effectLst/>
+                        </a:rPr>
+                        <a:t>1,2635</a:t>
+                      </a:r>
+                      <a:endParaRPr lang="nl-NL" sz="1800" b="0" i="0" u="none" strike="noStrike">
+                        <a:solidFill>
+                          <a:srgbClr val="000000"/>
+                        </a:solidFill>
+                        <a:effectLst/>
+                        <a:latin typeface="Calibri" panose="020F0502020204030204" pitchFamily="34" charset="0"/>
+                      </a:endParaRPr>
+                    </a:p>
+                  </a:txBody>
+                  <a:tcPr marL="6350" marR="6350" marT="6350" marB="0" anchor="b"/>
+                </a:tc>
+                <a:tc>
+                  <a:txBody>
+                    <a:bodyPr/>
+                    <a:lstStyle/>
+                    <a:p>
+                      <a:pPr algn="r" fontAlgn="b"/>
+                      <a:r>
+                        <a:rPr lang="nl-NL" sz="1800" u="none" strike="noStrike">
+                          <a:effectLst/>
+                        </a:rPr>
+                        <a:t>1,76</a:t>
+                      </a:r>
+                      <a:endParaRPr lang="nl-NL" sz="1800" b="0" i="0" u="none" strike="noStrike">
+                        <a:solidFill>
+                          <a:srgbClr val="000000"/>
+                        </a:solidFill>
+                        <a:effectLst/>
+                        <a:latin typeface="Calibri" panose="020F0502020204030204" pitchFamily="34" charset="0"/>
+                      </a:endParaRPr>
+                    </a:p>
+                  </a:txBody>
+                  <a:tcPr marL="6350" marR="6350" marT="6350" marB="0" anchor="b"/>
+                </a:tc>
+                <a:tc>
+                  <a:txBody>
+                    <a:bodyPr/>
+                    <a:lstStyle/>
+                    <a:p>
+                      <a:pPr algn="r" fontAlgn="b"/>
+                      <a:r>
+                        <a:rPr lang="nl-NL" sz="1800" u="none" strike="noStrike">
+                          <a:effectLst/>
+                        </a:rPr>
+                        <a:t>-22</a:t>
+                      </a:r>
+                      <a:endParaRPr lang="nl-NL" sz="1800" b="0" i="0" u="none" strike="noStrike">
+                        <a:solidFill>
+                          <a:srgbClr val="000000"/>
+                        </a:solidFill>
+                        <a:effectLst/>
+                        <a:latin typeface="Calibri" panose="020F0502020204030204" pitchFamily="34" charset="0"/>
+                      </a:endParaRPr>
+                    </a:p>
+                  </a:txBody>
+                  <a:tcPr marL="6350" marR="6350" marT="6350" marB="0" anchor="b"/>
+                </a:tc>
+                <a:extLst>
+                  <a:ext uri="{0D108BD9-81ED-4DB2-BD59-A6C34878D82A}">
+                    <a16:rowId xmlns:a16="http://schemas.microsoft.com/office/drawing/2014/main" val="3629302531"/>
+                  </a:ext>
+                </a:extLst>
+              </a:tr>
+              <a:tr h="298450">
+                <a:tc>
+                  <a:txBody>
+                    <a:bodyPr/>
+                    <a:lstStyle/>
+                    <a:p>
+                      <a:pPr algn="r" fontAlgn="b"/>
+                      <a:r>
+                        <a:rPr lang="nl-NL" sz="1800" u="none" strike="noStrike">
+                          <a:effectLst/>
+                        </a:rPr>
+                        <a:t>1,4329</a:t>
+                      </a:r>
+                      <a:endParaRPr lang="nl-NL" sz="1800" b="0" i="0" u="none" strike="noStrike">
+                        <a:solidFill>
+                          <a:srgbClr val="000000"/>
+                        </a:solidFill>
+                        <a:effectLst/>
+                        <a:latin typeface="Calibri" panose="020F0502020204030204" pitchFamily="34" charset="0"/>
+                      </a:endParaRPr>
+                    </a:p>
+                  </a:txBody>
+                  <a:tcPr marL="6350" marR="6350" marT="6350" marB="0" anchor="b"/>
+                </a:tc>
+                <a:tc>
+                  <a:txBody>
+                    <a:bodyPr/>
+                    <a:lstStyle/>
+                    <a:p>
+                      <a:pPr algn="r" fontAlgn="b"/>
+                      <a:r>
+                        <a:rPr lang="nl-NL" sz="1800" u="none" strike="noStrike">
+                          <a:effectLst/>
+                        </a:rPr>
+                        <a:t>1,2561</a:t>
+                      </a:r>
+                      <a:endParaRPr lang="nl-NL" sz="1800" b="0" i="0" u="none" strike="noStrike">
+                        <a:solidFill>
+                          <a:srgbClr val="000000"/>
+                        </a:solidFill>
+                        <a:effectLst/>
+                        <a:latin typeface="Calibri" panose="020F0502020204030204" pitchFamily="34" charset="0"/>
+                      </a:endParaRPr>
+                    </a:p>
+                  </a:txBody>
+                  <a:tcPr marL="6350" marR="6350" marT="6350" marB="0" anchor="b"/>
+                </a:tc>
+                <a:tc>
+                  <a:txBody>
+                    <a:bodyPr/>
+                    <a:lstStyle/>
+                    <a:p>
+                      <a:pPr algn="r" fontAlgn="b"/>
+                      <a:r>
+                        <a:rPr lang="nl-NL" sz="1800" u="none" strike="noStrike">
+                          <a:effectLst/>
+                        </a:rPr>
+                        <a:t>1,7532</a:t>
+                      </a:r>
+                      <a:endParaRPr lang="nl-NL" sz="1800" b="0" i="0" u="none" strike="noStrike">
+                        <a:solidFill>
+                          <a:srgbClr val="000000"/>
+                        </a:solidFill>
+                        <a:effectLst/>
+                        <a:latin typeface="Calibri" panose="020F0502020204030204" pitchFamily="34" charset="0"/>
+                      </a:endParaRPr>
+                    </a:p>
+                  </a:txBody>
+                  <a:tcPr marL="6350" marR="6350" marT="6350" marB="0" anchor="b"/>
+                </a:tc>
+                <a:tc>
+                  <a:txBody>
+                    <a:bodyPr/>
+                    <a:lstStyle/>
+                    <a:p>
+                      <a:pPr algn="r" fontAlgn="b"/>
+                      <a:r>
+                        <a:rPr lang="nl-NL" sz="1800" u="none" strike="noStrike">
+                          <a:effectLst/>
+                        </a:rPr>
+                        <a:t>-22</a:t>
+                      </a:r>
+                      <a:endParaRPr lang="nl-NL" sz="1800" b="0" i="0" u="none" strike="noStrike">
+                        <a:solidFill>
+                          <a:srgbClr val="000000"/>
+                        </a:solidFill>
+                        <a:effectLst/>
+                        <a:latin typeface="Calibri" panose="020F0502020204030204" pitchFamily="34" charset="0"/>
+                      </a:endParaRPr>
+                    </a:p>
+                  </a:txBody>
+                  <a:tcPr marL="6350" marR="6350" marT="6350" marB="0" anchor="b"/>
+                </a:tc>
+                <a:extLst>
+                  <a:ext uri="{0D108BD9-81ED-4DB2-BD59-A6C34878D82A}">
+                    <a16:rowId xmlns:a16="http://schemas.microsoft.com/office/drawing/2014/main" val="4072588328"/>
+                  </a:ext>
+                </a:extLst>
+              </a:tr>
+              <a:tr h="298450">
+                <a:tc>
+                  <a:txBody>
+                    <a:bodyPr/>
+                    <a:lstStyle/>
+                    <a:p>
+                      <a:pPr algn="r" fontAlgn="b"/>
+                      <a:r>
+                        <a:rPr lang="nl-NL" sz="1800" u="none" strike="noStrike">
+                          <a:effectLst/>
+                        </a:rPr>
+                        <a:t>1,4329</a:t>
+                      </a:r>
+                      <a:endParaRPr lang="nl-NL" sz="1800" b="0" i="0" u="none" strike="noStrike">
+                        <a:solidFill>
+                          <a:srgbClr val="000000"/>
+                        </a:solidFill>
+                        <a:effectLst/>
+                        <a:latin typeface="Calibri" panose="020F0502020204030204" pitchFamily="34" charset="0"/>
+                      </a:endParaRPr>
+                    </a:p>
+                  </a:txBody>
+                  <a:tcPr marL="6350" marR="6350" marT="6350" marB="0" anchor="b"/>
+                </a:tc>
+                <a:tc>
+                  <a:txBody>
+                    <a:bodyPr/>
+                    <a:lstStyle/>
+                    <a:p>
+                      <a:pPr algn="r" fontAlgn="b"/>
+                      <a:r>
+                        <a:rPr lang="nl-NL" sz="1800" u="none" strike="noStrike">
+                          <a:effectLst/>
+                        </a:rPr>
+                        <a:t>1,2561</a:t>
+                      </a:r>
+                      <a:endParaRPr lang="nl-NL" sz="1800" b="0" i="0" u="none" strike="noStrike">
+                        <a:solidFill>
+                          <a:srgbClr val="000000"/>
+                        </a:solidFill>
+                        <a:effectLst/>
+                        <a:latin typeface="Calibri" panose="020F0502020204030204" pitchFamily="34" charset="0"/>
+                      </a:endParaRPr>
+                    </a:p>
+                  </a:txBody>
+                  <a:tcPr marL="6350" marR="6350" marT="6350" marB="0" anchor="b"/>
+                </a:tc>
+                <a:tc>
+                  <a:txBody>
+                    <a:bodyPr/>
+                    <a:lstStyle/>
+                    <a:p>
+                      <a:pPr algn="r" fontAlgn="b"/>
+                      <a:r>
+                        <a:rPr lang="nl-NL" sz="1800" u="none" strike="noStrike">
+                          <a:effectLst/>
+                        </a:rPr>
+                        <a:t>1,7532</a:t>
+                      </a:r>
+                      <a:endParaRPr lang="nl-NL" sz="1800" b="0" i="0" u="none" strike="noStrike">
+                        <a:solidFill>
+                          <a:srgbClr val="000000"/>
+                        </a:solidFill>
+                        <a:effectLst/>
+                        <a:latin typeface="Calibri" panose="020F0502020204030204" pitchFamily="34" charset="0"/>
+                      </a:endParaRPr>
+                    </a:p>
+                  </a:txBody>
+                  <a:tcPr marL="6350" marR="6350" marT="6350" marB="0" anchor="b"/>
+                </a:tc>
+                <a:tc>
+                  <a:txBody>
+                    <a:bodyPr/>
+                    <a:lstStyle/>
+                    <a:p>
+                      <a:pPr algn="r" fontAlgn="b"/>
+                      <a:r>
+                        <a:rPr lang="nl-NL" sz="1800" u="none" strike="noStrike">
+                          <a:effectLst/>
+                        </a:rPr>
+                        <a:t>-22</a:t>
+                      </a:r>
+                      <a:endParaRPr lang="nl-NL" sz="1800" b="0" i="0" u="none" strike="noStrike">
+                        <a:solidFill>
+                          <a:srgbClr val="000000"/>
+                        </a:solidFill>
+                        <a:effectLst/>
+                        <a:latin typeface="Calibri" panose="020F0502020204030204" pitchFamily="34" charset="0"/>
+                      </a:endParaRPr>
+                    </a:p>
+                  </a:txBody>
+                  <a:tcPr marL="6350" marR="6350" marT="6350" marB="0" anchor="b"/>
+                </a:tc>
+                <a:extLst>
+                  <a:ext uri="{0D108BD9-81ED-4DB2-BD59-A6C34878D82A}">
+                    <a16:rowId xmlns:a16="http://schemas.microsoft.com/office/drawing/2014/main" val="1955345377"/>
+                  </a:ext>
+                </a:extLst>
+              </a:tr>
+              <a:tr h="298450">
+                <a:tc>
+                  <a:txBody>
+                    <a:bodyPr/>
+                    <a:lstStyle/>
+                    <a:p>
+                      <a:pPr algn="r" fontAlgn="b"/>
+                      <a:r>
+                        <a:rPr lang="nl-NL" sz="1800" u="none" strike="noStrike">
+                          <a:effectLst/>
+                        </a:rPr>
+                        <a:t>1,413</a:t>
+                      </a:r>
+                      <a:endParaRPr lang="nl-NL" sz="1800" b="0" i="0" u="none" strike="noStrike">
+                        <a:solidFill>
+                          <a:srgbClr val="000000"/>
+                        </a:solidFill>
+                        <a:effectLst/>
+                        <a:latin typeface="Calibri" panose="020F0502020204030204" pitchFamily="34" charset="0"/>
+                      </a:endParaRPr>
+                    </a:p>
+                  </a:txBody>
+                  <a:tcPr marL="6350" marR="6350" marT="6350" marB="0" anchor="b"/>
+                </a:tc>
+                <a:tc>
+                  <a:txBody>
+                    <a:bodyPr/>
+                    <a:lstStyle/>
+                    <a:p>
+                      <a:pPr algn="r" fontAlgn="b"/>
+                      <a:r>
+                        <a:rPr lang="nl-NL" sz="1800" u="none" strike="noStrike">
+                          <a:effectLst/>
+                        </a:rPr>
+                        <a:t>1,2405</a:t>
+                      </a:r>
+                      <a:endParaRPr lang="nl-NL" sz="1800" b="0" i="0" u="none" strike="noStrike">
+                        <a:solidFill>
+                          <a:srgbClr val="000000"/>
+                        </a:solidFill>
+                        <a:effectLst/>
+                        <a:latin typeface="Calibri" panose="020F0502020204030204" pitchFamily="34" charset="0"/>
+                      </a:endParaRPr>
+                    </a:p>
+                  </a:txBody>
+                  <a:tcPr marL="6350" marR="6350" marT="6350" marB="0" anchor="b"/>
+                </a:tc>
+                <a:tc>
+                  <a:txBody>
+                    <a:bodyPr/>
+                    <a:lstStyle/>
+                    <a:p>
+                      <a:pPr algn="r" fontAlgn="b"/>
+                      <a:r>
+                        <a:rPr lang="nl-NL" sz="1800" u="none" strike="noStrike">
+                          <a:effectLst/>
+                        </a:rPr>
+                        <a:t>1,7382</a:t>
+                      </a:r>
+                      <a:endParaRPr lang="nl-NL" sz="1800" b="0" i="0" u="none" strike="noStrike">
+                        <a:solidFill>
+                          <a:srgbClr val="000000"/>
+                        </a:solidFill>
+                        <a:effectLst/>
+                        <a:latin typeface="Calibri" panose="020F0502020204030204" pitchFamily="34" charset="0"/>
+                      </a:endParaRPr>
+                    </a:p>
+                  </a:txBody>
+                  <a:tcPr marL="6350" marR="6350" marT="6350" marB="0" anchor="b"/>
+                </a:tc>
+                <a:tc>
+                  <a:txBody>
+                    <a:bodyPr/>
+                    <a:lstStyle/>
+                    <a:p>
+                      <a:pPr algn="r" fontAlgn="b"/>
+                      <a:r>
+                        <a:rPr lang="nl-NL" sz="1800" u="none" strike="noStrike">
+                          <a:effectLst/>
+                        </a:rPr>
+                        <a:t>-22</a:t>
+                      </a:r>
+                      <a:endParaRPr lang="nl-NL" sz="1800" b="0" i="0" u="none" strike="noStrike">
+                        <a:solidFill>
+                          <a:srgbClr val="000000"/>
+                        </a:solidFill>
+                        <a:effectLst/>
+                        <a:latin typeface="Calibri" panose="020F0502020204030204" pitchFamily="34" charset="0"/>
+                      </a:endParaRPr>
+                    </a:p>
+                  </a:txBody>
+                  <a:tcPr marL="6350" marR="6350" marT="6350" marB="0" anchor="b"/>
+                </a:tc>
+                <a:extLst>
+                  <a:ext uri="{0D108BD9-81ED-4DB2-BD59-A6C34878D82A}">
+                    <a16:rowId xmlns:a16="http://schemas.microsoft.com/office/drawing/2014/main" val="1435622470"/>
+                  </a:ext>
+                </a:extLst>
+              </a:tr>
+              <a:tr h="298450">
+                <a:tc>
+                  <a:txBody>
+                    <a:bodyPr/>
+                    <a:lstStyle/>
+                    <a:p>
+                      <a:pPr algn="r" fontAlgn="b"/>
+                      <a:r>
+                        <a:rPr lang="nl-NL" sz="1800" u="none" strike="noStrike">
+                          <a:effectLst/>
+                        </a:rPr>
+                        <a:t>1,413</a:t>
+                      </a:r>
+                      <a:endParaRPr lang="nl-NL" sz="1800" b="0" i="0" u="none" strike="noStrike">
+                        <a:solidFill>
+                          <a:srgbClr val="000000"/>
+                        </a:solidFill>
+                        <a:effectLst/>
+                        <a:latin typeface="Calibri" panose="020F0502020204030204" pitchFamily="34" charset="0"/>
+                      </a:endParaRPr>
+                    </a:p>
+                  </a:txBody>
+                  <a:tcPr marL="6350" marR="6350" marT="6350" marB="0" anchor="b"/>
+                </a:tc>
+                <a:tc>
+                  <a:txBody>
+                    <a:bodyPr/>
+                    <a:lstStyle/>
+                    <a:p>
+                      <a:pPr algn="r" fontAlgn="b"/>
+                      <a:r>
+                        <a:rPr lang="nl-NL" sz="1800" u="none" strike="noStrike">
+                          <a:effectLst/>
+                        </a:rPr>
+                        <a:t>1,2405</a:t>
+                      </a:r>
+                      <a:endParaRPr lang="nl-NL" sz="1800" b="0" i="0" u="none" strike="noStrike">
+                        <a:solidFill>
+                          <a:srgbClr val="000000"/>
+                        </a:solidFill>
+                        <a:effectLst/>
+                        <a:latin typeface="Calibri" panose="020F0502020204030204" pitchFamily="34" charset="0"/>
+                      </a:endParaRPr>
+                    </a:p>
+                  </a:txBody>
+                  <a:tcPr marL="6350" marR="6350" marT="6350" marB="0" anchor="b"/>
+                </a:tc>
+                <a:tc>
+                  <a:txBody>
+                    <a:bodyPr/>
+                    <a:lstStyle/>
+                    <a:p>
+                      <a:pPr algn="r" fontAlgn="b"/>
+                      <a:r>
+                        <a:rPr lang="nl-NL" sz="1800" u="none" strike="noStrike">
+                          <a:effectLst/>
+                        </a:rPr>
+                        <a:t>1,7382</a:t>
+                      </a:r>
+                      <a:endParaRPr lang="nl-NL" sz="1800" b="0" i="0" u="none" strike="noStrike">
+                        <a:solidFill>
+                          <a:srgbClr val="000000"/>
+                        </a:solidFill>
+                        <a:effectLst/>
+                        <a:latin typeface="Calibri" panose="020F0502020204030204" pitchFamily="34" charset="0"/>
+                      </a:endParaRPr>
+                    </a:p>
+                  </a:txBody>
+                  <a:tcPr marL="6350" marR="6350" marT="6350" marB="0" anchor="b"/>
+                </a:tc>
+                <a:tc>
+                  <a:txBody>
+                    <a:bodyPr/>
+                    <a:lstStyle/>
+                    <a:p>
+                      <a:pPr algn="r" fontAlgn="b"/>
+                      <a:r>
+                        <a:rPr lang="nl-NL" sz="1800" u="none" strike="noStrike" dirty="0">
+                          <a:effectLst/>
+                        </a:rPr>
+                        <a:t>-22</a:t>
+                      </a:r>
+                      <a:endParaRPr lang="nl-NL" sz="1800" b="0" i="0" u="none" strike="noStrike" dirty="0">
+                        <a:solidFill>
+                          <a:srgbClr val="000000"/>
+                        </a:solidFill>
+                        <a:effectLst/>
+                        <a:latin typeface="Calibri" panose="020F0502020204030204" pitchFamily="34" charset="0"/>
+                      </a:endParaRPr>
+                    </a:p>
+                  </a:txBody>
+                  <a:tcPr marL="6350" marR="6350" marT="6350" marB="0" anchor="b"/>
+                </a:tc>
+                <a:extLst>
+                  <a:ext uri="{0D108BD9-81ED-4DB2-BD59-A6C34878D82A}">
+                    <a16:rowId xmlns:a16="http://schemas.microsoft.com/office/drawing/2014/main" val="336906634"/>
+                  </a:ext>
+                </a:extLst>
+              </a:tr>
+            </a:tbl>
+          </a:graphicData>
+        </a:graphic>
+      </p:graphicFrame>
+      <p:sp>
+        <p:nvSpPr>
+          <p:cNvPr id="5" name="Ovaal 4">
+            <a:extLst>
+              <a:ext uri="{FF2B5EF4-FFF2-40B4-BE49-F238E27FC236}">
+                <a16:creationId xmlns:a16="http://schemas.microsoft.com/office/drawing/2014/main" id="{1A41B7C9-5A55-40D2-BD44-EB13A7D14DB4}"/>
               </a:ext>
             </a:extLst>
           </p:cNvPr>
@@ -4466,25 +6876,29 @@
         </p:nvSpPr>
         <p:spPr>
           <a:xfrm>
-            <a:off x="3245046" y="332852"/>
-            <a:ext cx="2006600" cy="977900"/>
+            <a:off x="345440" y="2997200"/>
+            <a:ext cx="2448560" cy="314960"/>
           </a:xfrm>
-          <a:prstGeom prst="flowChartProcess">
+          <a:prstGeom prst="ellipse">
             <a:avLst/>
           </a:prstGeom>
+          <a:noFill/>
+          <a:ln w="38100"/>
         </p:spPr>
         <p:style>
           <a:lnRef idx="2">
-            <a:schemeClr val="accent6"/>
+            <a:schemeClr val="accent1">
+              <a:shade val="50000"/>
+            </a:schemeClr>
           </a:lnRef>
           <a:fillRef idx="1">
-            <a:schemeClr val="lt1"/>
+            <a:schemeClr val="accent1"/>
           </a:fillRef>
           <a:effectRef idx="0">
-            <a:schemeClr val="accent6"/>
+            <a:schemeClr val="accent1"/>
           </a:effectRef>
           <a:fontRef idx="minor">
-            <a:schemeClr val="dk1"/>
+            <a:schemeClr val="lt1"/>
           </a:fontRef>
         </p:style>
         <p:txBody>
@@ -4492,19 +6906,16 @@
           <a:lstStyle/>
           <a:p>
             <a:pPr algn="ctr"/>
-            <a:r>
-              <a:rPr lang="nl-NL" dirty="0"/>
-              <a:t>Reken met nieuwe gewichtsfactoren</a:t>
-            </a:r>
-          </a:p>
-        </p:txBody>
-      </p:sp>
-      <p:sp>
-        <p:nvSpPr>
-          <p:cNvPr id="4" name="Stroomdiagram: Beslissing 3">
-            <a:extLst>
-              <a:ext uri="{FF2B5EF4-FFF2-40B4-BE49-F238E27FC236}">
-                <a16:creationId xmlns:a16="http://schemas.microsoft.com/office/drawing/2014/main" id="{8A5504F3-D4BC-4D10-A052-B9619A4DA4E9}"/>
+            <a:endParaRPr lang="nl-NL"/>
+          </a:p>
+        </p:txBody>
+      </p:sp>
+      <p:sp>
+        <p:nvSpPr>
+          <p:cNvPr id="6" name="Ovaal 5">
+            <a:extLst>
+              <a:ext uri="{FF2B5EF4-FFF2-40B4-BE49-F238E27FC236}">
+                <a16:creationId xmlns:a16="http://schemas.microsoft.com/office/drawing/2014/main" id="{5A68E8CC-0F67-402C-A8ED-05ACAAA75E9C}"/>
               </a:ext>
             </a:extLst>
           </p:cNvPr>
@@ -4513,25 +6924,29 @@
         </p:nvSpPr>
         <p:spPr>
           <a:xfrm>
-            <a:off x="4198063" y="5025062"/>
-            <a:ext cx="2286000" cy="1714500"/>
+            <a:off x="3088640" y="2997200"/>
+            <a:ext cx="1524000" cy="314960"/>
           </a:xfrm>
-          <a:prstGeom prst="flowChartDecision">
+          <a:prstGeom prst="ellipse">
             <a:avLst/>
           </a:prstGeom>
+          <a:noFill/>
+          <a:ln w="38100"/>
         </p:spPr>
         <p:style>
           <a:lnRef idx="2">
-            <a:schemeClr val="accent6"/>
+            <a:schemeClr val="accent1">
+              <a:shade val="50000"/>
+            </a:schemeClr>
           </a:lnRef>
           <a:fillRef idx="1">
-            <a:schemeClr val="lt1"/>
+            <a:schemeClr val="accent1"/>
           </a:fillRef>
           <a:effectRef idx="0">
-            <a:schemeClr val="accent6"/>
+            <a:schemeClr val="accent1"/>
           </a:effectRef>
           <a:fontRef idx="minor">
-            <a:schemeClr val="dk1"/>
+            <a:schemeClr val="lt1"/>
           </a:fontRef>
         </p:style>
         <p:txBody>
@@ -4539,38 +6954,73 @@
           <a:lstStyle/>
           <a:p>
             <a:pPr algn="ctr"/>
-            <a:r>
-              <a:rPr lang="nl-NL" dirty="0"/>
-              <a:t>Beter resultaat?</a:t>
-            </a:r>
-          </a:p>
-        </p:txBody>
-      </p:sp>
+            <a:endParaRPr lang="nl-NL"/>
+          </a:p>
+        </p:txBody>
+      </p:sp>
+      <p:pic>
+        <p:nvPicPr>
+          <p:cNvPr id="7" name="Afbeelding 6">
+            <a:extLst>
+              <a:ext uri="{FF2B5EF4-FFF2-40B4-BE49-F238E27FC236}">
+                <a16:creationId xmlns:a16="http://schemas.microsoft.com/office/drawing/2014/main" id="{43C8C3F9-0D6F-485F-8508-81D3F80C409B}"/>
+              </a:ext>
+            </a:extLst>
+          </p:cNvPr>
+          <p:cNvPicPr>
+            <a:picLocks noChangeAspect="1"/>
+          </p:cNvPicPr>
+          <p:nvPr/>
+        </p:nvPicPr>
+        <p:blipFill>
+          <a:blip r:embed="rId2">
+            <a:extLst>
+              <a:ext uri="{28A0092B-C50C-407E-A947-70E740481C1C}">
+                <a14:useLocalDpi xmlns:a14="http://schemas.microsoft.com/office/drawing/2010/main" val="0"/>
+              </a:ext>
+            </a:extLst>
+          </a:blip>
+          <a:stretch>
+            <a:fillRect/>
+          </a:stretch>
+        </p:blipFill>
+        <p:spPr>
+          <a:xfrm>
+            <a:off x="5030697" y="3553143"/>
+            <a:ext cx="3918402" cy="2421572"/>
+          </a:xfrm>
+          <a:prstGeom prst="rect">
+            <a:avLst/>
+          </a:prstGeom>
+          <a:ln>
+            <a:solidFill>
+              <a:schemeClr val="accent1"/>
+            </a:solidFill>
+          </a:ln>
+          <a:effectLst/>
+        </p:spPr>
+      </p:pic>
       <p:cxnSp>
         <p:nvCxnSpPr>
-          <p:cNvPr id="6" name="Rechte verbindingslijn met pijl 5">
-            <a:extLst>
-              <a:ext uri="{FF2B5EF4-FFF2-40B4-BE49-F238E27FC236}">
-                <a16:creationId xmlns:a16="http://schemas.microsoft.com/office/drawing/2014/main" id="{EBC96097-8CDA-4746-AD09-E0ECFA522A49}"/>
-              </a:ext>
-            </a:extLst>
-          </p:cNvPr>
-          <p:cNvCxnSpPr>
-            <a:cxnSpLocks/>
-            <a:stCxn id="4" idx="3"/>
-            <a:endCxn id="17" idx="1"/>
-          </p:cNvCxnSpPr>
+          <p:cNvPr id="9" name="Rechte verbindingslijn met pijl 8">
+            <a:extLst>
+              <a:ext uri="{FF2B5EF4-FFF2-40B4-BE49-F238E27FC236}">
+                <a16:creationId xmlns:a16="http://schemas.microsoft.com/office/drawing/2014/main" id="{9D1833C7-9698-4A21-BC7D-292821C940B2}"/>
+              </a:ext>
+            </a:extLst>
+          </p:cNvPr>
+          <p:cNvCxnSpPr/>
           <p:nvPr/>
         </p:nvCxnSpPr>
         <p:spPr>
-          <a:xfrm flipV="1">
-            <a:off x="6484063" y="5808690"/>
-            <a:ext cx="2024567" cy="73622"/>
+          <a:xfrm>
+            <a:off x="2286000" y="3312160"/>
+            <a:ext cx="2661920" cy="914400"/>
           </a:xfrm>
           <a:prstGeom prst="straightConnector1">
             <a:avLst/>
           </a:prstGeom>
-          <a:ln w="63500">
+          <a:ln w="50800">
             <a:tailEnd type="triangle"/>
           </a:ln>
         </p:spPr>
@@ -4591,30 +7041,28 @@
       </p:cxnSp>
       <p:cxnSp>
         <p:nvCxnSpPr>
-          <p:cNvPr id="7" name="Rechte verbindingslijn met pijl 6">
-            <a:extLst>
-              <a:ext uri="{FF2B5EF4-FFF2-40B4-BE49-F238E27FC236}">
-                <a16:creationId xmlns:a16="http://schemas.microsoft.com/office/drawing/2014/main" id="{60A25F6A-6C9C-4000-8A18-2C3D06FDF50E}"/>
+          <p:cNvPr id="10" name="Rechte verbindingslijn met pijl 9">
+            <a:extLst>
+              <a:ext uri="{FF2B5EF4-FFF2-40B4-BE49-F238E27FC236}">
+                <a16:creationId xmlns:a16="http://schemas.microsoft.com/office/drawing/2014/main" id="{23E0550A-90F5-48D3-96CD-94A9BE0F9CF2}"/>
               </a:ext>
             </a:extLst>
           </p:cNvPr>
           <p:cNvCxnSpPr>
             <a:cxnSpLocks/>
-            <a:stCxn id="4" idx="1"/>
-            <a:endCxn id="16" idx="3"/>
           </p:cNvCxnSpPr>
           <p:nvPr/>
         </p:nvCxnSpPr>
         <p:spPr>
-          <a:xfrm flipH="1">
-            <a:off x="3731777" y="5882312"/>
-            <a:ext cx="466286" cy="215634"/>
+          <a:xfrm flipV="1">
+            <a:off x="8949099" y="3518655"/>
+            <a:ext cx="1109301" cy="778390"/>
           </a:xfrm>
           <a:prstGeom prst="straightConnector1">
             <a:avLst/>
           </a:prstGeom>
-          <a:ln w="63500">
-            <a:tailEnd type="triangle"/>
+          <a:ln w="50800">
+            <a:tailEnd type="triangle" w="lg" len="lg"/>
           </a:ln>
         </p:spPr>
         <p:style>
@@ -4634,10 +7082,10 @@
       </p:cxnSp>
       <p:sp>
         <p:nvSpPr>
-          <p:cNvPr id="10" name="Tekstvak 9">
-            <a:extLst>
-              <a:ext uri="{FF2B5EF4-FFF2-40B4-BE49-F238E27FC236}">
-                <a16:creationId xmlns:a16="http://schemas.microsoft.com/office/drawing/2014/main" id="{1C7D93DE-AF49-4C83-87B9-0347E7AB12B7}"/>
+          <p:cNvPr id="13" name="Tekstvak 12">
+            <a:extLst>
+              <a:ext uri="{FF2B5EF4-FFF2-40B4-BE49-F238E27FC236}">
+                <a16:creationId xmlns:a16="http://schemas.microsoft.com/office/drawing/2014/main" id="{4806124A-78C3-4A25-BA29-A33D69BC1159}"/>
               </a:ext>
             </a:extLst>
           </p:cNvPr>
@@ -4646,13 +7094,15 @@
         </p:nvSpPr>
         <p:spPr>
           <a:xfrm>
-            <a:off x="7396322" y="5142668"/>
-            <a:ext cx="482600" cy="369331"/>
+            <a:off x="9163814" y="3102739"/>
+            <a:ext cx="2045970" cy="369332"/>
           </a:xfrm>
           <a:prstGeom prst="rect">
             <a:avLst/>
           </a:prstGeom>
-          <a:noFill/>
+          <a:solidFill>
+            <a:srgbClr val="FF0000"/>
+          </a:solidFill>
         </p:spPr>
         <p:txBody>
           <a:bodyPr wrap="square" rtlCol="0">
@@ -4661,279 +7111,37 @@
           <a:lstStyle/>
           <a:p>
             <a:r>
-              <a:rPr lang="nl-NL" dirty="0"/>
-              <a:t>ja</a:t>
-            </a:r>
-          </a:p>
-        </p:txBody>
-      </p:sp>
-      <p:sp>
-        <p:nvSpPr>
-          <p:cNvPr id="11" name="Tekstvak 10">
-            <a:extLst>
-              <a:ext uri="{FF2B5EF4-FFF2-40B4-BE49-F238E27FC236}">
-                <a16:creationId xmlns:a16="http://schemas.microsoft.com/office/drawing/2014/main" id="{24BF1C36-AAC4-4746-A44B-7C7CD57863FB}"/>
-              </a:ext>
-            </a:extLst>
-          </p:cNvPr>
-          <p:cNvSpPr txBox="1"/>
+              <a:rPr lang="nl-NL" b="1" dirty="0"/>
+              <a:t>Bereken verschil</a:t>
+            </a:r>
+          </a:p>
+        </p:txBody>
+      </p:sp>
+      <p:sp>
+        <p:nvSpPr>
+          <p:cNvPr id="14" name="Boog 13">
+            <a:extLst>
+              <a:ext uri="{FF2B5EF4-FFF2-40B4-BE49-F238E27FC236}">
+                <a16:creationId xmlns:a16="http://schemas.microsoft.com/office/drawing/2014/main" id="{C3820E60-7253-44FA-8B09-7A5CDB6C23D9}"/>
+              </a:ext>
+            </a:extLst>
+          </p:cNvPr>
+          <p:cNvSpPr/>
           <p:nvPr/>
         </p:nvSpPr>
         <p:spPr>
           <a:xfrm>
-            <a:off x="3301565" y="5007896"/>
-            <a:ext cx="860425" cy="369329"/>
+            <a:off x="4095798" y="2012315"/>
+            <a:ext cx="6296568" cy="2284730"/>
           </a:xfrm>
-          <a:prstGeom prst="rect">
-            <a:avLst/>
+          <a:prstGeom prst="arc">
+            <a:avLst>
+              <a:gd name="adj1" fmla="val 11001300"/>
+              <a:gd name="adj2" fmla="val 0"/>
+            </a:avLst>
           </a:prstGeom>
-          <a:noFill/>
-        </p:spPr>
-        <p:txBody>
-          <a:bodyPr wrap="square" rtlCol="0">
-            <a:spAutoFit/>
-          </a:bodyPr>
-          <a:lstStyle/>
-          <a:p>
-            <a:r>
-              <a:rPr lang="nl-NL" dirty="0"/>
-              <a:t>nee</a:t>
-            </a:r>
-          </a:p>
-        </p:txBody>
-      </p:sp>
-      <p:sp>
-        <p:nvSpPr>
-          <p:cNvPr id="12" name="Stroomdiagram: Gegevens 11">
-            <a:extLst>
-              <a:ext uri="{FF2B5EF4-FFF2-40B4-BE49-F238E27FC236}">
-                <a16:creationId xmlns:a16="http://schemas.microsoft.com/office/drawing/2014/main" id="{9C281F35-D601-44A1-BAC2-7FA90105636A}"/>
-              </a:ext>
-            </a:extLst>
-          </p:cNvPr>
-          <p:cNvSpPr/>
-          <p:nvPr/>
-        </p:nvSpPr>
-        <p:spPr>
-          <a:xfrm>
-            <a:off x="1635760" y="1902913"/>
-            <a:ext cx="2006600" cy="1628764"/>
-          </a:xfrm>
-          <a:prstGeom prst="flowChartInputOutput">
-            <a:avLst/>
-          </a:prstGeom>
-          <a:solidFill>
-            <a:schemeClr val="bg1"/>
-          </a:solidFill>
-        </p:spPr>
-        <p:style>
-          <a:lnRef idx="2">
-            <a:schemeClr val="accent1">
-              <a:shade val="50000"/>
-            </a:schemeClr>
-          </a:lnRef>
-          <a:fillRef idx="1">
-            <a:schemeClr val="accent1"/>
-          </a:fillRef>
-          <a:effectRef idx="0">
-            <a:schemeClr val="accent1"/>
-          </a:effectRef>
-          <a:fontRef idx="minor">
-            <a:schemeClr val="lt1"/>
-          </a:fontRef>
-        </p:style>
-        <p:txBody>
-          <a:bodyPr rtlCol="0" anchor="ctr"/>
-          <a:lstStyle/>
-          <a:p>
-            <a:pPr algn="ctr"/>
-            <a:r>
-              <a:rPr lang="nl-NL" dirty="0">
-                <a:solidFill>
-                  <a:schemeClr val="tx1"/>
-                </a:solidFill>
-              </a:rPr>
-              <a:t>Berekende </a:t>
-            </a:r>
-          </a:p>
-          <a:p>
-            <a:pPr algn="ctr"/>
-            <a:r>
-              <a:rPr lang="nl-NL" dirty="0">
-                <a:solidFill>
-                  <a:schemeClr val="tx1"/>
-                </a:solidFill>
-              </a:rPr>
-              <a:t>stuurhoek</a:t>
-            </a:r>
-          </a:p>
-        </p:txBody>
-      </p:sp>
-      <p:sp>
-        <p:nvSpPr>
-          <p:cNvPr id="13" name="Stroomdiagram: Gegevens 12">
-            <a:extLst>
-              <a:ext uri="{FF2B5EF4-FFF2-40B4-BE49-F238E27FC236}">
-                <a16:creationId xmlns:a16="http://schemas.microsoft.com/office/drawing/2014/main" id="{2D1793F6-D3F9-4D8F-B10E-3F5649D67E7C}"/>
-              </a:ext>
-            </a:extLst>
-          </p:cNvPr>
-          <p:cNvSpPr/>
-          <p:nvPr/>
-        </p:nvSpPr>
-        <p:spPr>
-          <a:xfrm>
-            <a:off x="9114616" y="2606664"/>
-            <a:ext cx="2006600" cy="1628764"/>
-          </a:xfrm>
-          <a:prstGeom prst="flowChartInputOutput">
-            <a:avLst/>
-          </a:prstGeom>
-          <a:solidFill>
-            <a:schemeClr val="bg1"/>
-          </a:solidFill>
-        </p:spPr>
-        <p:style>
-          <a:lnRef idx="2">
-            <a:schemeClr val="accent1">
-              <a:shade val="50000"/>
-            </a:schemeClr>
-          </a:lnRef>
-          <a:fillRef idx="1">
-            <a:schemeClr val="accent1"/>
-          </a:fillRef>
-          <a:effectRef idx="0">
-            <a:schemeClr val="accent1"/>
-          </a:effectRef>
-          <a:fontRef idx="minor">
-            <a:schemeClr val="lt1"/>
-          </a:fontRef>
-        </p:style>
-        <p:txBody>
-          <a:bodyPr rtlCol="0" anchor="ctr"/>
-          <a:lstStyle/>
-          <a:p>
-            <a:pPr algn="ctr"/>
-            <a:r>
-              <a:rPr lang="nl-NL" dirty="0">
-                <a:solidFill>
-                  <a:schemeClr val="tx1"/>
-                </a:solidFill>
-              </a:rPr>
-              <a:t>Stuurhoek</a:t>
-            </a:r>
-          </a:p>
-          <a:p>
-            <a:pPr algn="ctr"/>
-            <a:r>
-              <a:rPr lang="nl-NL" dirty="0">
-                <a:solidFill>
-                  <a:schemeClr val="tx1"/>
-                </a:solidFill>
-              </a:rPr>
-              <a:t>Set Training</a:t>
-            </a:r>
-          </a:p>
-        </p:txBody>
-      </p:sp>
-      <p:sp>
-        <p:nvSpPr>
-          <p:cNvPr id="14" name="Stroomdiagram: Gegevens 13">
-            <a:extLst>
-              <a:ext uri="{FF2B5EF4-FFF2-40B4-BE49-F238E27FC236}">
-                <a16:creationId xmlns:a16="http://schemas.microsoft.com/office/drawing/2014/main" id="{26A2316D-04C1-44FD-8211-0866BBFC914C}"/>
-              </a:ext>
-            </a:extLst>
-          </p:cNvPr>
-          <p:cNvSpPr/>
-          <p:nvPr/>
-        </p:nvSpPr>
-        <p:spPr>
-          <a:xfrm>
-            <a:off x="9315276" y="329944"/>
-            <a:ext cx="2235198" cy="1628764"/>
-          </a:xfrm>
-          <a:prstGeom prst="flowChartInputOutput">
-            <a:avLst/>
-          </a:prstGeom>
-          <a:solidFill>
-            <a:schemeClr val="bg1"/>
-          </a:solidFill>
-        </p:spPr>
-        <p:style>
-          <a:lnRef idx="2">
-            <a:schemeClr val="accent1">
-              <a:shade val="50000"/>
-            </a:schemeClr>
-          </a:lnRef>
-          <a:fillRef idx="1">
-            <a:schemeClr val="accent1"/>
-          </a:fillRef>
-          <a:effectRef idx="0">
-            <a:schemeClr val="accent1"/>
-          </a:effectRef>
-          <a:fontRef idx="minor">
-            <a:schemeClr val="lt1"/>
-          </a:fontRef>
-        </p:style>
-        <p:txBody>
-          <a:bodyPr rtlCol="0" anchor="ctr"/>
-          <a:lstStyle/>
-          <a:p>
-            <a:pPr algn="ctr"/>
-            <a:r>
-              <a:rPr lang="nl-NL" dirty="0">
-                <a:solidFill>
-                  <a:schemeClr val="tx1"/>
-                </a:solidFill>
-              </a:rPr>
-              <a:t>sonar</a:t>
-            </a:r>
-          </a:p>
-          <a:p>
-            <a:pPr algn="ctr"/>
-            <a:r>
-              <a:rPr lang="nl-NL" dirty="0" err="1">
-                <a:solidFill>
-                  <a:schemeClr val="tx1"/>
-                </a:solidFill>
-              </a:rPr>
-              <a:t>trainingsset</a:t>
-            </a:r>
-            <a:endParaRPr lang="nl-NL" dirty="0">
-              <a:solidFill>
-                <a:schemeClr val="tx1"/>
-              </a:solidFill>
-            </a:endParaRPr>
-          </a:p>
-        </p:txBody>
-      </p:sp>
-      <p:cxnSp>
-        <p:nvCxnSpPr>
-          <p:cNvPr id="15" name="Rechte verbindingslijn met pijl 14">
-            <a:extLst>
-              <a:ext uri="{FF2B5EF4-FFF2-40B4-BE49-F238E27FC236}">
-                <a16:creationId xmlns:a16="http://schemas.microsoft.com/office/drawing/2014/main" id="{DAD226EA-C7A5-4AC3-A9E6-316299D02883}"/>
-              </a:ext>
-            </a:extLst>
-          </p:cNvPr>
-          <p:cNvCxnSpPr>
-            <a:cxnSpLocks/>
-            <a:stCxn id="14" idx="2"/>
-            <a:endCxn id="21" idx="3"/>
-          </p:cNvCxnSpPr>
-          <p:nvPr/>
-        </p:nvCxnSpPr>
-        <p:spPr>
-          <a:xfrm flipH="1" flipV="1">
-            <a:off x="8018463" y="991825"/>
-            <a:ext cx="1520333" cy="152501"/>
-          </a:xfrm>
-          <a:prstGeom prst="straightConnector1">
-            <a:avLst/>
-          </a:prstGeom>
-          <a:ln w="63500">
-            <a:tailEnd type="triangle"/>
+          <a:ln w="50800">
+            <a:tailEnd type="stealth" w="lg" len="lg"/>
           </a:ln>
         </p:spPr>
         <p:style>
@@ -4950,498 +7158,142 @@
             <a:schemeClr val="tx1"/>
           </a:fontRef>
         </p:style>
-      </p:cxnSp>
-      <p:cxnSp>
-        <p:nvCxnSpPr>
-          <p:cNvPr id="19" name="Rechte verbindingslijn met pijl 18">
-            <a:extLst>
-              <a:ext uri="{FF2B5EF4-FFF2-40B4-BE49-F238E27FC236}">
-                <a16:creationId xmlns:a16="http://schemas.microsoft.com/office/drawing/2014/main" id="{21C21419-5533-4E69-A61F-AF7222878AAE}"/>
-              </a:ext>
-            </a:extLst>
-          </p:cNvPr>
-          <p:cNvCxnSpPr>
-            <a:cxnSpLocks/>
-            <a:stCxn id="3" idx="2"/>
-            <a:endCxn id="12" idx="0"/>
-          </p:cNvCxnSpPr>
+        <p:txBody>
+          <a:bodyPr rtlCol="0" anchor="ctr"/>
+          <a:lstStyle/>
+          <a:p>
+            <a:pPr algn="ctr"/>
+            <a:endParaRPr lang="nl-NL"/>
+          </a:p>
+        </p:txBody>
+      </p:sp>
+      <p:sp>
+        <p:nvSpPr>
+          <p:cNvPr id="15" name="Tekstvak 14">
+            <a:extLst>
+              <a:ext uri="{FF2B5EF4-FFF2-40B4-BE49-F238E27FC236}">
+                <a16:creationId xmlns:a16="http://schemas.microsoft.com/office/drawing/2014/main" id="{C8BC4C5A-6031-49ED-BEA4-90A5912F53B5}"/>
+              </a:ext>
+            </a:extLst>
+          </p:cNvPr>
+          <p:cNvSpPr txBox="1"/>
           <p:nvPr/>
-        </p:nvCxnSpPr>
+        </p:nvSpPr>
         <p:spPr>
-          <a:xfrm flipH="1">
-            <a:off x="2839720" y="1310752"/>
-            <a:ext cx="1408626" cy="592161"/>
+          <a:xfrm>
+            <a:off x="3283159" y="2299156"/>
+            <a:ext cx="916731" cy="461665"/>
           </a:xfrm>
-          <a:prstGeom prst="straightConnector1">
+          <a:prstGeom prst="rect">
             <a:avLst/>
           </a:prstGeom>
-          <a:ln w="63500">
-            <a:tailEnd type="triangle"/>
-          </a:ln>
+          <a:solidFill>
+            <a:srgbClr val="FF0000"/>
+          </a:solidFill>
         </p:spPr>
-        <p:style>
-          <a:lnRef idx="1">
-            <a:schemeClr val="accent1"/>
-          </a:lnRef>
-          <a:fillRef idx="0">
-            <a:schemeClr val="accent1"/>
-          </a:fillRef>
-          <a:effectRef idx="0">
-            <a:schemeClr val="accent1"/>
-          </a:effectRef>
-          <a:fontRef idx="minor">
-            <a:schemeClr val="tx1"/>
-          </a:fontRef>
-        </p:style>
-      </p:cxnSp>
-      <p:cxnSp>
-        <p:nvCxnSpPr>
-          <p:cNvPr id="22" name="Rechte verbindingslijn met pijl 21">
-            <a:extLst>
-              <a:ext uri="{FF2B5EF4-FFF2-40B4-BE49-F238E27FC236}">
-                <a16:creationId xmlns:a16="http://schemas.microsoft.com/office/drawing/2014/main" id="{974022EF-0F1C-4B9A-8431-BC21B4D768AC}"/>
-              </a:ext>
-            </a:extLst>
-          </p:cNvPr>
-          <p:cNvCxnSpPr>
-            <a:cxnSpLocks/>
-            <a:stCxn id="12" idx="3"/>
-            <a:endCxn id="4" idx="0"/>
-          </p:cNvCxnSpPr>
+        <p:txBody>
+          <a:bodyPr wrap="square" rtlCol="0">
+            <a:spAutoFit/>
+          </a:bodyPr>
+          <a:lstStyle/>
+          <a:p>
+            <a:r>
+              <a:rPr lang="nl-NL" sz="2400" b="1" dirty="0"/>
+              <a:t>Label</a:t>
+            </a:r>
+          </a:p>
+        </p:txBody>
+      </p:sp>
+      <p:sp>
+        <p:nvSpPr>
+          <p:cNvPr id="17" name="Tekstvak 16">
+            <a:extLst>
+              <a:ext uri="{FF2B5EF4-FFF2-40B4-BE49-F238E27FC236}">
+                <a16:creationId xmlns:a16="http://schemas.microsoft.com/office/drawing/2014/main" id="{8170B72C-79FB-4402-9EF0-773FC66747AE}"/>
+              </a:ext>
+            </a:extLst>
+          </p:cNvPr>
+          <p:cNvSpPr txBox="1"/>
           <p:nvPr/>
-        </p:nvCxnSpPr>
+        </p:nvSpPr>
         <p:spPr>
           <a:xfrm>
-            <a:off x="2438400" y="3531677"/>
-            <a:ext cx="2902663" cy="1493385"/>
+            <a:off x="6249718" y="2630914"/>
+            <a:ext cx="1835275" cy="830997"/>
           </a:xfrm>
-          <a:prstGeom prst="straightConnector1">
+          <a:prstGeom prst="rect">
             <a:avLst/>
           </a:prstGeom>
-          <a:ln w="63500">
-            <a:tailEnd type="triangle"/>
-          </a:ln>
+          <a:solidFill>
+            <a:srgbClr val="FF0000"/>
+          </a:solidFill>
         </p:spPr>
-        <p:style>
-          <a:lnRef idx="1">
-            <a:schemeClr val="accent1"/>
-          </a:lnRef>
-          <a:fillRef idx="0">
-            <a:schemeClr val="accent1"/>
-          </a:fillRef>
-          <a:effectRef idx="0">
-            <a:schemeClr val="accent1"/>
-          </a:effectRef>
-          <a:fontRef idx="minor">
-            <a:schemeClr val="tx1"/>
-          </a:fontRef>
-        </p:style>
-      </p:cxnSp>
-      <p:cxnSp>
-        <p:nvCxnSpPr>
-          <p:cNvPr id="25" name="Rechte verbindingslijn met pijl 24">
-            <a:extLst>
-              <a:ext uri="{FF2B5EF4-FFF2-40B4-BE49-F238E27FC236}">
-                <a16:creationId xmlns:a16="http://schemas.microsoft.com/office/drawing/2014/main" id="{97F5BA44-DFD9-43A4-82CC-8728875ADA2D}"/>
-              </a:ext>
-            </a:extLst>
-          </p:cNvPr>
-          <p:cNvCxnSpPr>
-            <a:cxnSpLocks/>
-            <a:stCxn id="91" idx="3"/>
-            <a:endCxn id="4" idx="0"/>
-          </p:cNvCxnSpPr>
+        <p:txBody>
+          <a:bodyPr wrap="square" rtlCol="0">
+            <a:spAutoFit/>
+          </a:bodyPr>
+          <a:lstStyle/>
+          <a:p>
+            <a:r>
+              <a:rPr lang="nl-NL" sz="2400" b="1" dirty="0"/>
+              <a:t>Neuraal netwerk</a:t>
+            </a:r>
+          </a:p>
+        </p:txBody>
+      </p:sp>
+      <p:sp>
+        <p:nvSpPr>
+          <p:cNvPr id="18" name="Tekstvak 17">
+            <a:extLst>
+              <a:ext uri="{FF2B5EF4-FFF2-40B4-BE49-F238E27FC236}">
+                <a16:creationId xmlns:a16="http://schemas.microsoft.com/office/drawing/2014/main" id="{508A3586-2205-423D-9E0F-9840DB5A8B0B}"/>
+              </a:ext>
+            </a:extLst>
+          </p:cNvPr>
+          <p:cNvSpPr txBox="1"/>
           <p:nvPr/>
-        </p:nvCxnSpPr>
+        </p:nvSpPr>
         <p:spPr>
           <a:xfrm>
-            <a:off x="4592051" y="3830855"/>
-            <a:ext cx="749012" cy="1194207"/>
+            <a:off x="900743" y="2194540"/>
+            <a:ext cx="916731" cy="461665"/>
           </a:xfrm>
-          <a:prstGeom prst="straightConnector1">
+          <a:prstGeom prst="rect">
             <a:avLst/>
           </a:prstGeom>
-          <a:ln w="63500">
-            <a:tailEnd type="triangle"/>
-          </a:ln>
+          <a:solidFill>
+            <a:srgbClr val="FF0000"/>
+          </a:solidFill>
         </p:spPr>
-        <p:style>
-          <a:lnRef idx="1">
-            <a:schemeClr val="accent1"/>
-          </a:lnRef>
-          <a:fillRef idx="0">
-            <a:schemeClr val="accent1"/>
-          </a:fillRef>
-          <a:effectRef idx="0">
-            <a:schemeClr val="accent1"/>
-          </a:effectRef>
-          <a:fontRef idx="minor">
-            <a:schemeClr val="tx1"/>
-          </a:fontRef>
-        </p:style>
-      </p:cxnSp>
-      <p:sp>
-        <p:nvSpPr>
-          <p:cNvPr id="16" name="Stroomdiagram: Proces 15">
-            <a:extLst>
-              <a:ext uri="{FF2B5EF4-FFF2-40B4-BE49-F238E27FC236}">
-                <a16:creationId xmlns:a16="http://schemas.microsoft.com/office/drawing/2014/main" id="{43244513-258D-4E1F-B1B9-69EF5C4D28DB}"/>
-              </a:ext>
-            </a:extLst>
-          </p:cNvPr>
-          <p:cNvSpPr/>
+        <p:txBody>
+          <a:bodyPr wrap="square" rtlCol="0">
+            <a:spAutoFit/>
+          </a:bodyPr>
+          <a:lstStyle/>
+          <a:p>
+            <a:r>
+              <a:rPr lang="nl-NL" sz="2400" b="1" dirty="0"/>
+              <a:t>Input</a:t>
+            </a:r>
+          </a:p>
+        </p:txBody>
+      </p:sp>
+      <p:sp>
+        <p:nvSpPr>
+          <p:cNvPr id="21" name="Tekstvak 20">
+            <a:extLst>
+              <a:ext uri="{FF2B5EF4-FFF2-40B4-BE49-F238E27FC236}">
+                <a16:creationId xmlns:a16="http://schemas.microsoft.com/office/drawing/2014/main" id="{C3F5BA3A-8C66-4CA3-9BBA-2E46C67781C5}"/>
+              </a:ext>
+            </a:extLst>
+          </p:cNvPr>
+          <p:cNvSpPr txBox="1"/>
           <p:nvPr/>
         </p:nvSpPr>
         <p:spPr>
           <a:xfrm>
-            <a:off x="1725177" y="5547248"/>
-            <a:ext cx="2006600" cy="1101396"/>
-          </a:xfrm>
-          <a:prstGeom prst="flowChartProcess">
-            <a:avLst/>
-          </a:prstGeom>
-        </p:spPr>
-        <p:style>
-          <a:lnRef idx="2">
-            <a:schemeClr val="accent6"/>
-          </a:lnRef>
-          <a:fillRef idx="1">
-            <a:schemeClr val="lt1"/>
-          </a:fillRef>
-          <a:effectRef idx="0">
-            <a:schemeClr val="accent6"/>
-          </a:effectRef>
-          <a:fontRef idx="minor">
-            <a:schemeClr val="dk1"/>
-          </a:fontRef>
-        </p:style>
-        <p:txBody>
-          <a:bodyPr rtlCol="0" anchor="ctr"/>
-          <a:lstStyle/>
-          <a:p>
-            <a:pPr algn="ctr"/>
-            <a:r>
-              <a:rPr lang="nl-NL" dirty="0"/>
-              <a:t>Pas gewichtsfactoren in </a:t>
-            </a:r>
-            <a:r>
-              <a:rPr lang="nl-NL" u="sng" dirty="0"/>
-              <a:t>ene</a:t>
-            </a:r>
-            <a:r>
-              <a:rPr lang="nl-NL" dirty="0"/>
-              <a:t> richting af</a:t>
-            </a:r>
-          </a:p>
-          <a:p>
-            <a:pPr algn="ctr"/>
-            <a:endParaRPr lang="nl-NL" dirty="0"/>
-          </a:p>
-        </p:txBody>
-      </p:sp>
-      <p:sp>
-        <p:nvSpPr>
-          <p:cNvPr id="17" name="Stroomdiagram: Proces 16">
-            <a:extLst>
-              <a:ext uri="{FF2B5EF4-FFF2-40B4-BE49-F238E27FC236}">
-                <a16:creationId xmlns:a16="http://schemas.microsoft.com/office/drawing/2014/main" id="{D4172E3A-2B14-4B42-BC99-6D84450BEF9B}"/>
-              </a:ext>
-            </a:extLst>
-          </p:cNvPr>
-          <p:cNvSpPr/>
-          <p:nvPr/>
-        </p:nvSpPr>
-        <p:spPr>
-          <a:xfrm>
-            <a:off x="8508630" y="5257991"/>
-            <a:ext cx="2006600" cy="1101397"/>
-          </a:xfrm>
-          <a:prstGeom prst="flowChartProcess">
-            <a:avLst/>
-          </a:prstGeom>
-        </p:spPr>
-        <p:style>
-          <a:lnRef idx="2">
-            <a:schemeClr val="accent6"/>
-          </a:lnRef>
-          <a:fillRef idx="1">
-            <a:schemeClr val="lt1"/>
-          </a:fillRef>
-          <a:effectRef idx="0">
-            <a:schemeClr val="accent6"/>
-          </a:effectRef>
-          <a:fontRef idx="minor">
-            <a:schemeClr val="dk1"/>
-          </a:fontRef>
-        </p:style>
-        <p:txBody>
-          <a:bodyPr rtlCol="0" anchor="ctr"/>
-          <a:lstStyle/>
-          <a:p>
-            <a:pPr algn="ctr"/>
-            <a:r>
-              <a:rPr lang="nl-NL" dirty="0"/>
-              <a:t>Pas gewichtsfactoren in </a:t>
-            </a:r>
-            <a:r>
-              <a:rPr lang="nl-NL" u="sng" dirty="0"/>
-              <a:t>andere</a:t>
-            </a:r>
-            <a:r>
-              <a:rPr lang="nl-NL" dirty="0"/>
-              <a:t> richting af</a:t>
-            </a:r>
-          </a:p>
-          <a:p>
-            <a:pPr algn="ctr"/>
-            <a:endParaRPr lang="nl-NL" dirty="0"/>
-          </a:p>
-        </p:txBody>
-      </p:sp>
-      <p:sp>
-        <p:nvSpPr>
-          <p:cNvPr id="21" name="Stroomdiagram: Proces 20">
-            <a:extLst>
-              <a:ext uri="{FF2B5EF4-FFF2-40B4-BE49-F238E27FC236}">
-                <a16:creationId xmlns:a16="http://schemas.microsoft.com/office/drawing/2014/main" id="{9EC709CC-15CC-473B-9D51-06A4D1AC8923}"/>
-              </a:ext>
-            </a:extLst>
-          </p:cNvPr>
-          <p:cNvSpPr/>
-          <p:nvPr/>
-        </p:nvSpPr>
-        <p:spPr>
-          <a:xfrm>
-            <a:off x="6011863" y="502875"/>
-            <a:ext cx="2006600" cy="977900"/>
-          </a:xfrm>
-          <a:prstGeom prst="flowChartProcess">
-            <a:avLst/>
-          </a:prstGeom>
-        </p:spPr>
-        <p:style>
-          <a:lnRef idx="2">
-            <a:schemeClr val="accent6"/>
-          </a:lnRef>
-          <a:fillRef idx="1">
-            <a:schemeClr val="lt1"/>
-          </a:fillRef>
-          <a:effectRef idx="0">
-            <a:schemeClr val="accent6"/>
-          </a:effectRef>
-          <a:fontRef idx="minor">
-            <a:schemeClr val="dk1"/>
-          </a:fontRef>
-        </p:style>
-        <p:txBody>
-          <a:bodyPr rtlCol="0" anchor="ctr"/>
-          <a:lstStyle/>
-          <a:p>
-            <a:pPr algn="ctr"/>
-            <a:r>
-              <a:rPr lang="nl-NL" dirty="0"/>
-              <a:t>3 sonarwaardes uit </a:t>
-            </a:r>
-            <a:r>
-              <a:rPr lang="nl-NL" dirty="0" err="1"/>
-              <a:t>trainingsset</a:t>
-            </a:r>
-            <a:endParaRPr lang="nl-NL" dirty="0"/>
-          </a:p>
-          <a:p>
-            <a:pPr algn="ctr"/>
-            <a:endParaRPr lang="nl-NL" dirty="0"/>
-          </a:p>
-        </p:txBody>
-      </p:sp>
-      <p:cxnSp>
-        <p:nvCxnSpPr>
-          <p:cNvPr id="24" name="Rechte verbindingslijn met pijl 23">
-            <a:extLst>
-              <a:ext uri="{FF2B5EF4-FFF2-40B4-BE49-F238E27FC236}">
-                <a16:creationId xmlns:a16="http://schemas.microsoft.com/office/drawing/2014/main" id="{86F86A8A-2FDD-46AF-BC9B-937F78402C58}"/>
-              </a:ext>
-            </a:extLst>
-          </p:cNvPr>
-          <p:cNvCxnSpPr>
-            <a:cxnSpLocks/>
-            <a:stCxn id="21" idx="1"/>
-            <a:endCxn id="3" idx="3"/>
-          </p:cNvCxnSpPr>
-          <p:nvPr/>
-        </p:nvCxnSpPr>
-        <p:spPr>
-          <a:xfrm flipH="1" flipV="1">
-            <a:off x="5251646" y="821802"/>
-            <a:ext cx="760217" cy="170023"/>
-          </a:xfrm>
-          <a:prstGeom prst="straightConnector1">
-            <a:avLst/>
-          </a:prstGeom>
-          <a:ln w="63500">
-            <a:tailEnd type="triangle"/>
-          </a:ln>
-        </p:spPr>
-        <p:style>
-          <a:lnRef idx="1">
-            <a:schemeClr val="accent1"/>
-          </a:lnRef>
-          <a:fillRef idx="0">
-            <a:schemeClr val="accent1"/>
-          </a:fillRef>
-          <a:effectRef idx="0">
-            <a:schemeClr val="accent1"/>
-          </a:effectRef>
-          <a:fontRef idx="minor">
-            <a:schemeClr val="tx1"/>
-          </a:fontRef>
-        </p:style>
-      </p:cxnSp>
-      <p:cxnSp>
-        <p:nvCxnSpPr>
-          <p:cNvPr id="41" name="Rechte verbindingslijn met pijl 40">
-            <a:extLst>
-              <a:ext uri="{FF2B5EF4-FFF2-40B4-BE49-F238E27FC236}">
-                <a16:creationId xmlns:a16="http://schemas.microsoft.com/office/drawing/2014/main" id="{4FBA68BD-2C8B-43B1-BEA4-C9B9FE15940B}"/>
-              </a:ext>
-            </a:extLst>
-          </p:cNvPr>
-          <p:cNvCxnSpPr>
-            <a:cxnSpLocks/>
-            <a:stCxn id="13" idx="2"/>
-            <a:endCxn id="91" idx="5"/>
-          </p:cNvCxnSpPr>
-          <p:nvPr/>
-        </p:nvCxnSpPr>
-        <p:spPr>
-          <a:xfrm flipH="1" flipV="1">
-            <a:off x="5545888" y="3096699"/>
-            <a:ext cx="3769388" cy="324347"/>
-          </a:xfrm>
-          <a:prstGeom prst="straightConnector1">
-            <a:avLst/>
-          </a:prstGeom>
-          <a:ln w="63500">
-            <a:tailEnd type="triangle"/>
-          </a:ln>
-        </p:spPr>
-        <p:style>
-          <a:lnRef idx="1">
-            <a:schemeClr val="accent1"/>
-          </a:lnRef>
-          <a:fillRef idx="0">
-            <a:schemeClr val="accent1"/>
-          </a:fillRef>
-          <a:effectRef idx="0">
-            <a:schemeClr val="accent1"/>
-          </a:effectRef>
-          <a:fontRef idx="minor">
-            <a:schemeClr val="tx1"/>
-          </a:fontRef>
-        </p:style>
-      </p:cxnSp>
-      <p:cxnSp>
-        <p:nvCxnSpPr>
-          <p:cNvPr id="66" name="Rechte verbindingslijn met pijl 65">
-            <a:extLst>
-              <a:ext uri="{FF2B5EF4-FFF2-40B4-BE49-F238E27FC236}">
-                <a16:creationId xmlns:a16="http://schemas.microsoft.com/office/drawing/2014/main" id="{73C26EA3-8EE1-4691-9CBC-1CBA028B9316}"/>
-              </a:ext>
-            </a:extLst>
-          </p:cNvPr>
-          <p:cNvCxnSpPr>
-            <a:cxnSpLocks/>
-            <a:stCxn id="16" idx="0"/>
-            <a:endCxn id="3" idx="2"/>
-          </p:cNvCxnSpPr>
-          <p:nvPr/>
-        </p:nvCxnSpPr>
-        <p:spPr>
-          <a:xfrm flipV="1">
-            <a:off x="2728477" y="1310752"/>
-            <a:ext cx="1519869" cy="4236496"/>
-          </a:xfrm>
-          <a:prstGeom prst="straightConnector1">
-            <a:avLst/>
-          </a:prstGeom>
-          <a:ln w="63500">
-            <a:tailEnd type="triangle"/>
-          </a:ln>
-        </p:spPr>
-        <p:style>
-          <a:lnRef idx="1">
-            <a:schemeClr val="accent1"/>
-          </a:lnRef>
-          <a:fillRef idx="0">
-            <a:schemeClr val="accent1"/>
-          </a:fillRef>
-          <a:effectRef idx="0">
-            <a:schemeClr val="accent1"/>
-          </a:effectRef>
-          <a:fontRef idx="minor">
-            <a:schemeClr val="tx1"/>
-          </a:fontRef>
-        </p:style>
-      </p:cxnSp>
-      <p:cxnSp>
-        <p:nvCxnSpPr>
-          <p:cNvPr id="69" name="Rechte verbindingslijn met pijl 68">
-            <a:extLst>
-              <a:ext uri="{FF2B5EF4-FFF2-40B4-BE49-F238E27FC236}">
-                <a16:creationId xmlns:a16="http://schemas.microsoft.com/office/drawing/2014/main" id="{67C14B19-C553-4DE0-BBC8-25A4C0764DB0}"/>
-              </a:ext>
-            </a:extLst>
-          </p:cNvPr>
-          <p:cNvCxnSpPr>
-            <a:cxnSpLocks/>
-            <a:stCxn id="17" idx="0"/>
-            <a:endCxn id="3" idx="2"/>
-          </p:cNvCxnSpPr>
-          <p:nvPr/>
-        </p:nvCxnSpPr>
-        <p:spPr>
-          <a:xfrm flipH="1" flipV="1">
-            <a:off x="4248346" y="1310752"/>
-            <a:ext cx="5263584" cy="3947239"/>
-          </a:xfrm>
-          <a:prstGeom prst="straightConnector1">
-            <a:avLst/>
-          </a:prstGeom>
-          <a:ln w="63500">
-            <a:tailEnd type="triangle"/>
-          </a:ln>
-        </p:spPr>
-        <p:style>
-          <a:lnRef idx="1">
-            <a:schemeClr val="accent1"/>
-          </a:lnRef>
-          <a:fillRef idx="0">
-            <a:schemeClr val="accent1"/>
-          </a:fillRef>
-          <a:effectRef idx="0">
-            <a:schemeClr val="accent1"/>
-          </a:effectRef>
-          <a:fontRef idx="minor">
-            <a:schemeClr val="tx1"/>
-          </a:fontRef>
-        </p:style>
-      </p:cxnSp>
-      <p:sp>
-        <p:nvSpPr>
-          <p:cNvPr id="84" name="Tekstvak 83">
-            <a:extLst>
-              <a:ext uri="{FF2B5EF4-FFF2-40B4-BE49-F238E27FC236}">
-                <a16:creationId xmlns:a16="http://schemas.microsoft.com/office/drawing/2014/main" id="{C3DADC57-9460-4866-9B4C-A102C3CE9564}"/>
-              </a:ext>
-            </a:extLst>
-          </p:cNvPr>
-          <p:cNvSpPr txBox="1"/>
-          <p:nvPr/>
-        </p:nvSpPr>
-        <p:spPr>
-          <a:xfrm>
-            <a:off x="1926387" y="421531"/>
-            <a:ext cx="1115996" cy="646331"/>
+            <a:off x="1249680" y="1554480"/>
+            <a:ext cx="2326640" cy="369332"/>
           </a:xfrm>
           <a:prstGeom prst="rect">
             <a:avLst/>
@@ -5456,25 +7308,92 @@
           <a:p>
             <a:r>
               <a:rPr lang="nl-NL" dirty="0" err="1"/>
-              <a:t>Hidden</a:t>
+              <a:t>Trainingset</a:t>
             </a:r>
             <a:endParaRPr lang="nl-NL" dirty="0"/>
           </a:p>
-          <a:p>
+        </p:txBody>
+      </p:sp>
+    </p:spTree>
+    <p:extLst>
+      <p:ext uri="{BB962C8B-B14F-4D97-AF65-F5344CB8AC3E}">
+        <p14:creationId xmlns:p14="http://schemas.microsoft.com/office/powerpoint/2010/main" val="13390395"/>
+      </p:ext>
+    </p:extLst>
+  </p:cSld>
+  <p:clrMapOvr>
+    <a:masterClrMapping/>
+  </p:clrMapOvr>
+</p:sld>
+</file>
+
+<file path=ppt/slides/slide7.xml><?xml version="1.0" encoding="utf-8"?>
+<p:sld xmlns:a="http://schemas.openxmlformats.org/drawingml/2006/main" xmlns:r="http://schemas.openxmlformats.org/officeDocument/2006/relationships" xmlns:p="http://schemas.openxmlformats.org/presentationml/2006/main">
+  <p:cSld>
+    <p:spTree>
+      <p:nvGrpSpPr>
+        <p:cNvPr id="1" name=""/>
+        <p:cNvGrpSpPr/>
+        <p:nvPr/>
+      </p:nvGrpSpPr>
+      <p:grpSpPr>
+        <a:xfrm>
+          <a:off x="0" y="0"/>
+          <a:ext cx="0" cy="0"/>
+          <a:chOff x="0" y="0"/>
+          <a:chExt cx="0" cy="0"/>
+        </a:xfrm>
+      </p:grpSpPr>
+      <p:sp>
+        <p:nvSpPr>
+          <p:cNvPr id="2" name="Titel 1">
+            <a:extLst>
+              <a:ext uri="{FF2B5EF4-FFF2-40B4-BE49-F238E27FC236}">
+                <a16:creationId xmlns:a16="http://schemas.microsoft.com/office/drawing/2014/main" id="{2C6D5BED-C802-4B1F-A07B-063E9A9229C3}"/>
+              </a:ext>
+            </a:extLst>
+          </p:cNvPr>
+          <p:cNvSpPr>
+            <a:spLocks noGrp="1"/>
+          </p:cNvSpPr>
+          <p:nvPr>
+            <p:ph type="title"/>
+          </p:nvPr>
+        </p:nvSpPr>
+        <p:spPr/>
+        <p:txBody>
+          <a:bodyPr/>
+          <a:lstStyle/>
+          <a:p>
+            <a:r>
+              <a:rPr lang="nl-NL" dirty="0"/>
+              <a:t>Tensorflow en </a:t>
+            </a:r>
             <a:r>
               <a:rPr lang="nl-NL" dirty="0" err="1"/>
-              <a:t>layers</a:t>
-            </a:r>
-            <a:endParaRPr lang="nl-NL" dirty="0"/>
-          </a:p>
-        </p:txBody>
-      </p:sp>
-      <p:sp>
-        <p:nvSpPr>
-          <p:cNvPr id="85" name="Tekstvak 84">
-            <a:extLst>
-              <a:ext uri="{FF2B5EF4-FFF2-40B4-BE49-F238E27FC236}">
-                <a16:creationId xmlns:a16="http://schemas.microsoft.com/office/drawing/2014/main" id="{677E02A1-2E9B-4816-9709-8BB6E6886107}"/>
+              <a:t>Scikit</a:t>
+            </a:r>
+            <a:r>
+              <a:rPr lang="nl-NL" dirty="0"/>
+              <a:t> </a:t>
+            </a:r>
+            <a:r>
+              <a:rPr lang="nl-NL" dirty="0" err="1"/>
+              <a:t>Learn</a:t>
+            </a:r>
+            <a:r>
+              <a:rPr lang="nl-NL" dirty="0"/>
+              <a:t> </a:t>
+            </a:r>
+          </a:p>
+        </p:txBody>
+      </p:sp>
+      <p:sp>
+        <p:nvSpPr>
+          <p:cNvPr id="3" name="Tekstvak 2">
+            <a:extLst>
+              <a:ext uri="{FF2B5EF4-FFF2-40B4-BE49-F238E27FC236}">
+                <a16:creationId xmlns:a16="http://schemas.microsoft.com/office/drawing/2014/main" id="{2E22DDD8-FD45-4FB0-901E-4EC7166DB0D8}"/>
               </a:ext>
             </a:extLst>
           </p:cNvPr>
@@ -5483,8 +7402,8 @@
         </p:nvSpPr>
         <p:spPr>
           <a:xfrm>
-            <a:off x="917189" y="2435608"/>
-            <a:ext cx="1115996" cy="646331"/>
+            <a:off x="2242686" y="2435192"/>
+            <a:ext cx="6814687" cy="3693319"/>
           </a:xfrm>
           <a:prstGeom prst="rect">
             <a:avLst/>
@@ -5499,24 +7418,163 @@
           <a:p>
             <a:r>
               <a:rPr lang="nl-NL" dirty="0"/>
-              <a:t>Output</a:t>
-            </a:r>
-          </a:p>
-          <a:p>
+              <a:t>Python schil op rekenmodules</a:t>
+            </a:r>
+          </a:p>
+          <a:p>
+            <a:endParaRPr lang="nl-NL" dirty="0"/>
+          </a:p>
+          <a:p>
+            <a:r>
+              <a:rPr lang="nl-NL" dirty="0"/>
+              <a:t>Model in minuten gereed (exclusief testen diverse configuraties. Dat duurt dagen)</a:t>
+            </a:r>
+          </a:p>
+          <a:p>
+            <a:endParaRPr lang="nl-NL" dirty="0"/>
+          </a:p>
+          <a:p>
+            <a:endParaRPr lang="nl-NL" dirty="0"/>
+          </a:p>
+          <a:p>
+            <a:r>
+              <a:rPr lang="nl-NL" dirty="0"/>
+              <a:t>Tensorflow of </a:t>
+            </a:r>
             <a:r>
               <a:rPr lang="nl-NL" dirty="0" err="1"/>
-              <a:t>layer</a:t>
-            </a:r>
+              <a:t>Scikit</a:t>
+            </a:r>
+            <a:r>
+              <a:rPr lang="nl-NL" dirty="0"/>
+              <a:t>? Jacques zegt: maakt geen donder uit! </a:t>
+            </a:r>
+          </a:p>
+          <a:p>
             <a:endParaRPr lang="nl-NL" dirty="0"/>
           </a:p>
-        </p:txBody>
-      </p:sp>
-      <p:sp>
-        <p:nvSpPr>
-          <p:cNvPr id="86" name="Tekstvak 85">
-            <a:extLst>
-              <a:ext uri="{FF2B5EF4-FFF2-40B4-BE49-F238E27FC236}">
-                <a16:creationId xmlns:a16="http://schemas.microsoft.com/office/drawing/2014/main" id="{ED709283-D1AB-4502-9B40-850861D2313C}"/>
+          <a:p>
+            <a:r>
+              <a:rPr lang="nl-NL" dirty="0"/>
+              <a:t>Tensorflow is beter voor grote datasets. </a:t>
+            </a:r>
+          </a:p>
+          <a:p>
+            <a:r>
+              <a:rPr lang="nl-NL" dirty="0"/>
+              <a:t>In dit geval leverde </a:t>
+            </a:r>
+            <a:r>
+              <a:rPr lang="nl-NL" dirty="0" err="1"/>
+              <a:t>Scikit</a:t>
+            </a:r>
+            <a:r>
+              <a:rPr lang="nl-NL" dirty="0"/>
+              <a:t> sneller een model. Had een bepaalde reden……</a:t>
+            </a:r>
+          </a:p>
+          <a:p>
+            <a:endParaRPr lang="nl-NL" dirty="0"/>
+          </a:p>
+          <a:p>
+            <a:endParaRPr lang="nl-NL" dirty="0"/>
+          </a:p>
+        </p:txBody>
+      </p:sp>
+    </p:spTree>
+    <p:extLst>
+      <p:ext uri="{BB962C8B-B14F-4D97-AF65-F5344CB8AC3E}">
+        <p14:creationId xmlns:p14="http://schemas.microsoft.com/office/powerpoint/2010/main" val="2981349994"/>
+      </p:ext>
+    </p:extLst>
+  </p:cSld>
+  <p:clrMapOvr>
+    <a:masterClrMapping/>
+  </p:clrMapOvr>
+</p:sld>
+</file>
+
+<file path=ppt/slides/slide8.xml><?xml version="1.0" encoding="utf-8"?>
+<p:sld xmlns:a="http://schemas.openxmlformats.org/drawingml/2006/main" xmlns:r="http://schemas.openxmlformats.org/officeDocument/2006/relationships" xmlns:p="http://schemas.openxmlformats.org/presentationml/2006/main">
+  <p:cSld>
+    <p:spTree>
+      <p:nvGrpSpPr>
+        <p:cNvPr id="1" name=""/>
+        <p:cNvGrpSpPr/>
+        <p:nvPr/>
+      </p:nvGrpSpPr>
+      <p:grpSpPr>
+        <a:xfrm>
+          <a:off x="0" y="0"/>
+          <a:ext cx="0" cy="0"/>
+          <a:chOff x="0" y="0"/>
+          <a:chExt cx="0" cy="0"/>
+        </a:xfrm>
+      </p:grpSpPr>
+      <p:sp>
+        <p:nvSpPr>
+          <p:cNvPr id="2" name="Titel 1">
+            <a:extLst>
+              <a:ext uri="{FF2B5EF4-FFF2-40B4-BE49-F238E27FC236}">
+                <a16:creationId xmlns:a16="http://schemas.microsoft.com/office/drawing/2014/main" id="{09BEC858-D036-491F-9FC1-885F82BBD4B0}"/>
+              </a:ext>
+            </a:extLst>
+          </p:cNvPr>
+          <p:cNvSpPr>
+            <a:spLocks noGrp="1"/>
+          </p:cNvSpPr>
+          <p:nvPr>
+            <p:ph type="title"/>
+          </p:nvPr>
+        </p:nvSpPr>
+        <p:spPr/>
+        <p:txBody>
+          <a:bodyPr/>
+          <a:lstStyle/>
+          <a:p>
+            <a:r>
+              <a:rPr lang="nl-NL" dirty="0"/>
+              <a:t>The Black Box</a:t>
+            </a:r>
+          </a:p>
+        </p:txBody>
+      </p:sp>
+    </p:spTree>
+    <p:extLst>
+      <p:ext uri="{BB962C8B-B14F-4D97-AF65-F5344CB8AC3E}">
+        <p14:creationId xmlns:p14="http://schemas.microsoft.com/office/powerpoint/2010/main" val="3495559347"/>
+      </p:ext>
+    </p:extLst>
+  </p:cSld>
+  <p:clrMapOvr>
+    <a:masterClrMapping/>
+  </p:clrMapOvr>
+</p:sld>
+</file>
+
+<file path=ppt/slides/slide9.xml><?xml version="1.0" encoding="utf-8"?>
+<p:sld xmlns:a="http://schemas.openxmlformats.org/drawingml/2006/main" xmlns:r="http://schemas.openxmlformats.org/officeDocument/2006/relationships" xmlns:p="http://schemas.openxmlformats.org/presentationml/2006/main">
+  <p:cSld>
+    <p:spTree>
+      <p:nvGrpSpPr>
+        <p:cNvPr id="1" name=""/>
+        <p:cNvGrpSpPr/>
+        <p:nvPr/>
+      </p:nvGrpSpPr>
+      <p:grpSpPr>
+        <a:xfrm>
+          <a:off x="0" y="0"/>
+          <a:ext cx="0" cy="0"/>
+          <a:chOff x="0" y="0"/>
+          <a:chExt cx="0" cy="0"/>
+        </a:xfrm>
+      </p:grpSpPr>
+      <p:sp>
+        <p:nvSpPr>
+          <p:cNvPr id="3" name="Tekstvak 2">
+            <a:extLst>
+              <a:ext uri="{FF2B5EF4-FFF2-40B4-BE49-F238E27FC236}">
+                <a16:creationId xmlns:a16="http://schemas.microsoft.com/office/drawing/2014/main" id="{8FDFFC97-85F7-4435-8EC8-8F2CAC29E79B}"/>
               </a:ext>
             </a:extLst>
           </p:cNvPr>
@@ -5525,8 +7583,8 @@
         </p:nvSpPr>
         <p:spPr>
           <a:xfrm>
-            <a:off x="10586940" y="5235981"/>
-            <a:ext cx="1115996" cy="646331"/>
+            <a:off x="3048802" y="2692742"/>
+            <a:ext cx="6097604" cy="1477328"/>
           </a:xfrm>
           <a:prstGeom prst="rect">
             <a:avLst/>
@@ -5534,258 +7592,155 @@
           <a:noFill/>
         </p:spPr>
         <p:txBody>
-          <a:bodyPr wrap="square" rtlCol="0">
+          <a:bodyPr wrap="square">
             <a:spAutoFit/>
           </a:bodyPr>
           <a:lstStyle/>
           <a:p>
-            <a:r>
-              <a:rPr lang="nl-NL" dirty="0" err="1"/>
-              <a:t>Hidden</a:t>
-            </a:r>
-            <a:endParaRPr lang="nl-NL" dirty="0"/>
-          </a:p>
-          <a:p>
-            <a:r>
-              <a:rPr lang="nl-NL" dirty="0" err="1"/>
+            <a:pPr marL="342900" lvl="0" indent="-342900">
+              <a:buFont typeface="Symbol" panose="05050102010706020507" pitchFamily="18" charset="2"/>
+              <a:buChar char="-"/>
+            </a:pPr>
+            <a:r>
+              <a:rPr lang="nl-NL" sz="1800" dirty="0">
+                <a:effectLst/>
+                <a:latin typeface="Calibri" panose="020F0502020204030204" pitchFamily="34" charset="0"/>
+                <a:ea typeface="Calibri" panose="020F0502020204030204" pitchFamily="34" charset="0"/>
+                <a:cs typeface="Calibri" panose="020F0502020204030204" pitchFamily="34" charset="0"/>
+              </a:rPr>
+              <a:t>Aanmaken </a:t>
+            </a:r>
+            <a:r>
+              <a:rPr lang="nl-NL" sz="1800" dirty="0" err="1">
+                <a:effectLst/>
+                <a:latin typeface="Calibri" panose="020F0502020204030204" pitchFamily="34" charset="0"/>
+                <a:ea typeface="Calibri" panose="020F0502020204030204" pitchFamily="34" charset="0"/>
+                <a:cs typeface="Calibri" panose="020F0502020204030204" pitchFamily="34" charset="0"/>
+              </a:rPr>
+              <a:t>trainingsset</a:t>
+            </a:r>
+            <a:endParaRPr lang="nl-NL" sz="1800" dirty="0">
+              <a:effectLst/>
+              <a:latin typeface="Calibri" panose="020F0502020204030204" pitchFamily="34" charset="0"/>
+              <a:ea typeface="Calibri" panose="020F0502020204030204" pitchFamily="34" charset="0"/>
+              <a:cs typeface="Calibri" panose="020F0502020204030204" pitchFamily="34" charset="0"/>
+            </a:endParaRPr>
+          </a:p>
+          <a:p>
+            <a:pPr marL="342900" lvl="0" indent="-342900">
+              <a:buFont typeface="Symbol" panose="05050102010706020507" pitchFamily="18" charset="2"/>
+              <a:buChar char="-"/>
+            </a:pPr>
+            <a:r>
+              <a:rPr lang="nl-NL" sz="1800" dirty="0">
+                <a:effectLst/>
+                <a:latin typeface="Calibri" panose="020F0502020204030204" pitchFamily="34" charset="0"/>
+                <a:ea typeface="Calibri" panose="020F0502020204030204" pitchFamily="34" charset="0"/>
+                <a:cs typeface="Calibri" panose="020F0502020204030204" pitchFamily="34" charset="0"/>
+              </a:rPr>
+              <a:t>Bouwen topologie netwerk, (</a:t>
+            </a:r>
+            <a:r>
+              <a:rPr lang="nl-NL" sz="1800" dirty="0" err="1">
+                <a:effectLst/>
+                <a:latin typeface="Calibri" panose="020F0502020204030204" pitchFamily="34" charset="0"/>
+                <a:ea typeface="Calibri" panose="020F0502020204030204" pitchFamily="34" charset="0"/>
+                <a:cs typeface="Calibri" panose="020F0502020204030204" pitchFamily="34" charset="0"/>
+              </a:rPr>
               <a:t>layers</a:t>
             </a:r>
-            <a:endParaRPr lang="nl-NL" dirty="0"/>
-          </a:p>
-        </p:txBody>
-      </p:sp>
-      <p:sp>
-        <p:nvSpPr>
-          <p:cNvPr id="87" name="Tekstvak 86">
-            <a:extLst>
-              <a:ext uri="{FF2B5EF4-FFF2-40B4-BE49-F238E27FC236}">
-                <a16:creationId xmlns:a16="http://schemas.microsoft.com/office/drawing/2014/main" id="{DD685F7F-5CCD-4B65-B1BA-1CCA06195FB3}"/>
-              </a:ext>
-            </a:extLst>
-          </p:cNvPr>
-          <p:cNvSpPr txBox="1"/>
-          <p:nvPr/>
-        </p:nvSpPr>
-        <p:spPr>
-          <a:xfrm>
-            <a:off x="1194969" y="4912816"/>
-            <a:ext cx="1115996" cy="646331"/>
-          </a:xfrm>
-          <a:prstGeom prst="rect">
-            <a:avLst/>
-          </a:prstGeom>
-          <a:noFill/>
-        </p:spPr>
-        <p:txBody>
-          <a:bodyPr wrap="square" rtlCol="0">
-            <a:spAutoFit/>
-          </a:bodyPr>
-          <a:lstStyle/>
-          <a:p>
-            <a:r>
-              <a:rPr lang="nl-NL" dirty="0" err="1"/>
-              <a:t>Hidden</a:t>
-            </a:r>
-            <a:endParaRPr lang="nl-NL" dirty="0"/>
-          </a:p>
-          <a:p>
-            <a:r>
-              <a:rPr lang="nl-NL" dirty="0" err="1"/>
-              <a:t>layers</a:t>
-            </a:r>
-            <a:endParaRPr lang="nl-NL" dirty="0"/>
-          </a:p>
-        </p:txBody>
-      </p:sp>
-      <p:sp>
-        <p:nvSpPr>
-          <p:cNvPr id="88" name="Tekstvak 87">
-            <a:extLst>
-              <a:ext uri="{FF2B5EF4-FFF2-40B4-BE49-F238E27FC236}">
-                <a16:creationId xmlns:a16="http://schemas.microsoft.com/office/drawing/2014/main" id="{6ABB1FE1-9A1B-47D4-9D7F-32D5C95FBBD4}"/>
-              </a:ext>
-            </a:extLst>
-          </p:cNvPr>
-          <p:cNvSpPr txBox="1"/>
-          <p:nvPr/>
-        </p:nvSpPr>
-        <p:spPr>
-          <a:xfrm>
-            <a:off x="5912653" y="-78776"/>
-            <a:ext cx="1115996" cy="646331"/>
-          </a:xfrm>
-          <a:prstGeom prst="rect">
-            <a:avLst/>
-          </a:prstGeom>
-          <a:noFill/>
-        </p:spPr>
-        <p:txBody>
-          <a:bodyPr wrap="square" rtlCol="0">
-            <a:spAutoFit/>
-          </a:bodyPr>
-          <a:lstStyle/>
-          <a:p>
-            <a:r>
-              <a:rPr lang="nl-NL" dirty="0"/>
-              <a:t>Input</a:t>
-            </a:r>
-          </a:p>
-          <a:p>
-            <a:r>
-              <a:rPr lang="nl-NL" dirty="0" err="1"/>
-              <a:t>layer</a:t>
-            </a:r>
-            <a:endParaRPr lang="nl-NL" dirty="0"/>
-          </a:p>
-        </p:txBody>
-      </p:sp>
-      <p:sp>
-        <p:nvSpPr>
-          <p:cNvPr id="89" name="Tekstvak 88">
-            <a:extLst>
-              <a:ext uri="{FF2B5EF4-FFF2-40B4-BE49-F238E27FC236}">
-                <a16:creationId xmlns:a16="http://schemas.microsoft.com/office/drawing/2014/main" id="{F2BE6DFE-5115-41F3-9093-A2F833EA3046}"/>
-              </a:ext>
-            </a:extLst>
-          </p:cNvPr>
-          <p:cNvSpPr txBox="1"/>
-          <p:nvPr/>
-        </p:nvSpPr>
-        <p:spPr>
-          <a:xfrm>
-            <a:off x="5607281" y="1695254"/>
-            <a:ext cx="1115996" cy="646331"/>
-          </a:xfrm>
-          <a:prstGeom prst="rect">
-            <a:avLst/>
-          </a:prstGeom>
-          <a:noFill/>
-        </p:spPr>
-        <p:txBody>
-          <a:bodyPr wrap="square" rtlCol="0">
-            <a:spAutoFit/>
-          </a:bodyPr>
-          <a:lstStyle/>
-          <a:p>
-            <a:r>
-              <a:rPr lang="nl-NL" dirty="0"/>
-              <a:t>Input</a:t>
-            </a:r>
-          </a:p>
-          <a:p>
-            <a:r>
-              <a:rPr lang="nl-NL" dirty="0" err="1"/>
-              <a:t>layer</a:t>
-            </a:r>
-            <a:endParaRPr lang="nl-NL" dirty="0"/>
-          </a:p>
-        </p:txBody>
-      </p:sp>
-      <p:sp>
-        <p:nvSpPr>
-          <p:cNvPr id="90" name="Tekstvak 89">
-            <a:extLst>
-              <a:ext uri="{FF2B5EF4-FFF2-40B4-BE49-F238E27FC236}">
-                <a16:creationId xmlns:a16="http://schemas.microsoft.com/office/drawing/2014/main" id="{E6609F7B-1DF2-4B08-A922-23E4DA7A8787}"/>
-              </a:ext>
-            </a:extLst>
-          </p:cNvPr>
-          <p:cNvSpPr txBox="1"/>
-          <p:nvPr/>
-        </p:nvSpPr>
-        <p:spPr>
-          <a:xfrm>
-            <a:off x="5577985" y="3287145"/>
-            <a:ext cx="1115996" cy="646331"/>
-          </a:xfrm>
-          <a:prstGeom prst="rect">
-            <a:avLst/>
-          </a:prstGeom>
-          <a:noFill/>
-        </p:spPr>
-        <p:txBody>
-          <a:bodyPr wrap="square" rtlCol="0">
-            <a:spAutoFit/>
-          </a:bodyPr>
-          <a:lstStyle/>
-          <a:p>
-            <a:r>
-              <a:rPr lang="nl-NL" dirty="0"/>
-              <a:t>Output</a:t>
-            </a:r>
-          </a:p>
-          <a:p>
-            <a:r>
-              <a:rPr lang="nl-NL" dirty="0" err="1"/>
-              <a:t>layer</a:t>
-            </a:r>
-            <a:endParaRPr lang="nl-NL" dirty="0"/>
-          </a:p>
-        </p:txBody>
-      </p:sp>
-      <p:sp>
-        <p:nvSpPr>
-          <p:cNvPr id="91" name="Stroomdiagram: Gegevens 90">
-            <a:extLst>
-              <a:ext uri="{FF2B5EF4-FFF2-40B4-BE49-F238E27FC236}">
-                <a16:creationId xmlns:a16="http://schemas.microsoft.com/office/drawing/2014/main" id="{D76AAF11-9842-4D2F-B0CA-B12D66A2691A}"/>
-              </a:ext>
-            </a:extLst>
-          </p:cNvPr>
-          <p:cNvSpPr/>
-          <p:nvPr/>
-        </p:nvSpPr>
-        <p:spPr>
-          <a:xfrm>
-            <a:off x="3828981" y="2362542"/>
-            <a:ext cx="1907674" cy="1468313"/>
-          </a:xfrm>
-          <a:prstGeom prst="flowChartInputOutput">
-            <a:avLst/>
-          </a:prstGeom>
-          <a:solidFill>
-            <a:schemeClr val="bg1"/>
-          </a:solidFill>
-        </p:spPr>
-        <p:style>
-          <a:lnRef idx="2">
-            <a:schemeClr val="accent1">
-              <a:shade val="50000"/>
-            </a:schemeClr>
-          </a:lnRef>
-          <a:fillRef idx="1">
-            <a:schemeClr val="accent1"/>
-          </a:fillRef>
-          <a:effectRef idx="0">
-            <a:schemeClr val="accent1"/>
-          </a:effectRef>
-          <a:fontRef idx="minor">
-            <a:schemeClr val="lt1"/>
-          </a:fontRef>
-        </p:style>
-        <p:txBody>
-          <a:bodyPr rtlCol="0" anchor="ctr"/>
-          <a:lstStyle/>
-          <a:p>
-            <a:pPr algn="ctr"/>
-            <a:r>
-              <a:rPr lang="nl-NL" dirty="0">
-                <a:solidFill>
-                  <a:schemeClr val="tx1"/>
-                </a:solidFill>
+            <a:r>
+              <a:rPr lang="nl-NL" sz="1800" dirty="0">
+                <a:effectLst/>
+                <a:latin typeface="Calibri" panose="020F0502020204030204" pitchFamily="34" charset="0"/>
+                <a:ea typeface="Calibri" panose="020F0502020204030204" pitchFamily="34" charset="0"/>
+                <a:cs typeface="Calibri" panose="020F0502020204030204" pitchFamily="34" charset="0"/>
               </a:rPr>
-              <a:t>Stuurhoek</a:t>
-            </a:r>
-          </a:p>
-          <a:p>
-            <a:pPr algn="ctr"/>
-            <a:r>
-              <a:rPr lang="nl-NL" dirty="0">
-                <a:solidFill>
-                  <a:schemeClr val="tx1"/>
-                </a:solidFill>
+              <a:t>, </a:t>
+            </a:r>
+            <a:r>
+              <a:rPr lang="nl-NL" sz="1800" dirty="0" err="1">
+                <a:effectLst/>
+                <a:latin typeface="Calibri" panose="020F0502020204030204" pitchFamily="34" charset="0"/>
+                <a:ea typeface="Calibri" panose="020F0502020204030204" pitchFamily="34" charset="0"/>
+                <a:cs typeface="Calibri" panose="020F0502020204030204" pitchFamily="34" charset="0"/>
               </a:rPr>
-              <a:t>Uit training</a:t>
+              <a:t>nodes</a:t>
+            </a:r>
+            <a:r>
+              <a:rPr lang="nl-NL" sz="1800" dirty="0">
+                <a:effectLst/>
+                <a:latin typeface="Calibri" panose="020F0502020204030204" pitchFamily="34" charset="0"/>
+                <a:ea typeface="Calibri" panose="020F0502020204030204" pitchFamily="34" charset="0"/>
+                <a:cs typeface="Calibri" panose="020F0502020204030204" pitchFamily="34" charset="0"/>
+              </a:rPr>
+              <a:t>, links )</a:t>
+            </a:r>
+          </a:p>
+          <a:p>
+            <a:pPr marL="342900" lvl="0" indent="-342900">
+              <a:buFont typeface="Symbol" panose="05050102010706020507" pitchFamily="18" charset="2"/>
+              <a:buChar char="-"/>
+            </a:pPr>
+            <a:r>
+              <a:rPr lang="nl-NL" sz="1800" dirty="0">
+                <a:effectLst/>
+                <a:latin typeface="Calibri" panose="020F0502020204030204" pitchFamily="34" charset="0"/>
+                <a:ea typeface="Calibri" panose="020F0502020204030204" pitchFamily="34" charset="0"/>
+                <a:cs typeface="Calibri" panose="020F0502020204030204" pitchFamily="34" charset="0"/>
+              </a:rPr>
+              <a:t>Preprocessing input data (sonar en </a:t>
+            </a:r>
+            <a:r>
+              <a:rPr lang="nl-NL" sz="1800" dirty="0" err="1">
+                <a:effectLst/>
+                <a:latin typeface="Calibri" panose="020F0502020204030204" pitchFamily="34" charset="0"/>
+                <a:ea typeface="Calibri" panose="020F0502020204030204" pitchFamily="34" charset="0"/>
+                <a:cs typeface="Calibri" panose="020F0502020204030204" pitchFamily="34" charset="0"/>
+              </a:rPr>
+              <a:t>lidar</a:t>
+            </a:r>
+            <a:r>
+              <a:rPr lang="nl-NL" sz="1800" dirty="0">
+                <a:effectLst/>
+                <a:latin typeface="Calibri" panose="020F0502020204030204" pitchFamily="34" charset="0"/>
+                <a:ea typeface="Calibri" panose="020F0502020204030204" pitchFamily="34" charset="0"/>
+                <a:cs typeface="Calibri" panose="020F0502020204030204" pitchFamily="34" charset="0"/>
+              </a:rPr>
+              <a:t> data)</a:t>
+            </a:r>
+          </a:p>
+          <a:p>
+            <a:pPr marL="342900" lvl="0" indent="-342900">
+              <a:buFont typeface="Symbol" panose="05050102010706020507" pitchFamily="18" charset="2"/>
+              <a:buChar char="-"/>
+            </a:pPr>
+            <a:r>
+              <a:rPr lang="nl-NL" sz="1800" dirty="0">
+                <a:effectLst/>
+                <a:latin typeface="Calibri" panose="020F0502020204030204" pitchFamily="34" charset="0"/>
+                <a:ea typeface="Calibri" panose="020F0502020204030204" pitchFamily="34" charset="0"/>
+                <a:cs typeface="Calibri" panose="020F0502020204030204" pitchFamily="34" charset="0"/>
+              </a:rPr>
+              <a:t>Trainen model van het model </a:t>
+            </a:r>
+          </a:p>
+          <a:p>
+            <a:pPr marL="342900" lvl="0" indent="-342900">
+              <a:spcAft>
+                <a:spcPts val="800"/>
+              </a:spcAft>
+              <a:buFont typeface="Symbol" panose="05050102010706020507" pitchFamily="18" charset="2"/>
+              <a:buChar char="-"/>
+            </a:pPr>
+            <a:r>
+              <a:rPr lang="nl-NL" sz="1800" dirty="0">
+                <a:effectLst/>
+                <a:latin typeface="Calibri" panose="020F0502020204030204" pitchFamily="34" charset="0"/>
+                <a:ea typeface="Calibri" panose="020F0502020204030204" pitchFamily="34" charset="0"/>
+                <a:cs typeface="Calibri" panose="020F0502020204030204" pitchFamily="34" charset="0"/>
+              </a:rPr>
+              <a:t>Validatie van het model </a:t>
             </a:r>
           </a:p>
         </p:txBody>
@@ -5793,7 +7748,7 @@
     </p:spTree>
     <p:extLst>
       <p:ext uri="{BB962C8B-B14F-4D97-AF65-F5344CB8AC3E}">
-        <p14:creationId xmlns:p14="http://schemas.microsoft.com/office/powerpoint/2010/main" val="3061699450"/>
+        <p14:creationId xmlns:p14="http://schemas.microsoft.com/office/powerpoint/2010/main" val="3047693261"/>
       </p:ext>
     </p:extLst>
   </p:cSld>

</xml_diff>

<commit_message>
project 1 presentatie en documenten 221006
</commit_message>
<xml_diff>
--- a/simpylc/presentatie project 1/Presentatie project 1.pptx
+++ b/simpylc/presentatie project 1/Presentatie project 1.pptx
@@ -8,13 +8,13 @@
     <p:sldId id="256" r:id="rId2"/>
     <p:sldId id="258" r:id="rId3"/>
     <p:sldId id="257" r:id="rId4"/>
-    <p:sldId id="265" r:id="rId5"/>
-    <p:sldId id="260" r:id="rId6"/>
-    <p:sldId id="264" r:id="rId7"/>
+    <p:sldId id="264" r:id="rId5"/>
+    <p:sldId id="265" r:id="rId6"/>
+    <p:sldId id="260" r:id="rId7"/>
     <p:sldId id="266" r:id="rId8"/>
-    <p:sldId id="267" r:id="rId9"/>
-    <p:sldId id="263" r:id="rId10"/>
-    <p:sldId id="262" r:id="rId11"/>
+    <p:sldId id="262" r:id="rId9"/>
+    <p:sldId id="267" r:id="rId10"/>
+    <p:sldId id="263" r:id="rId11"/>
   </p:sldIdLst>
   <p:sldSz cx="12192000" cy="6858000"/>
   <p:notesSz cx="6858000" cy="9144000"/>
@@ -121,6 +121,33 @@
 </p:presentation>
 </file>
 
+<file path=ppt/authors.xml><?xml version="1.0" encoding="utf-8"?>
+<p188:authorLst xmlns:a="http://schemas.openxmlformats.org/drawingml/2006/main" xmlns:r="http://schemas.openxmlformats.org/officeDocument/2006/relationships" xmlns:p188="http://schemas.microsoft.com/office/powerpoint/2018/8/main">
+  <p188:author id="{82EF1CF6-4092-1542-1F96-9EB4C0E64253}" name="Marc Rotsaert (1065070)" initials="MR(" userId="Marc Rotsaert (1065070)" providerId="None"/>
+</p188:authorLst>
+</file>
+
+<file path=ppt/comments/modernComment_108_CC523B.xml><?xml version="1.0" encoding="utf-8"?>
+<p188:cmLst xmlns:a="http://schemas.openxmlformats.org/drawingml/2006/main" xmlns:r="http://schemas.openxmlformats.org/officeDocument/2006/relationships" xmlns:p188="http://schemas.microsoft.com/office/powerpoint/2018/8/main">
+  <p188:cm id="{AD933E07-0180-4401-AA17-3CF82B2AED29}" authorId="{82EF1CF6-4092-1542-1F96-9EB4C0E64253}" created="2022-10-06T08:28:05.941">
+    <pc:sldMkLst xmlns:pc="http://schemas.microsoft.com/office/powerpoint/2013/main/command">
+      <pc:docMk/>
+      <pc:sldMk cId="13390395" sldId="264"/>
+    </pc:sldMkLst>
+    <p188:txBody>
+      <a:bodyPr/>
+      <a:lstStyle/>
+      <a:p>
+        <a:r>
+          <a:rPr lang="nl-NL"/>
+          <a:t>Figuur van Boy</a:t>
+        </a:r>
+      </a:p>
+    </p188:txBody>
+  </p188:cm>
+</p188:cmLst>
+</file>
+
 <file path=ppt/slideLayouts/slideLayout1.xml><?xml version="1.0" encoding="utf-8"?>
 <p:sldLayout xmlns:a="http://schemas.openxmlformats.org/drawingml/2006/main" xmlns:r="http://schemas.openxmlformats.org/officeDocument/2006/relationships" xmlns:p="http://schemas.openxmlformats.org/presentationml/2006/main" type="title" preserve="1">
   <p:cSld name="Titeldia">
@@ -268,7 +295,7 @@
           <a:p>
             <a:fld id="{166759B0-B772-4327-B154-210C5D8A9FFC}" type="datetimeFigureOut">
               <a:rPr lang="nl-NL" smtClean="0"/>
-              <a:t>4-10-2022</a:t>
+              <a:t>6-10-2022</a:t>
             </a:fld>
             <a:endParaRPr lang="nl-NL"/>
           </a:p>
@@ -466,7 +493,7 @@
           <a:p>
             <a:fld id="{166759B0-B772-4327-B154-210C5D8A9FFC}" type="datetimeFigureOut">
               <a:rPr lang="nl-NL" smtClean="0"/>
-              <a:t>4-10-2022</a:t>
+              <a:t>6-10-2022</a:t>
             </a:fld>
             <a:endParaRPr lang="nl-NL"/>
           </a:p>
@@ -674,7 +701,7 @@
           <a:p>
             <a:fld id="{166759B0-B772-4327-B154-210C5D8A9FFC}" type="datetimeFigureOut">
               <a:rPr lang="nl-NL" smtClean="0"/>
-              <a:t>4-10-2022</a:t>
+              <a:t>6-10-2022</a:t>
             </a:fld>
             <a:endParaRPr lang="nl-NL"/>
           </a:p>
@@ -872,7 +899,7 @@
           <a:p>
             <a:fld id="{166759B0-B772-4327-B154-210C5D8A9FFC}" type="datetimeFigureOut">
               <a:rPr lang="nl-NL" smtClean="0"/>
-              <a:t>4-10-2022</a:t>
+              <a:t>6-10-2022</a:t>
             </a:fld>
             <a:endParaRPr lang="nl-NL"/>
           </a:p>
@@ -1147,7 +1174,7 @@
           <a:p>
             <a:fld id="{166759B0-B772-4327-B154-210C5D8A9FFC}" type="datetimeFigureOut">
               <a:rPr lang="nl-NL" smtClean="0"/>
-              <a:t>4-10-2022</a:t>
+              <a:t>6-10-2022</a:t>
             </a:fld>
             <a:endParaRPr lang="nl-NL"/>
           </a:p>
@@ -1412,7 +1439,7 @@
           <a:p>
             <a:fld id="{166759B0-B772-4327-B154-210C5D8A9FFC}" type="datetimeFigureOut">
               <a:rPr lang="nl-NL" smtClean="0"/>
-              <a:t>4-10-2022</a:t>
+              <a:t>6-10-2022</a:t>
             </a:fld>
             <a:endParaRPr lang="nl-NL"/>
           </a:p>
@@ -1824,7 +1851,7 @@
           <a:p>
             <a:fld id="{166759B0-B772-4327-B154-210C5D8A9FFC}" type="datetimeFigureOut">
               <a:rPr lang="nl-NL" smtClean="0"/>
-              <a:t>4-10-2022</a:t>
+              <a:t>6-10-2022</a:t>
             </a:fld>
             <a:endParaRPr lang="nl-NL"/>
           </a:p>
@@ -1965,7 +1992,7 @@
           <a:p>
             <a:fld id="{166759B0-B772-4327-B154-210C5D8A9FFC}" type="datetimeFigureOut">
               <a:rPr lang="nl-NL" smtClean="0"/>
-              <a:t>4-10-2022</a:t>
+              <a:t>6-10-2022</a:t>
             </a:fld>
             <a:endParaRPr lang="nl-NL"/>
           </a:p>
@@ -2078,7 +2105,7 @@
           <a:p>
             <a:fld id="{166759B0-B772-4327-B154-210C5D8A9FFC}" type="datetimeFigureOut">
               <a:rPr lang="nl-NL" smtClean="0"/>
-              <a:t>4-10-2022</a:t>
+              <a:t>6-10-2022</a:t>
             </a:fld>
             <a:endParaRPr lang="nl-NL"/>
           </a:p>
@@ -2389,7 +2416,7 @@
           <a:p>
             <a:fld id="{166759B0-B772-4327-B154-210C5D8A9FFC}" type="datetimeFigureOut">
               <a:rPr lang="nl-NL" smtClean="0"/>
-              <a:t>4-10-2022</a:t>
+              <a:t>6-10-2022</a:t>
             </a:fld>
             <a:endParaRPr lang="nl-NL"/>
           </a:p>
@@ -2677,7 +2704,7 @@
           <a:p>
             <a:fld id="{166759B0-B772-4327-B154-210C5D8A9FFC}" type="datetimeFigureOut">
               <a:rPr lang="nl-NL" smtClean="0"/>
-              <a:t>4-10-2022</a:t>
+              <a:t>6-10-2022</a:t>
             </a:fld>
             <a:endParaRPr lang="nl-NL"/>
           </a:p>
@@ -2918,7 +2945,7 @@
           <a:p>
             <a:fld id="{166759B0-B772-4327-B154-210C5D8A9FFC}" type="datetimeFigureOut">
               <a:rPr lang="nl-NL" smtClean="0"/>
-              <a:t>4-10-2022</a:t>
+              <a:t>6-10-2022</a:t>
             </a:fld>
             <a:endParaRPr lang="nl-NL"/>
           </a:p>
@@ -3363,14 +3390,42 @@
         </p:blipFill>
         <p:spPr>
           <a:xfrm>
-            <a:off x="1991360" y="1651649"/>
-            <a:ext cx="7213600" cy="4458004"/>
+            <a:off x="2039486" y="1521362"/>
+            <a:ext cx="7393272" cy="4569041"/>
           </a:xfrm>
           <a:prstGeom prst="rect">
             <a:avLst/>
           </a:prstGeom>
         </p:spPr>
       </p:pic>
+      <p:sp>
+        <p:nvSpPr>
+          <p:cNvPr id="2" name="Titel 1">
+            <a:extLst>
+              <a:ext uri="{FF2B5EF4-FFF2-40B4-BE49-F238E27FC236}">
+                <a16:creationId xmlns:a16="http://schemas.microsoft.com/office/drawing/2014/main" id="{BD0BC807-4E81-4F0D-9BBD-53FC8FE26B63}"/>
+              </a:ext>
+            </a:extLst>
+          </p:cNvPr>
+          <p:cNvSpPr>
+            <a:spLocks noGrp="1"/>
+          </p:cNvSpPr>
+          <p:nvPr>
+            <p:ph type="title"/>
+          </p:nvPr>
+        </p:nvSpPr>
+        <p:spPr/>
+        <p:txBody>
+          <a:bodyPr/>
+          <a:lstStyle/>
+          <a:p>
+            <a:r>
+              <a:rPr lang="nl-NL" dirty="0"/>
+              <a:t>Neuraal netwerk</a:t>
+            </a:r>
+          </a:p>
+        </p:txBody>
+      </p:sp>
     </p:spTree>
     <p:extLst>
       <p:ext uri="{BB962C8B-B14F-4D97-AF65-F5344CB8AC3E}">
@@ -3403,190 +3458,10 @@
       </p:grpSpPr>
       <p:sp>
         <p:nvSpPr>
-          <p:cNvPr id="3" name="Stroomdiagram: Proces 2">
-            <a:extLst>
-              <a:ext uri="{FF2B5EF4-FFF2-40B4-BE49-F238E27FC236}">
-                <a16:creationId xmlns:a16="http://schemas.microsoft.com/office/drawing/2014/main" id="{D4BE89FB-D05C-4906-AB89-73A6F2A0FACF}"/>
-              </a:ext>
-            </a:extLst>
-          </p:cNvPr>
-          <p:cNvSpPr/>
-          <p:nvPr/>
-        </p:nvSpPr>
-        <p:spPr>
-          <a:xfrm>
-            <a:off x="3245046" y="332852"/>
-            <a:ext cx="2006600" cy="977900"/>
-          </a:xfrm>
-          <a:prstGeom prst="flowChartProcess">
-            <a:avLst/>
-          </a:prstGeom>
-        </p:spPr>
-        <p:style>
-          <a:lnRef idx="2">
-            <a:schemeClr val="accent6"/>
-          </a:lnRef>
-          <a:fillRef idx="1">
-            <a:schemeClr val="lt1"/>
-          </a:fillRef>
-          <a:effectRef idx="0">
-            <a:schemeClr val="accent6"/>
-          </a:effectRef>
-          <a:fontRef idx="minor">
-            <a:schemeClr val="dk1"/>
-          </a:fontRef>
-        </p:style>
-        <p:txBody>
-          <a:bodyPr rtlCol="0" anchor="ctr"/>
-          <a:lstStyle/>
-          <a:p>
-            <a:pPr algn="ctr"/>
-            <a:r>
-              <a:rPr lang="nl-NL" dirty="0"/>
-              <a:t>Reken met nieuwe gewichtsfactoren</a:t>
-            </a:r>
-          </a:p>
-        </p:txBody>
-      </p:sp>
-      <p:sp>
-        <p:nvSpPr>
-          <p:cNvPr id="4" name="Stroomdiagram: Beslissing 3">
-            <a:extLst>
-              <a:ext uri="{FF2B5EF4-FFF2-40B4-BE49-F238E27FC236}">
-                <a16:creationId xmlns:a16="http://schemas.microsoft.com/office/drawing/2014/main" id="{8A5504F3-D4BC-4D10-A052-B9619A4DA4E9}"/>
-              </a:ext>
-            </a:extLst>
-          </p:cNvPr>
-          <p:cNvSpPr/>
-          <p:nvPr/>
-        </p:nvSpPr>
-        <p:spPr>
-          <a:xfrm>
-            <a:off x="4198063" y="5025062"/>
-            <a:ext cx="2286000" cy="1714500"/>
-          </a:xfrm>
-          <a:prstGeom prst="flowChartDecision">
-            <a:avLst/>
-          </a:prstGeom>
-        </p:spPr>
-        <p:style>
-          <a:lnRef idx="2">
-            <a:schemeClr val="accent6"/>
-          </a:lnRef>
-          <a:fillRef idx="1">
-            <a:schemeClr val="lt1"/>
-          </a:fillRef>
-          <a:effectRef idx="0">
-            <a:schemeClr val="accent6"/>
-          </a:effectRef>
-          <a:fontRef idx="minor">
-            <a:schemeClr val="dk1"/>
-          </a:fontRef>
-        </p:style>
-        <p:txBody>
-          <a:bodyPr rtlCol="0" anchor="ctr"/>
-          <a:lstStyle/>
-          <a:p>
-            <a:pPr algn="ctr"/>
-            <a:r>
-              <a:rPr lang="nl-NL" dirty="0"/>
-              <a:t>Beter resultaat?</a:t>
-            </a:r>
-          </a:p>
-        </p:txBody>
-      </p:sp>
-      <p:cxnSp>
-        <p:nvCxnSpPr>
-          <p:cNvPr id="6" name="Rechte verbindingslijn met pijl 5">
-            <a:extLst>
-              <a:ext uri="{FF2B5EF4-FFF2-40B4-BE49-F238E27FC236}">
-                <a16:creationId xmlns:a16="http://schemas.microsoft.com/office/drawing/2014/main" id="{EBC96097-8CDA-4746-AD09-E0ECFA522A49}"/>
-              </a:ext>
-            </a:extLst>
-          </p:cNvPr>
-          <p:cNvCxnSpPr>
-            <a:cxnSpLocks/>
-            <a:stCxn id="4" idx="3"/>
-            <a:endCxn id="17" idx="1"/>
-          </p:cNvCxnSpPr>
-          <p:nvPr/>
-        </p:nvCxnSpPr>
-        <p:spPr>
-          <a:xfrm flipV="1">
-            <a:off x="6484063" y="5808690"/>
-            <a:ext cx="2024567" cy="73622"/>
-          </a:xfrm>
-          <a:prstGeom prst="straightConnector1">
-            <a:avLst/>
-          </a:prstGeom>
-          <a:ln w="63500">
-            <a:tailEnd type="triangle"/>
-          </a:ln>
-        </p:spPr>
-        <p:style>
-          <a:lnRef idx="1">
-            <a:schemeClr val="accent1"/>
-          </a:lnRef>
-          <a:fillRef idx="0">
-            <a:schemeClr val="accent1"/>
-          </a:fillRef>
-          <a:effectRef idx="0">
-            <a:schemeClr val="accent1"/>
-          </a:effectRef>
-          <a:fontRef idx="minor">
-            <a:schemeClr val="tx1"/>
-          </a:fontRef>
-        </p:style>
-      </p:cxnSp>
-      <p:cxnSp>
-        <p:nvCxnSpPr>
-          <p:cNvPr id="7" name="Rechte verbindingslijn met pijl 6">
-            <a:extLst>
-              <a:ext uri="{FF2B5EF4-FFF2-40B4-BE49-F238E27FC236}">
-                <a16:creationId xmlns:a16="http://schemas.microsoft.com/office/drawing/2014/main" id="{60A25F6A-6C9C-4000-8A18-2C3D06FDF50E}"/>
-              </a:ext>
-            </a:extLst>
-          </p:cNvPr>
-          <p:cNvCxnSpPr>
-            <a:cxnSpLocks/>
-            <a:stCxn id="4" idx="1"/>
-            <a:endCxn id="16" idx="3"/>
-          </p:cNvCxnSpPr>
-          <p:nvPr/>
-        </p:nvCxnSpPr>
-        <p:spPr>
-          <a:xfrm flipH="1">
-            <a:off x="3731777" y="5882312"/>
-            <a:ext cx="466286" cy="215634"/>
-          </a:xfrm>
-          <a:prstGeom prst="straightConnector1">
-            <a:avLst/>
-          </a:prstGeom>
-          <a:ln w="63500">
-            <a:tailEnd type="triangle"/>
-          </a:ln>
-        </p:spPr>
-        <p:style>
-          <a:lnRef idx="1">
-            <a:schemeClr val="accent1"/>
-          </a:lnRef>
-          <a:fillRef idx="0">
-            <a:schemeClr val="accent1"/>
-          </a:fillRef>
-          <a:effectRef idx="0">
-            <a:schemeClr val="accent1"/>
-          </a:effectRef>
-          <a:fontRef idx="minor">
-            <a:schemeClr val="tx1"/>
-          </a:fontRef>
-        </p:style>
-      </p:cxnSp>
-      <p:sp>
-        <p:nvSpPr>
-          <p:cNvPr id="10" name="Tekstvak 9">
-            <a:extLst>
-              <a:ext uri="{FF2B5EF4-FFF2-40B4-BE49-F238E27FC236}">
-                <a16:creationId xmlns:a16="http://schemas.microsoft.com/office/drawing/2014/main" id="{1C7D93DE-AF49-4C83-87B9-0347E7AB12B7}"/>
+          <p:cNvPr id="3" name="Tekstvak 2">
+            <a:extLst>
+              <a:ext uri="{FF2B5EF4-FFF2-40B4-BE49-F238E27FC236}">
+                <a16:creationId xmlns:a16="http://schemas.microsoft.com/office/drawing/2014/main" id="{8FDFFC97-85F7-4435-8EC8-8F2CAC29E79B}"/>
               </a:ext>
             </a:extLst>
           </p:cNvPr>
@@ -3595,8 +3470,8 @@
         </p:nvSpPr>
         <p:spPr>
           <a:xfrm>
-            <a:off x="7396322" y="5142668"/>
-            <a:ext cx="482600" cy="369331"/>
+            <a:off x="3048802" y="2692742"/>
+            <a:ext cx="6097604" cy="1477328"/>
           </a:xfrm>
           <a:prstGeom prst="rect">
             <a:avLst/>
@@ -3604,1137 +3479,155 @@
           <a:noFill/>
         </p:spPr>
         <p:txBody>
-          <a:bodyPr wrap="square" rtlCol="0">
+          <a:bodyPr wrap="square">
             <a:spAutoFit/>
           </a:bodyPr>
           <a:lstStyle/>
           <a:p>
-            <a:r>
-              <a:rPr lang="nl-NL" dirty="0"/>
-              <a:t>ja</a:t>
-            </a:r>
-          </a:p>
-        </p:txBody>
-      </p:sp>
-      <p:sp>
-        <p:nvSpPr>
-          <p:cNvPr id="11" name="Tekstvak 10">
-            <a:extLst>
-              <a:ext uri="{FF2B5EF4-FFF2-40B4-BE49-F238E27FC236}">
-                <a16:creationId xmlns:a16="http://schemas.microsoft.com/office/drawing/2014/main" id="{24BF1C36-AAC4-4746-A44B-7C7CD57863FB}"/>
-              </a:ext>
-            </a:extLst>
-          </p:cNvPr>
-          <p:cNvSpPr txBox="1"/>
-          <p:nvPr/>
-        </p:nvSpPr>
-        <p:spPr>
-          <a:xfrm>
-            <a:off x="3301565" y="5007896"/>
-            <a:ext cx="860425" cy="369329"/>
-          </a:xfrm>
-          <a:prstGeom prst="rect">
-            <a:avLst/>
-          </a:prstGeom>
-          <a:noFill/>
-        </p:spPr>
-        <p:txBody>
-          <a:bodyPr wrap="square" rtlCol="0">
-            <a:spAutoFit/>
-          </a:bodyPr>
-          <a:lstStyle/>
-          <a:p>
-            <a:r>
-              <a:rPr lang="nl-NL" dirty="0"/>
-              <a:t>nee</a:t>
-            </a:r>
-          </a:p>
-        </p:txBody>
-      </p:sp>
-      <p:sp>
-        <p:nvSpPr>
-          <p:cNvPr id="12" name="Stroomdiagram: Gegevens 11">
-            <a:extLst>
-              <a:ext uri="{FF2B5EF4-FFF2-40B4-BE49-F238E27FC236}">
-                <a16:creationId xmlns:a16="http://schemas.microsoft.com/office/drawing/2014/main" id="{9C281F35-D601-44A1-BAC2-7FA90105636A}"/>
-              </a:ext>
-            </a:extLst>
-          </p:cNvPr>
-          <p:cNvSpPr/>
-          <p:nvPr/>
-        </p:nvSpPr>
-        <p:spPr>
-          <a:xfrm>
-            <a:off x="1635760" y="1902913"/>
-            <a:ext cx="2006600" cy="1628764"/>
-          </a:xfrm>
-          <a:prstGeom prst="flowChartInputOutput">
-            <a:avLst/>
-          </a:prstGeom>
-          <a:solidFill>
-            <a:schemeClr val="bg1"/>
-          </a:solidFill>
-        </p:spPr>
-        <p:style>
-          <a:lnRef idx="2">
-            <a:schemeClr val="accent1">
-              <a:shade val="50000"/>
-            </a:schemeClr>
-          </a:lnRef>
-          <a:fillRef idx="1">
-            <a:schemeClr val="accent1"/>
-          </a:fillRef>
-          <a:effectRef idx="0">
-            <a:schemeClr val="accent1"/>
-          </a:effectRef>
-          <a:fontRef idx="minor">
-            <a:schemeClr val="lt1"/>
-          </a:fontRef>
-        </p:style>
-        <p:txBody>
-          <a:bodyPr rtlCol="0" anchor="ctr"/>
-          <a:lstStyle/>
-          <a:p>
-            <a:pPr algn="ctr"/>
-            <a:r>
-              <a:rPr lang="nl-NL" dirty="0">
-                <a:solidFill>
-                  <a:schemeClr val="tx1"/>
-                </a:solidFill>
+            <a:pPr marL="342900" lvl="0" indent="-342900">
+              <a:buFont typeface="Symbol" panose="05050102010706020507" pitchFamily="18" charset="2"/>
+              <a:buChar char="-"/>
+            </a:pPr>
+            <a:r>
+              <a:rPr lang="nl-NL" sz="1800" dirty="0">
+                <a:effectLst/>
+                <a:latin typeface="Calibri" panose="020F0502020204030204" pitchFamily="34" charset="0"/>
+                <a:ea typeface="Calibri" panose="020F0502020204030204" pitchFamily="34" charset="0"/>
+                <a:cs typeface="Calibri" panose="020F0502020204030204" pitchFamily="34" charset="0"/>
               </a:rPr>
-              <a:t>Berekende </a:t>
-            </a:r>
-          </a:p>
-          <a:p>
-            <a:pPr algn="ctr"/>
-            <a:r>
-              <a:rPr lang="nl-NL" dirty="0">
-                <a:solidFill>
-                  <a:schemeClr val="tx1"/>
-                </a:solidFill>
-              </a:rPr>
-              <a:t>stuurhoek</a:t>
-            </a:r>
-          </a:p>
-        </p:txBody>
-      </p:sp>
-      <p:sp>
-        <p:nvSpPr>
-          <p:cNvPr id="13" name="Stroomdiagram: Gegevens 12">
-            <a:extLst>
-              <a:ext uri="{FF2B5EF4-FFF2-40B4-BE49-F238E27FC236}">
-                <a16:creationId xmlns:a16="http://schemas.microsoft.com/office/drawing/2014/main" id="{2D1793F6-D3F9-4D8F-B10E-3F5649D67E7C}"/>
-              </a:ext>
-            </a:extLst>
-          </p:cNvPr>
-          <p:cNvSpPr/>
-          <p:nvPr/>
-        </p:nvSpPr>
-        <p:spPr>
-          <a:xfrm>
-            <a:off x="9114616" y="2606664"/>
-            <a:ext cx="2006600" cy="1628764"/>
-          </a:xfrm>
-          <a:prstGeom prst="flowChartInputOutput">
-            <a:avLst/>
-          </a:prstGeom>
-          <a:solidFill>
-            <a:schemeClr val="bg1"/>
-          </a:solidFill>
-        </p:spPr>
-        <p:style>
-          <a:lnRef idx="2">
-            <a:schemeClr val="accent1">
-              <a:shade val="50000"/>
-            </a:schemeClr>
-          </a:lnRef>
-          <a:fillRef idx="1">
-            <a:schemeClr val="accent1"/>
-          </a:fillRef>
-          <a:effectRef idx="0">
-            <a:schemeClr val="accent1"/>
-          </a:effectRef>
-          <a:fontRef idx="minor">
-            <a:schemeClr val="lt1"/>
-          </a:fontRef>
-        </p:style>
-        <p:txBody>
-          <a:bodyPr rtlCol="0" anchor="ctr"/>
-          <a:lstStyle/>
-          <a:p>
-            <a:pPr algn="ctr"/>
-            <a:r>
-              <a:rPr lang="nl-NL" dirty="0">
-                <a:solidFill>
-                  <a:schemeClr val="tx1"/>
-                </a:solidFill>
-              </a:rPr>
-              <a:t>Stuurhoek</a:t>
-            </a:r>
-          </a:p>
-          <a:p>
-            <a:pPr algn="ctr"/>
-            <a:r>
-              <a:rPr lang="nl-NL" dirty="0">
-                <a:solidFill>
-                  <a:schemeClr val="tx1"/>
-                </a:solidFill>
-              </a:rPr>
-              <a:t>Set Training</a:t>
-            </a:r>
-          </a:p>
-        </p:txBody>
-      </p:sp>
-      <p:sp>
-        <p:nvSpPr>
-          <p:cNvPr id="14" name="Stroomdiagram: Gegevens 13">
-            <a:extLst>
-              <a:ext uri="{FF2B5EF4-FFF2-40B4-BE49-F238E27FC236}">
-                <a16:creationId xmlns:a16="http://schemas.microsoft.com/office/drawing/2014/main" id="{26A2316D-04C1-44FD-8211-0866BBFC914C}"/>
-              </a:ext>
-            </a:extLst>
-          </p:cNvPr>
-          <p:cNvSpPr/>
-          <p:nvPr/>
-        </p:nvSpPr>
-        <p:spPr>
-          <a:xfrm>
-            <a:off x="9315276" y="329944"/>
-            <a:ext cx="2235198" cy="1628764"/>
-          </a:xfrm>
-          <a:prstGeom prst="flowChartInputOutput">
-            <a:avLst/>
-          </a:prstGeom>
-          <a:solidFill>
-            <a:schemeClr val="bg1"/>
-          </a:solidFill>
-        </p:spPr>
-        <p:style>
-          <a:lnRef idx="2">
-            <a:schemeClr val="accent1">
-              <a:shade val="50000"/>
-            </a:schemeClr>
-          </a:lnRef>
-          <a:fillRef idx="1">
-            <a:schemeClr val="accent1"/>
-          </a:fillRef>
-          <a:effectRef idx="0">
-            <a:schemeClr val="accent1"/>
-          </a:effectRef>
-          <a:fontRef idx="minor">
-            <a:schemeClr val="lt1"/>
-          </a:fontRef>
-        </p:style>
-        <p:txBody>
-          <a:bodyPr rtlCol="0" anchor="ctr"/>
-          <a:lstStyle/>
-          <a:p>
-            <a:pPr algn="ctr"/>
-            <a:r>
-              <a:rPr lang="nl-NL" dirty="0">
-                <a:solidFill>
-                  <a:schemeClr val="tx1"/>
-                </a:solidFill>
-              </a:rPr>
-              <a:t>sonar</a:t>
-            </a:r>
-          </a:p>
-          <a:p>
-            <a:pPr algn="ctr"/>
-            <a:r>
-              <a:rPr lang="nl-NL" dirty="0" err="1">
-                <a:solidFill>
-                  <a:schemeClr val="tx1"/>
-                </a:solidFill>
+              <a:t>Aanmaken </a:t>
+            </a:r>
+            <a:r>
+              <a:rPr lang="nl-NL" sz="1800" dirty="0" err="1">
+                <a:effectLst/>
+                <a:latin typeface="Calibri" panose="020F0502020204030204" pitchFamily="34" charset="0"/>
+                <a:ea typeface="Calibri" panose="020F0502020204030204" pitchFamily="34" charset="0"/>
+                <a:cs typeface="Calibri" panose="020F0502020204030204" pitchFamily="34" charset="0"/>
               </a:rPr>
               <a:t>trainingsset</a:t>
             </a:r>
-            <a:endParaRPr lang="nl-NL" dirty="0">
-              <a:solidFill>
-                <a:schemeClr val="tx1"/>
-              </a:solidFill>
+            <a:endParaRPr lang="nl-NL" sz="1800" dirty="0">
+              <a:effectLst/>
+              <a:latin typeface="Calibri" panose="020F0502020204030204" pitchFamily="34" charset="0"/>
+              <a:ea typeface="Calibri" panose="020F0502020204030204" pitchFamily="34" charset="0"/>
+              <a:cs typeface="Calibri" panose="020F0502020204030204" pitchFamily="34" charset="0"/>
             </a:endParaRPr>
           </a:p>
-        </p:txBody>
-      </p:sp>
-      <p:cxnSp>
-        <p:nvCxnSpPr>
-          <p:cNvPr id="15" name="Rechte verbindingslijn met pijl 14">
-            <a:extLst>
-              <a:ext uri="{FF2B5EF4-FFF2-40B4-BE49-F238E27FC236}">
-                <a16:creationId xmlns:a16="http://schemas.microsoft.com/office/drawing/2014/main" id="{DAD226EA-C7A5-4AC3-A9E6-316299D02883}"/>
-              </a:ext>
-            </a:extLst>
-          </p:cNvPr>
-          <p:cNvCxnSpPr>
-            <a:cxnSpLocks/>
-            <a:stCxn id="14" idx="2"/>
-            <a:endCxn id="21" idx="3"/>
-          </p:cNvCxnSpPr>
-          <p:nvPr/>
-        </p:nvCxnSpPr>
-        <p:spPr>
-          <a:xfrm flipH="1" flipV="1">
-            <a:off x="8018463" y="991825"/>
-            <a:ext cx="1520333" cy="152501"/>
-          </a:xfrm>
-          <a:prstGeom prst="straightConnector1">
-            <a:avLst/>
-          </a:prstGeom>
-          <a:ln w="63500">
-            <a:tailEnd type="triangle"/>
-          </a:ln>
-        </p:spPr>
-        <p:style>
-          <a:lnRef idx="1">
-            <a:schemeClr val="accent1"/>
-          </a:lnRef>
-          <a:fillRef idx="0">
-            <a:schemeClr val="accent1"/>
-          </a:fillRef>
-          <a:effectRef idx="0">
-            <a:schemeClr val="accent1"/>
-          </a:effectRef>
-          <a:fontRef idx="minor">
-            <a:schemeClr val="tx1"/>
-          </a:fontRef>
-        </p:style>
-      </p:cxnSp>
-      <p:cxnSp>
-        <p:nvCxnSpPr>
-          <p:cNvPr id="19" name="Rechte verbindingslijn met pijl 18">
-            <a:extLst>
-              <a:ext uri="{FF2B5EF4-FFF2-40B4-BE49-F238E27FC236}">
-                <a16:creationId xmlns:a16="http://schemas.microsoft.com/office/drawing/2014/main" id="{21C21419-5533-4E69-A61F-AF7222878AAE}"/>
-              </a:ext>
-            </a:extLst>
-          </p:cNvPr>
-          <p:cNvCxnSpPr>
-            <a:cxnSpLocks/>
-            <a:stCxn id="3" idx="2"/>
-            <a:endCxn id="12" idx="0"/>
-          </p:cNvCxnSpPr>
-          <p:nvPr/>
-        </p:nvCxnSpPr>
-        <p:spPr>
-          <a:xfrm flipH="1">
-            <a:off x="2839720" y="1310752"/>
-            <a:ext cx="1408626" cy="592161"/>
-          </a:xfrm>
-          <a:prstGeom prst="straightConnector1">
-            <a:avLst/>
-          </a:prstGeom>
-          <a:ln w="63500">
-            <a:tailEnd type="triangle"/>
-          </a:ln>
-        </p:spPr>
-        <p:style>
-          <a:lnRef idx="1">
-            <a:schemeClr val="accent1"/>
-          </a:lnRef>
-          <a:fillRef idx="0">
-            <a:schemeClr val="accent1"/>
-          </a:fillRef>
-          <a:effectRef idx="0">
-            <a:schemeClr val="accent1"/>
-          </a:effectRef>
-          <a:fontRef idx="minor">
-            <a:schemeClr val="tx1"/>
-          </a:fontRef>
-        </p:style>
-      </p:cxnSp>
-      <p:cxnSp>
-        <p:nvCxnSpPr>
-          <p:cNvPr id="22" name="Rechte verbindingslijn met pijl 21">
-            <a:extLst>
-              <a:ext uri="{FF2B5EF4-FFF2-40B4-BE49-F238E27FC236}">
-                <a16:creationId xmlns:a16="http://schemas.microsoft.com/office/drawing/2014/main" id="{974022EF-0F1C-4B9A-8431-BC21B4D768AC}"/>
-              </a:ext>
-            </a:extLst>
-          </p:cNvPr>
-          <p:cNvCxnSpPr>
-            <a:cxnSpLocks/>
-            <a:stCxn id="12" idx="3"/>
-            <a:endCxn id="4" idx="0"/>
-          </p:cNvCxnSpPr>
-          <p:nvPr/>
-        </p:nvCxnSpPr>
-        <p:spPr>
-          <a:xfrm>
-            <a:off x="2438400" y="3531677"/>
-            <a:ext cx="2902663" cy="1493385"/>
-          </a:xfrm>
-          <a:prstGeom prst="straightConnector1">
-            <a:avLst/>
-          </a:prstGeom>
-          <a:ln w="63500">
-            <a:tailEnd type="triangle"/>
-          </a:ln>
-        </p:spPr>
-        <p:style>
-          <a:lnRef idx="1">
-            <a:schemeClr val="accent1"/>
-          </a:lnRef>
-          <a:fillRef idx="0">
-            <a:schemeClr val="accent1"/>
-          </a:fillRef>
-          <a:effectRef idx="0">
-            <a:schemeClr val="accent1"/>
-          </a:effectRef>
-          <a:fontRef idx="minor">
-            <a:schemeClr val="tx1"/>
-          </a:fontRef>
-        </p:style>
-      </p:cxnSp>
-      <p:cxnSp>
-        <p:nvCxnSpPr>
-          <p:cNvPr id="25" name="Rechte verbindingslijn met pijl 24">
-            <a:extLst>
-              <a:ext uri="{FF2B5EF4-FFF2-40B4-BE49-F238E27FC236}">
-                <a16:creationId xmlns:a16="http://schemas.microsoft.com/office/drawing/2014/main" id="{97F5BA44-DFD9-43A4-82CC-8728875ADA2D}"/>
-              </a:ext>
-            </a:extLst>
-          </p:cNvPr>
-          <p:cNvCxnSpPr>
-            <a:cxnSpLocks/>
-            <a:stCxn id="91" idx="3"/>
-            <a:endCxn id="4" idx="0"/>
-          </p:cNvCxnSpPr>
-          <p:nvPr/>
-        </p:nvCxnSpPr>
-        <p:spPr>
-          <a:xfrm>
-            <a:off x="4592051" y="3830855"/>
-            <a:ext cx="749012" cy="1194207"/>
-          </a:xfrm>
-          <a:prstGeom prst="straightConnector1">
-            <a:avLst/>
-          </a:prstGeom>
-          <a:ln w="63500">
-            <a:tailEnd type="triangle"/>
-          </a:ln>
-        </p:spPr>
-        <p:style>
-          <a:lnRef idx="1">
-            <a:schemeClr val="accent1"/>
-          </a:lnRef>
-          <a:fillRef idx="0">
-            <a:schemeClr val="accent1"/>
-          </a:fillRef>
-          <a:effectRef idx="0">
-            <a:schemeClr val="accent1"/>
-          </a:effectRef>
-          <a:fontRef idx="minor">
-            <a:schemeClr val="tx1"/>
-          </a:fontRef>
-        </p:style>
-      </p:cxnSp>
-      <p:sp>
-        <p:nvSpPr>
-          <p:cNvPr id="16" name="Stroomdiagram: Proces 15">
-            <a:extLst>
-              <a:ext uri="{FF2B5EF4-FFF2-40B4-BE49-F238E27FC236}">
-                <a16:creationId xmlns:a16="http://schemas.microsoft.com/office/drawing/2014/main" id="{43244513-258D-4E1F-B1B9-69EF5C4D28DB}"/>
-              </a:ext>
-            </a:extLst>
-          </p:cNvPr>
-          <p:cNvSpPr/>
-          <p:nvPr/>
-        </p:nvSpPr>
-        <p:spPr>
-          <a:xfrm>
-            <a:off x="1725177" y="5547248"/>
-            <a:ext cx="2006600" cy="1101396"/>
-          </a:xfrm>
-          <a:prstGeom prst="flowChartProcess">
-            <a:avLst/>
-          </a:prstGeom>
-        </p:spPr>
-        <p:style>
-          <a:lnRef idx="2">
-            <a:schemeClr val="accent6"/>
-          </a:lnRef>
-          <a:fillRef idx="1">
-            <a:schemeClr val="lt1"/>
-          </a:fillRef>
-          <a:effectRef idx="0">
-            <a:schemeClr val="accent6"/>
-          </a:effectRef>
-          <a:fontRef idx="minor">
-            <a:schemeClr val="dk1"/>
-          </a:fontRef>
-        </p:style>
-        <p:txBody>
-          <a:bodyPr rtlCol="0" anchor="ctr"/>
-          <a:lstStyle/>
-          <a:p>
-            <a:pPr algn="ctr"/>
-            <a:r>
-              <a:rPr lang="nl-NL" dirty="0"/>
-              <a:t>Pas gewichtsfactoren in </a:t>
-            </a:r>
-            <a:r>
-              <a:rPr lang="nl-NL" u="sng" dirty="0"/>
-              <a:t>ene</a:t>
-            </a:r>
-            <a:r>
-              <a:rPr lang="nl-NL" dirty="0"/>
-              <a:t> richting af</a:t>
-            </a:r>
-          </a:p>
-          <a:p>
-            <a:pPr algn="ctr"/>
-            <a:endParaRPr lang="nl-NL" dirty="0"/>
-          </a:p>
-        </p:txBody>
-      </p:sp>
-      <p:sp>
-        <p:nvSpPr>
-          <p:cNvPr id="17" name="Stroomdiagram: Proces 16">
-            <a:extLst>
-              <a:ext uri="{FF2B5EF4-FFF2-40B4-BE49-F238E27FC236}">
-                <a16:creationId xmlns:a16="http://schemas.microsoft.com/office/drawing/2014/main" id="{D4172E3A-2B14-4B42-BC99-6D84450BEF9B}"/>
-              </a:ext>
-            </a:extLst>
-          </p:cNvPr>
-          <p:cNvSpPr/>
-          <p:nvPr/>
-        </p:nvSpPr>
-        <p:spPr>
-          <a:xfrm>
-            <a:off x="8508630" y="5257991"/>
-            <a:ext cx="2006600" cy="1101397"/>
-          </a:xfrm>
-          <a:prstGeom prst="flowChartProcess">
-            <a:avLst/>
-          </a:prstGeom>
-        </p:spPr>
-        <p:style>
-          <a:lnRef idx="2">
-            <a:schemeClr val="accent6"/>
-          </a:lnRef>
-          <a:fillRef idx="1">
-            <a:schemeClr val="lt1"/>
-          </a:fillRef>
-          <a:effectRef idx="0">
-            <a:schemeClr val="accent6"/>
-          </a:effectRef>
-          <a:fontRef idx="minor">
-            <a:schemeClr val="dk1"/>
-          </a:fontRef>
-        </p:style>
-        <p:txBody>
-          <a:bodyPr rtlCol="0" anchor="ctr"/>
-          <a:lstStyle/>
-          <a:p>
-            <a:pPr algn="ctr"/>
-            <a:r>
-              <a:rPr lang="nl-NL" dirty="0"/>
-              <a:t>Pas gewichtsfactoren in </a:t>
-            </a:r>
-            <a:r>
-              <a:rPr lang="nl-NL" u="sng" dirty="0"/>
-              <a:t>andere</a:t>
-            </a:r>
-            <a:r>
-              <a:rPr lang="nl-NL" dirty="0"/>
-              <a:t> richting af</a:t>
-            </a:r>
-          </a:p>
-          <a:p>
-            <a:pPr algn="ctr"/>
-            <a:endParaRPr lang="nl-NL" dirty="0"/>
-          </a:p>
-        </p:txBody>
-      </p:sp>
-      <p:sp>
-        <p:nvSpPr>
-          <p:cNvPr id="21" name="Stroomdiagram: Proces 20">
-            <a:extLst>
-              <a:ext uri="{FF2B5EF4-FFF2-40B4-BE49-F238E27FC236}">
-                <a16:creationId xmlns:a16="http://schemas.microsoft.com/office/drawing/2014/main" id="{9EC709CC-15CC-473B-9D51-06A4D1AC8923}"/>
-              </a:ext>
-            </a:extLst>
-          </p:cNvPr>
-          <p:cNvSpPr/>
-          <p:nvPr/>
-        </p:nvSpPr>
-        <p:spPr>
-          <a:xfrm>
-            <a:off x="6011863" y="502875"/>
-            <a:ext cx="2006600" cy="977900"/>
-          </a:xfrm>
-          <a:prstGeom prst="flowChartProcess">
-            <a:avLst/>
-          </a:prstGeom>
-        </p:spPr>
-        <p:style>
-          <a:lnRef idx="2">
-            <a:schemeClr val="accent6"/>
-          </a:lnRef>
-          <a:fillRef idx="1">
-            <a:schemeClr val="lt1"/>
-          </a:fillRef>
-          <a:effectRef idx="0">
-            <a:schemeClr val="accent6"/>
-          </a:effectRef>
-          <a:fontRef idx="minor">
-            <a:schemeClr val="dk1"/>
-          </a:fontRef>
-        </p:style>
-        <p:txBody>
-          <a:bodyPr rtlCol="0" anchor="ctr"/>
-          <a:lstStyle/>
-          <a:p>
-            <a:pPr algn="ctr"/>
-            <a:r>
-              <a:rPr lang="nl-NL" dirty="0"/>
-              <a:t>3 sonarwaardes uit </a:t>
-            </a:r>
-            <a:r>
-              <a:rPr lang="nl-NL" dirty="0" err="1"/>
-              <a:t>trainingsset</a:t>
-            </a:r>
-            <a:endParaRPr lang="nl-NL" dirty="0"/>
-          </a:p>
-          <a:p>
-            <a:pPr algn="ctr"/>
-            <a:endParaRPr lang="nl-NL" dirty="0"/>
-          </a:p>
-        </p:txBody>
-      </p:sp>
-      <p:cxnSp>
-        <p:nvCxnSpPr>
-          <p:cNvPr id="24" name="Rechte verbindingslijn met pijl 23">
-            <a:extLst>
-              <a:ext uri="{FF2B5EF4-FFF2-40B4-BE49-F238E27FC236}">
-                <a16:creationId xmlns:a16="http://schemas.microsoft.com/office/drawing/2014/main" id="{86F86A8A-2FDD-46AF-BC9B-937F78402C58}"/>
-              </a:ext>
-            </a:extLst>
-          </p:cNvPr>
-          <p:cNvCxnSpPr>
-            <a:cxnSpLocks/>
-            <a:stCxn id="21" idx="1"/>
-            <a:endCxn id="3" idx="3"/>
-          </p:cNvCxnSpPr>
-          <p:nvPr/>
-        </p:nvCxnSpPr>
-        <p:spPr>
-          <a:xfrm flipH="1" flipV="1">
-            <a:off x="5251646" y="821802"/>
-            <a:ext cx="760217" cy="170023"/>
-          </a:xfrm>
-          <a:prstGeom prst="straightConnector1">
-            <a:avLst/>
-          </a:prstGeom>
-          <a:ln w="63500">
-            <a:tailEnd type="triangle"/>
-          </a:ln>
-        </p:spPr>
-        <p:style>
-          <a:lnRef idx="1">
-            <a:schemeClr val="accent1"/>
-          </a:lnRef>
-          <a:fillRef idx="0">
-            <a:schemeClr val="accent1"/>
-          </a:fillRef>
-          <a:effectRef idx="0">
-            <a:schemeClr val="accent1"/>
-          </a:effectRef>
-          <a:fontRef idx="minor">
-            <a:schemeClr val="tx1"/>
-          </a:fontRef>
-        </p:style>
-      </p:cxnSp>
-      <p:cxnSp>
-        <p:nvCxnSpPr>
-          <p:cNvPr id="41" name="Rechte verbindingslijn met pijl 40">
-            <a:extLst>
-              <a:ext uri="{FF2B5EF4-FFF2-40B4-BE49-F238E27FC236}">
-                <a16:creationId xmlns:a16="http://schemas.microsoft.com/office/drawing/2014/main" id="{4FBA68BD-2C8B-43B1-BEA4-C9B9FE15940B}"/>
-              </a:ext>
-            </a:extLst>
-          </p:cNvPr>
-          <p:cNvCxnSpPr>
-            <a:cxnSpLocks/>
-            <a:stCxn id="13" idx="2"/>
-            <a:endCxn id="91" idx="5"/>
-          </p:cNvCxnSpPr>
-          <p:nvPr/>
-        </p:nvCxnSpPr>
-        <p:spPr>
-          <a:xfrm flipH="1" flipV="1">
-            <a:off x="5545888" y="3096699"/>
-            <a:ext cx="3769388" cy="324347"/>
-          </a:xfrm>
-          <a:prstGeom prst="straightConnector1">
-            <a:avLst/>
-          </a:prstGeom>
-          <a:ln w="63500">
-            <a:tailEnd type="triangle"/>
-          </a:ln>
-        </p:spPr>
-        <p:style>
-          <a:lnRef idx="1">
-            <a:schemeClr val="accent1"/>
-          </a:lnRef>
-          <a:fillRef idx="0">
-            <a:schemeClr val="accent1"/>
-          </a:fillRef>
-          <a:effectRef idx="0">
-            <a:schemeClr val="accent1"/>
-          </a:effectRef>
-          <a:fontRef idx="minor">
-            <a:schemeClr val="tx1"/>
-          </a:fontRef>
-        </p:style>
-      </p:cxnSp>
-      <p:cxnSp>
-        <p:nvCxnSpPr>
-          <p:cNvPr id="66" name="Rechte verbindingslijn met pijl 65">
-            <a:extLst>
-              <a:ext uri="{FF2B5EF4-FFF2-40B4-BE49-F238E27FC236}">
-                <a16:creationId xmlns:a16="http://schemas.microsoft.com/office/drawing/2014/main" id="{73C26EA3-8EE1-4691-9CBC-1CBA028B9316}"/>
-              </a:ext>
-            </a:extLst>
-          </p:cNvPr>
-          <p:cNvCxnSpPr>
-            <a:cxnSpLocks/>
-            <a:stCxn id="16" idx="0"/>
-            <a:endCxn id="3" idx="2"/>
-          </p:cNvCxnSpPr>
-          <p:nvPr/>
-        </p:nvCxnSpPr>
-        <p:spPr>
-          <a:xfrm flipV="1">
-            <a:off x="2728477" y="1310752"/>
-            <a:ext cx="1519869" cy="4236496"/>
-          </a:xfrm>
-          <a:prstGeom prst="straightConnector1">
-            <a:avLst/>
-          </a:prstGeom>
-          <a:ln w="63500">
-            <a:tailEnd type="triangle"/>
-          </a:ln>
-        </p:spPr>
-        <p:style>
-          <a:lnRef idx="1">
-            <a:schemeClr val="accent1"/>
-          </a:lnRef>
-          <a:fillRef idx="0">
-            <a:schemeClr val="accent1"/>
-          </a:fillRef>
-          <a:effectRef idx="0">
-            <a:schemeClr val="accent1"/>
-          </a:effectRef>
-          <a:fontRef idx="minor">
-            <a:schemeClr val="tx1"/>
-          </a:fontRef>
-        </p:style>
-      </p:cxnSp>
-      <p:cxnSp>
-        <p:nvCxnSpPr>
-          <p:cNvPr id="69" name="Rechte verbindingslijn met pijl 68">
-            <a:extLst>
-              <a:ext uri="{FF2B5EF4-FFF2-40B4-BE49-F238E27FC236}">
-                <a16:creationId xmlns:a16="http://schemas.microsoft.com/office/drawing/2014/main" id="{67C14B19-C553-4DE0-BBC8-25A4C0764DB0}"/>
-              </a:ext>
-            </a:extLst>
-          </p:cNvPr>
-          <p:cNvCxnSpPr>
-            <a:cxnSpLocks/>
-            <a:stCxn id="17" idx="0"/>
-            <a:endCxn id="3" idx="2"/>
-          </p:cNvCxnSpPr>
-          <p:nvPr/>
-        </p:nvCxnSpPr>
-        <p:spPr>
-          <a:xfrm flipH="1" flipV="1">
-            <a:off x="4248346" y="1310752"/>
-            <a:ext cx="5263584" cy="3947239"/>
-          </a:xfrm>
-          <a:prstGeom prst="straightConnector1">
-            <a:avLst/>
-          </a:prstGeom>
-          <a:ln w="63500">
-            <a:tailEnd type="triangle"/>
-          </a:ln>
-        </p:spPr>
-        <p:style>
-          <a:lnRef idx="1">
-            <a:schemeClr val="accent1"/>
-          </a:lnRef>
-          <a:fillRef idx="0">
-            <a:schemeClr val="accent1"/>
-          </a:fillRef>
-          <a:effectRef idx="0">
-            <a:schemeClr val="accent1"/>
-          </a:effectRef>
-          <a:fontRef idx="minor">
-            <a:schemeClr val="tx1"/>
-          </a:fontRef>
-        </p:style>
-      </p:cxnSp>
-      <p:sp>
-        <p:nvSpPr>
-          <p:cNvPr id="84" name="Tekstvak 83">
-            <a:extLst>
-              <a:ext uri="{FF2B5EF4-FFF2-40B4-BE49-F238E27FC236}">
-                <a16:creationId xmlns:a16="http://schemas.microsoft.com/office/drawing/2014/main" id="{C3DADC57-9460-4866-9B4C-A102C3CE9564}"/>
-              </a:ext>
-            </a:extLst>
-          </p:cNvPr>
-          <p:cNvSpPr txBox="1"/>
-          <p:nvPr/>
-        </p:nvSpPr>
-        <p:spPr>
-          <a:xfrm>
-            <a:off x="1926387" y="421531"/>
-            <a:ext cx="1115996" cy="646331"/>
-          </a:xfrm>
-          <a:prstGeom prst="rect">
-            <a:avLst/>
-          </a:prstGeom>
-          <a:noFill/>
-        </p:spPr>
-        <p:txBody>
-          <a:bodyPr wrap="square" rtlCol="0">
-            <a:spAutoFit/>
-          </a:bodyPr>
-          <a:lstStyle/>
-          <a:p>
-            <a:r>
-              <a:rPr lang="nl-NL" dirty="0" err="1"/>
-              <a:t>Hidden</a:t>
-            </a:r>
-            <a:endParaRPr lang="nl-NL" dirty="0"/>
-          </a:p>
-          <a:p>
-            <a:r>
-              <a:rPr lang="nl-NL" dirty="0" err="1"/>
+          <a:p>
+            <a:pPr marL="342900" lvl="0" indent="-342900">
+              <a:buFont typeface="Symbol" panose="05050102010706020507" pitchFamily="18" charset="2"/>
+              <a:buChar char="-"/>
+            </a:pPr>
+            <a:r>
+              <a:rPr lang="nl-NL" sz="1800" dirty="0">
+                <a:effectLst/>
+                <a:latin typeface="Calibri" panose="020F0502020204030204" pitchFamily="34" charset="0"/>
+                <a:ea typeface="Calibri" panose="020F0502020204030204" pitchFamily="34" charset="0"/>
+                <a:cs typeface="Calibri" panose="020F0502020204030204" pitchFamily="34" charset="0"/>
+              </a:rPr>
+              <a:t>Bouwen topologie netwerk, (</a:t>
+            </a:r>
+            <a:r>
+              <a:rPr lang="nl-NL" sz="1800" dirty="0" err="1">
+                <a:effectLst/>
+                <a:latin typeface="Calibri" panose="020F0502020204030204" pitchFamily="34" charset="0"/>
+                <a:ea typeface="Calibri" panose="020F0502020204030204" pitchFamily="34" charset="0"/>
+                <a:cs typeface="Calibri" panose="020F0502020204030204" pitchFamily="34" charset="0"/>
+              </a:rPr>
               <a:t>layers</a:t>
             </a:r>
-            <a:endParaRPr lang="nl-NL" dirty="0"/>
-          </a:p>
-        </p:txBody>
-      </p:sp>
-      <p:sp>
-        <p:nvSpPr>
-          <p:cNvPr id="85" name="Tekstvak 84">
-            <a:extLst>
-              <a:ext uri="{FF2B5EF4-FFF2-40B4-BE49-F238E27FC236}">
-                <a16:creationId xmlns:a16="http://schemas.microsoft.com/office/drawing/2014/main" id="{677E02A1-2E9B-4816-9709-8BB6E6886107}"/>
-              </a:ext>
-            </a:extLst>
-          </p:cNvPr>
-          <p:cNvSpPr txBox="1"/>
-          <p:nvPr/>
-        </p:nvSpPr>
-        <p:spPr>
-          <a:xfrm>
-            <a:off x="917189" y="2435608"/>
-            <a:ext cx="1115996" cy="646331"/>
-          </a:xfrm>
-          <a:prstGeom prst="rect">
-            <a:avLst/>
-          </a:prstGeom>
-          <a:noFill/>
-        </p:spPr>
-        <p:txBody>
-          <a:bodyPr wrap="square" rtlCol="0">
-            <a:spAutoFit/>
-          </a:bodyPr>
-          <a:lstStyle/>
-          <a:p>
-            <a:r>
-              <a:rPr lang="nl-NL" dirty="0"/>
-              <a:t>Output</a:t>
-            </a:r>
-          </a:p>
-          <a:p>
-            <a:r>
-              <a:rPr lang="nl-NL" dirty="0" err="1"/>
-              <a:t>layer</a:t>
-            </a:r>
-            <a:endParaRPr lang="nl-NL" dirty="0"/>
-          </a:p>
-        </p:txBody>
-      </p:sp>
-      <p:sp>
-        <p:nvSpPr>
-          <p:cNvPr id="86" name="Tekstvak 85">
-            <a:extLst>
-              <a:ext uri="{FF2B5EF4-FFF2-40B4-BE49-F238E27FC236}">
-                <a16:creationId xmlns:a16="http://schemas.microsoft.com/office/drawing/2014/main" id="{ED709283-D1AB-4502-9B40-850861D2313C}"/>
-              </a:ext>
-            </a:extLst>
-          </p:cNvPr>
-          <p:cNvSpPr txBox="1"/>
-          <p:nvPr/>
-        </p:nvSpPr>
-        <p:spPr>
-          <a:xfrm>
-            <a:off x="10586940" y="5235981"/>
-            <a:ext cx="1115996" cy="646331"/>
-          </a:xfrm>
-          <a:prstGeom prst="rect">
-            <a:avLst/>
-          </a:prstGeom>
-          <a:noFill/>
-        </p:spPr>
-        <p:txBody>
-          <a:bodyPr wrap="square" rtlCol="0">
-            <a:spAutoFit/>
-          </a:bodyPr>
-          <a:lstStyle/>
-          <a:p>
-            <a:r>
-              <a:rPr lang="nl-NL" dirty="0" err="1"/>
-              <a:t>Hidden</a:t>
-            </a:r>
-            <a:endParaRPr lang="nl-NL" dirty="0"/>
-          </a:p>
-          <a:p>
-            <a:r>
-              <a:rPr lang="nl-NL" dirty="0" err="1"/>
-              <a:t>layers</a:t>
-            </a:r>
-            <a:endParaRPr lang="nl-NL" dirty="0"/>
-          </a:p>
-        </p:txBody>
-      </p:sp>
-      <p:sp>
-        <p:nvSpPr>
-          <p:cNvPr id="87" name="Tekstvak 86">
-            <a:extLst>
-              <a:ext uri="{FF2B5EF4-FFF2-40B4-BE49-F238E27FC236}">
-                <a16:creationId xmlns:a16="http://schemas.microsoft.com/office/drawing/2014/main" id="{DD685F7F-5CCD-4B65-B1BA-1CCA06195FB3}"/>
-              </a:ext>
-            </a:extLst>
-          </p:cNvPr>
-          <p:cNvSpPr txBox="1"/>
-          <p:nvPr/>
-        </p:nvSpPr>
-        <p:spPr>
-          <a:xfrm>
-            <a:off x="1194969" y="4912816"/>
-            <a:ext cx="1115996" cy="646331"/>
-          </a:xfrm>
-          <a:prstGeom prst="rect">
-            <a:avLst/>
-          </a:prstGeom>
-          <a:noFill/>
-        </p:spPr>
-        <p:txBody>
-          <a:bodyPr wrap="square" rtlCol="0">
-            <a:spAutoFit/>
-          </a:bodyPr>
-          <a:lstStyle/>
-          <a:p>
-            <a:r>
-              <a:rPr lang="nl-NL" dirty="0" err="1"/>
-              <a:t>Hidden</a:t>
-            </a:r>
-            <a:endParaRPr lang="nl-NL" dirty="0"/>
-          </a:p>
-          <a:p>
-            <a:r>
-              <a:rPr lang="nl-NL" dirty="0" err="1"/>
-              <a:t>layers</a:t>
-            </a:r>
-            <a:endParaRPr lang="nl-NL" dirty="0"/>
-          </a:p>
-        </p:txBody>
-      </p:sp>
-      <p:sp>
-        <p:nvSpPr>
-          <p:cNvPr id="88" name="Tekstvak 87">
-            <a:extLst>
-              <a:ext uri="{FF2B5EF4-FFF2-40B4-BE49-F238E27FC236}">
-                <a16:creationId xmlns:a16="http://schemas.microsoft.com/office/drawing/2014/main" id="{6ABB1FE1-9A1B-47D4-9D7F-32D5C95FBBD4}"/>
-              </a:ext>
-            </a:extLst>
-          </p:cNvPr>
-          <p:cNvSpPr txBox="1"/>
-          <p:nvPr/>
-        </p:nvSpPr>
-        <p:spPr>
-          <a:xfrm>
-            <a:off x="5912653" y="-78776"/>
-            <a:ext cx="1115996" cy="646331"/>
-          </a:xfrm>
-          <a:prstGeom prst="rect">
-            <a:avLst/>
-          </a:prstGeom>
-          <a:noFill/>
-        </p:spPr>
-        <p:txBody>
-          <a:bodyPr wrap="square" rtlCol="0">
-            <a:spAutoFit/>
-          </a:bodyPr>
-          <a:lstStyle/>
-          <a:p>
-            <a:r>
-              <a:rPr lang="nl-NL" dirty="0"/>
-              <a:t>Input</a:t>
-            </a:r>
-          </a:p>
-          <a:p>
-            <a:r>
-              <a:rPr lang="nl-NL" dirty="0" err="1"/>
-              <a:t>layer</a:t>
-            </a:r>
-            <a:endParaRPr lang="nl-NL" dirty="0"/>
-          </a:p>
-        </p:txBody>
-      </p:sp>
-      <p:sp>
-        <p:nvSpPr>
-          <p:cNvPr id="89" name="Tekstvak 88">
-            <a:extLst>
-              <a:ext uri="{FF2B5EF4-FFF2-40B4-BE49-F238E27FC236}">
-                <a16:creationId xmlns:a16="http://schemas.microsoft.com/office/drawing/2014/main" id="{F2BE6DFE-5115-41F3-9093-A2F833EA3046}"/>
-              </a:ext>
-            </a:extLst>
-          </p:cNvPr>
-          <p:cNvSpPr txBox="1"/>
-          <p:nvPr/>
-        </p:nvSpPr>
-        <p:spPr>
-          <a:xfrm>
-            <a:off x="5607281" y="1695254"/>
-            <a:ext cx="1115996" cy="646331"/>
-          </a:xfrm>
-          <a:prstGeom prst="rect">
-            <a:avLst/>
-          </a:prstGeom>
-          <a:noFill/>
-        </p:spPr>
-        <p:txBody>
-          <a:bodyPr wrap="square" rtlCol="0">
-            <a:spAutoFit/>
-          </a:bodyPr>
-          <a:lstStyle/>
-          <a:p>
-            <a:r>
-              <a:rPr lang="nl-NL" dirty="0"/>
-              <a:t>Input</a:t>
-            </a:r>
-          </a:p>
-          <a:p>
-            <a:r>
-              <a:rPr lang="nl-NL" dirty="0" err="1"/>
-              <a:t>layer</a:t>
-            </a:r>
-            <a:endParaRPr lang="nl-NL" dirty="0"/>
-          </a:p>
-        </p:txBody>
-      </p:sp>
-      <p:sp>
-        <p:nvSpPr>
-          <p:cNvPr id="90" name="Tekstvak 89">
-            <a:extLst>
-              <a:ext uri="{FF2B5EF4-FFF2-40B4-BE49-F238E27FC236}">
-                <a16:creationId xmlns:a16="http://schemas.microsoft.com/office/drawing/2014/main" id="{E6609F7B-1DF2-4B08-A922-23E4DA7A8787}"/>
-              </a:ext>
-            </a:extLst>
-          </p:cNvPr>
-          <p:cNvSpPr txBox="1"/>
-          <p:nvPr/>
-        </p:nvSpPr>
-        <p:spPr>
-          <a:xfrm>
-            <a:off x="5577985" y="3287145"/>
-            <a:ext cx="1115996" cy="646331"/>
-          </a:xfrm>
-          <a:prstGeom prst="rect">
-            <a:avLst/>
-          </a:prstGeom>
-          <a:noFill/>
-        </p:spPr>
-        <p:txBody>
-          <a:bodyPr wrap="square" rtlCol="0">
-            <a:spAutoFit/>
-          </a:bodyPr>
-          <a:lstStyle/>
-          <a:p>
-            <a:r>
-              <a:rPr lang="nl-NL" dirty="0"/>
-              <a:t>Output</a:t>
-            </a:r>
-          </a:p>
-          <a:p>
-            <a:r>
-              <a:rPr lang="nl-NL" dirty="0" err="1"/>
-              <a:t>layer</a:t>
-            </a:r>
-            <a:endParaRPr lang="nl-NL" dirty="0"/>
-          </a:p>
-        </p:txBody>
-      </p:sp>
-      <p:sp>
-        <p:nvSpPr>
-          <p:cNvPr id="91" name="Stroomdiagram: Gegevens 90">
-            <a:extLst>
-              <a:ext uri="{FF2B5EF4-FFF2-40B4-BE49-F238E27FC236}">
-                <a16:creationId xmlns:a16="http://schemas.microsoft.com/office/drawing/2014/main" id="{D76AAF11-9842-4D2F-B0CA-B12D66A2691A}"/>
-              </a:ext>
-            </a:extLst>
-          </p:cNvPr>
-          <p:cNvSpPr/>
-          <p:nvPr/>
-        </p:nvSpPr>
-        <p:spPr>
-          <a:xfrm>
-            <a:off x="3828981" y="2362542"/>
-            <a:ext cx="1907674" cy="1468313"/>
-          </a:xfrm>
-          <a:prstGeom prst="flowChartInputOutput">
-            <a:avLst/>
-          </a:prstGeom>
-          <a:solidFill>
-            <a:schemeClr val="bg1"/>
-          </a:solidFill>
-        </p:spPr>
-        <p:style>
-          <a:lnRef idx="2">
-            <a:schemeClr val="accent1">
-              <a:shade val="50000"/>
-            </a:schemeClr>
-          </a:lnRef>
-          <a:fillRef idx="1">
-            <a:schemeClr val="accent1"/>
-          </a:fillRef>
-          <a:effectRef idx="0">
-            <a:schemeClr val="accent1"/>
-          </a:effectRef>
-          <a:fontRef idx="minor">
-            <a:schemeClr val="lt1"/>
-          </a:fontRef>
-        </p:style>
-        <p:txBody>
-          <a:bodyPr rtlCol="0" anchor="ctr"/>
-          <a:lstStyle/>
-          <a:p>
-            <a:pPr algn="ctr"/>
-            <a:r>
-              <a:rPr lang="nl-NL" dirty="0">
-                <a:solidFill>
-                  <a:schemeClr val="tx1"/>
-                </a:solidFill>
+            <a:r>
+              <a:rPr lang="nl-NL" sz="1800" dirty="0">
+                <a:effectLst/>
+                <a:latin typeface="Calibri" panose="020F0502020204030204" pitchFamily="34" charset="0"/>
+                <a:ea typeface="Calibri" panose="020F0502020204030204" pitchFamily="34" charset="0"/>
+                <a:cs typeface="Calibri" panose="020F0502020204030204" pitchFamily="34" charset="0"/>
               </a:rPr>
-              <a:t>Stuurhoek</a:t>
-            </a:r>
-          </a:p>
-          <a:p>
-            <a:pPr algn="ctr"/>
-            <a:r>
-              <a:rPr lang="nl-NL" dirty="0">
-                <a:solidFill>
-                  <a:schemeClr val="tx1"/>
-                </a:solidFill>
+              <a:t>, </a:t>
+            </a:r>
+            <a:r>
+              <a:rPr lang="nl-NL" sz="1800" dirty="0" err="1">
+                <a:effectLst/>
+                <a:latin typeface="Calibri" panose="020F0502020204030204" pitchFamily="34" charset="0"/>
+                <a:ea typeface="Calibri" panose="020F0502020204030204" pitchFamily="34" charset="0"/>
+                <a:cs typeface="Calibri" panose="020F0502020204030204" pitchFamily="34" charset="0"/>
               </a:rPr>
-              <a:t>Uit training</a:t>
+              <a:t>nodes</a:t>
+            </a:r>
+            <a:r>
+              <a:rPr lang="nl-NL" sz="1800" dirty="0">
+                <a:effectLst/>
+                <a:latin typeface="Calibri" panose="020F0502020204030204" pitchFamily="34" charset="0"/>
+                <a:ea typeface="Calibri" panose="020F0502020204030204" pitchFamily="34" charset="0"/>
+                <a:cs typeface="Calibri" panose="020F0502020204030204" pitchFamily="34" charset="0"/>
+              </a:rPr>
+              <a:t>, links )</a:t>
+            </a:r>
+          </a:p>
+          <a:p>
+            <a:pPr marL="342900" lvl="0" indent="-342900">
+              <a:buFont typeface="Symbol" panose="05050102010706020507" pitchFamily="18" charset="2"/>
+              <a:buChar char="-"/>
+            </a:pPr>
+            <a:r>
+              <a:rPr lang="nl-NL" sz="1800" dirty="0">
+                <a:effectLst/>
+                <a:latin typeface="Calibri" panose="020F0502020204030204" pitchFamily="34" charset="0"/>
+                <a:ea typeface="Calibri" panose="020F0502020204030204" pitchFamily="34" charset="0"/>
+                <a:cs typeface="Calibri" panose="020F0502020204030204" pitchFamily="34" charset="0"/>
+              </a:rPr>
+              <a:t>Preprocessing input data (sonar en </a:t>
+            </a:r>
+            <a:r>
+              <a:rPr lang="nl-NL" sz="1800" dirty="0" err="1">
+                <a:effectLst/>
+                <a:latin typeface="Calibri" panose="020F0502020204030204" pitchFamily="34" charset="0"/>
+                <a:ea typeface="Calibri" panose="020F0502020204030204" pitchFamily="34" charset="0"/>
+                <a:cs typeface="Calibri" panose="020F0502020204030204" pitchFamily="34" charset="0"/>
+              </a:rPr>
+              <a:t>lidar</a:t>
+            </a:r>
+            <a:r>
+              <a:rPr lang="nl-NL" sz="1800" dirty="0">
+                <a:effectLst/>
+                <a:latin typeface="Calibri" panose="020F0502020204030204" pitchFamily="34" charset="0"/>
+                <a:ea typeface="Calibri" panose="020F0502020204030204" pitchFamily="34" charset="0"/>
+                <a:cs typeface="Calibri" panose="020F0502020204030204" pitchFamily="34" charset="0"/>
+              </a:rPr>
+              <a:t> data)</a:t>
+            </a:r>
+          </a:p>
+          <a:p>
+            <a:pPr marL="342900" lvl="0" indent="-342900">
+              <a:buFont typeface="Symbol" panose="05050102010706020507" pitchFamily="18" charset="2"/>
+              <a:buChar char="-"/>
+            </a:pPr>
+            <a:r>
+              <a:rPr lang="nl-NL" sz="1800" dirty="0">
+                <a:effectLst/>
+                <a:latin typeface="Calibri" panose="020F0502020204030204" pitchFamily="34" charset="0"/>
+                <a:ea typeface="Calibri" panose="020F0502020204030204" pitchFamily="34" charset="0"/>
+                <a:cs typeface="Calibri" panose="020F0502020204030204" pitchFamily="34" charset="0"/>
+              </a:rPr>
+              <a:t>Trainen model van het model </a:t>
+            </a:r>
+          </a:p>
+          <a:p>
+            <a:pPr marL="342900" lvl="0" indent="-342900">
+              <a:spcAft>
+                <a:spcPts val="800"/>
+              </a:spcAft>
+              <a:buFont typeface="Symbol" panose="05050102010706020507" pitchFamily="18" charset="2"/>
+              <a:buChar char="-"/>
+            </a:pPr>
+            <a:r>
+              <a:rPr lang="nl-NL" sz="1800" dirty="0">
+                <a:effectLst/>
+                <a:latin typeface="Calibri" panose="020F0502020204030204" pitchFamily="34" charset="0"/>
+                <a:ea typeface="Calibri" panose="020F0502020204030204" pitchFamily="34" charset="0"/>
+                <a:cs typeface="Calibri" panose="020F0502020204030204" pitchFamily="34" charset="0"/>
+              </a:rPr>
+              <a:t>Validatie van het model </a:t>
             </a:r>
           </a:p>
         </p:txBody>
@@ -4742,7 +3635,7 @@
     </p:spTree>
     <p:extLst>
       <p:ext uri="{BB962C8B-B14F-4D97-AF65-F5344CB8AC3E}">
-        <p14:creationId xmlns:p14="http://schemas.microsoft.com/office/powerpoint/2010/main" val="3061699450"/>
+        <p14:creationId xmlns:p14="http://schemas.microsoft.com/office/powerpoint/2010/main" val="3047693261"/>
       </p:ext>
     </p:extLst>
   </p:cSld>
@@ -5505,7 +4398,7 @@
           <p:cNvPr id="2" name="Titel 1">
             <a:extLst>
               <a:ext uri="{FF2B5EF4-FFF2-40B4-BE49-F238E27FC236}">
-                <a16:creationId xmlns:a16="http://schemas.microsoft.com/office/drawing/2014/main" id="{651A5E02-6575-49F2-A37D-272F2DF0F254}"/>
+                <a16:creationId xmlns:a16="http://schemas.microsoft.com/office/drawing/2014/main" id="{7A824E01-556F-4E38-B8DE-A645FD814657}"/>
               </a:ext>
             </a:extLst>
           </p:cNvPr>
@@ -5516,187 +4409,12 @@
             <p:ph type="title"/>
           </p:nvPr>
         </p:nvSpPr>
-        <p:spPr/>
-        <p:txBody>
-          <a:bodyPr/>
-          <a:lstStyle/>
-          <a:p>
-            <a:r>
-              <a:rPr lang="nl-NL" dirty="0" err="1"/>
-              <a:t>Trainingset</a:t>
-            </a:r>
-            <a:r>
-              <a:rPr lang="nl-NL" dirty="0"/>
-              <a:t> ??? Inputdata, preprocessing</a:t>
-            </a:r>
-          </a:p>
-        </p:txBody>
-      </p:sp>
-    </p:spTree>
-    <p:extLst>
-      <p:ext uri="{BB962C8B-B14F-4D97-AF65-F5344CB8AC3E}">
-        <p14:creationId xmlns:p14="http://schemas.microsoft.com/office/powerpoint/2010/main" val="2567964085"/>
-      </p:ext>
-    </p:extLst>
-  </p:cSld>
-  <p:clrMapOvr>
-    <a:masterClrMapping/>
-  </p:clrMapOvr>
-</p:sld>
-</file>
-
-<file path=ppt/slides/slide5.xml><?xml version="1.0" encoding="utf-8"?>
-<p:sld xmlns:a="http://schemas.openxmlformats.org/drawingml/2006/main" xmlns:r="http://schemas.openxmlformats.org/officeDocument/2006/relationships" xmlns:p="http://schemas.openxmlformats.org/presentationml/2006/main">
-  <p:cSld>
-    <p:spTree>
-      <p:nvGrpSpPr>
-        <p:cNvPr id="1" name=""/>
-        <p:cNvGrpSpPr/>
-        <p:nvPr/>
-      </p:nvGrpSpPr>
-      <p:grpSpPr>
-        <a:xfrm>
-          <a:off x="0" y="0"/>
-          <a:ext cx="0" cy="0"/>
-          <a:chOff x="0" y="0"/>
-          <a:chExt cx="0" cy="0"/>
-        </a:xfrm>
-      </p:grpSpPr>
-      <p:pic>
-        <p:nvPicPr>
-          <p:cNvPr id="3" name="Afbeelding 2">
-            <a:extLst>
-              <a:ext uri="{FF2B5EF4-FFF2-40B4-BE49-F238E27FC236}">
-                <a16:creationId xmlns:a16="http://schemas.microsoft.com/office/drawing/2014/main" id="{08C9E57F-FAA2-476A-BCF5-10D745FF3B84}"/>
-              </a:ext>
-            </a:extLst>
-          </p:cNvPr>
-          <p:cNvPicPr>
-            <a:picLocks noChangeAspect="1"/>
-          </p:cNvPicPr>
-          <p:nvPr/>
-        </p:nvPicPr>
-        <p:blipFill>
-          <a:blip r:embed="rId2">
-            <a:extLst>
-              <a:ext uri="{28A0092B-C50C-407E-A947-70E740481C1C}">
-                <a14:useLocalDpi xmlns:a14="http://schemas.microsoft.com/office/drawing/2010/main" val="0"/>
-              </a:ext>
-            </a:extLst>
-          </a:blip>
-          <a:stretch>
-            <a:fillRect/>
-          </a:stretch>
-        </p:blipFill>
         <p:spPr>
           <a:xfrm>
-            <a:off x="105284" y="863600"/>
-            <a:ext cx="11536639" cy="5333999"/>
-          </a:xfrm>
-          <a:prstGeom prst="rect">
-            <a:avLst/>
-          </a:prstGeom>
-          <a:solidFill>
-            <a:schemeClr val="bg1"/>
-          </a:solidFill>
-        </p:spPr>
-      </p:pic>
-      <p:sp>
-        <p:nvSpPr>
-          <p:cNvPr id="4" name="Rechthoek 3">
-            <a:extLst>
-              <a:ext uri="{FF2B5EF4-FFF2-40B4-BE49-F238E27FC236}">
-                <a16:creationId xmlns:a16="http://schemas.microsoft.com/office/drawing/2014/main" id="{559715F1-7FEA-4889-B8F1-4D74E30AC34F}"/>
-              </a:ext>
-            </a:extLst>
-          </p:cNvPr>
-          <p:cNvSpPr/>
-          <p:nvPr/>
-        </p:nvSpPr>
-        <p:spPr>
-          <a:xfrm>
-            <a:off x="10058400" y="3683000"/>
-            <a:ext cx="990600" cy="1447800"/>
-          </a:xfrm>
-          <a:prstGeom prst="rect">
-            <a:avLst/>
-          </a:prstGeom>
-          <a:solidFill>
-            <a:schemeClr val="bg1"/>
-          </a:solidFill>
-        </p:spPr>
-        <p:style>
-          <a:lnRef idx="2">
-            <a:schemeClr val="accent1">
-              <a:shade val="50000"/>
-            </a:schemeClr>
-          </a:lnRef>
-          <a:fillRef idx="1">
-            <a:schemeClr val="accent1"/>
-          </a:fillRef>
-          <a:effectRef idx="0">
-            <a:schemeClr val="accent1"/>
-          </a:effectRef>
-          <a:fontRef idx="minor">
-            <a:schemeClr val="lt1"/>
-          </a:fontRef>
-        </p:style>
-        <p:txBody>
-          <a:bodyPr rtlCol="0" anchor="ctr"/>
-          <a:lstStyle/>
-          <a:p>
-            <a:pPr algn="ctr"/>
-            <a:endParaRPr lang="nl-NL"/>
-          </a:p>
-        </p:txBody>
-      </p:sp>
-    </p:spTree>
-    <p:extLst>
-      <p:ext uri="{BB962C8B-B14F-4D97-AF65-F5344CB8AC3E}">
-        <p14:creationId xmlns:p14="http://schemas.microsoft.com/office/powerpoint/2010/main" val="791945011"/>
-      </p:ext>
-    </p:extLst>
-  </p:cSld>
-  <p:clrMapOvr>
-    <a:masterClrMapping/>
-  </p:clrMapOvr>
-</p:sld>
-</file>
-
-<file path=ppt/slides/slide6.xml><?xml version="1.0" encoding="utf-8"?>
-<p:sld xmlns:a="http://schemas.openxmlformats.org/drawingml/2006/main" xmlns:r="http://schemas.openxmlformats.org/officeDocument/2006/relationships" xmlns:p="http://schemas.openxmlformats.org/presentationml/2006/main">
-  <p:cSld>
-    <p:spTree>
-      <p:nvGrpSpPr>
-        <p:cNvPr id="1" name=""/>
-        <p:cNvGrpSpPr/>
-        <p:nvPr/>
-      </p:nvGrpSpPr>
-      <p:grpSpPr>
-        <a:xfrm>
-          <a:off x="0" y="0"/>
-          <a:ext cx="0" cy="0"/>
-          <a:chOff x="0" y="0"/>
-          <a:chExt cx="0" cy="0"/>
-        </a:xfrm>
-      </p:grpSpPr>
-      <p:sp>
-        <p:nvSpPr>
-          <p:cNvPr id="2" name="Titel 1">
-            <a:extLst>
-              <a:ext uri="{FF2B5EF4-FFF2-40B4-BE49-F238E27FC236}">
-                <a16:creationId xmlns:a16="http://schemas.microsoft.com/office/drawing/2014/main" id="{7A824E01-556F-4E38-B8DE-A645FD814657}"/>
-              </a:ext>
-            </a:extLst>
-          </p:cNvPr>
-          <p:cNvSpPr>
-            <a:spLocks noGrp="1"/>
-          </p:cNvSpPr>
-          <p:nvPr>
-            <p:ph type="title"/>
-          </p:nvPr>
-        </p:nvSpPr>
-        <p:spPr/>
+            <a:off x="351790" y="220503"/>
+            <a:ext cx="10515600" cy="1325563"/>
+          </a:xfrm>
+        </p:spPr>
         <p:txBody>
           <a:bodyPr/>
           <a:lstStyle/>
@@ -6813,12 +5531,12 @@
                     <a:p>
                       <a:pPr algn="r" fontAlgn="b"/>
                       <a:r>
-                        <a:rPr lang="nl-NL" sz="1800" u="none" strike="noStrike">
+                        <a:rPr lang="nl-NL" sz="1800" u="none" strike="noStrike" dirty="0">
                           <a:effectLst/>
                         </a:rPr>
                         <a:t>1,7382</a:t>
                       </a:r>
-                      <a:endParaRPr lang="nl-NL" sz="1800" b="0" i="0" u="none" strike="noStrike">
+                      <a:endParaRPr lang="nl-NL" sz="1800" b="0" i="0" u="none" strike="noStrike" dirty="0">
                         <a:solidFill>
                           <a:srgbClr val="000000"/>
                         </a:solidFill>
@@ -6973,7 +5691,7 @@
           <p:nvPr/>
         </p:nvPicPr>
         <p:blipFill>
-          <a:blip r:embed="rId2">
+          <a:blip r:embed="rId3">
             <a:extLst>
               <a:ext uri="{28A0092B-C50C-407E-A947-70E740481C1C}">
                 <a14:useLocalDpi xmlns:a14="http://schemas.microsoft.com/office/drawing/2010/main" val="0"/>
@@ -7318,6 +6036,474 @@
     <p:extLst>
       <p:ext uri="{BB962C8B-B14F-4D97-AF65-F5344CB8AC3E}">
         <p14:creationId xmlns:p14="http://schemas.microsoft.com/office/powerpoint/2010/main" val="13390395"/>
+      </p:ext>
+    </p:extLst>
+  </p:cSld>
+  <p:clrMapOvr>
+    <a:masterClrMapping/>
+  </p:clrMapOvr>
+  <p:extLst>
+    <p:ext uri="{6950BFC3-D8DA-4A85-94F7-54DA5524770B}">
+      <p188:commentRel xmlns:p188="http://schemas.microsoft.com/office/powerpoint/2018/8/main" r:id="rId2"/>
+    </p:ext>
+  </p:extLst>
+</p:sld>
+</file>
+
+<file path=ppt/slides/slide5.xml><?xml version="1.0" encoding="utf-8"?>
+<p:sld xmlns:a="http://schemas.openxmlformats.org/drawingml/2006/main" xmlns:r="http://schemas.openxmlformats.org/officeDocument/2006/relationships" xmlns:p="http://schemas.openxmlformats.org/presentationml/2006/main">
+  <p:cSld>
+    <p:spTree>
+      <p:nvGrpSpPr>
+        <p:cNvPr id="1" name=""/>
+        <p:cNvGrpSpPr/>
+        <p:nvPr/>
+      </p:nvGrpSpPr>
+      <p:grpSpPr>
+        <a:xfrm>
+          <a:off x="0" y="0"/>
+          <a:ext cx="0" cy="0"/>
+          <a:chOff x="0" y="0"/>
+          <a:chExt cx="0" cy="0"/>
+        </a:xfrm>
+      </p:grpSpPr>
+      <p:sp>
+        <p:nvSpPr>
+          <p:cNvPr id="2" name="Titel 1">
+            <a:extLst>
+              <a:ext uri="{FF2B5EF4-FFF2-40B4-BE49-F238E27FC236}">
+                <a16:creationId xmlns:a16="http://schemas.microsoft.com/office/drawing/2014/main" id="{651A5E02-6575-49F2-A37D-272F2DF0F254}"/>
+              </a:ext>
+            </a:extLst>
+          </p:cNvPr>
+          <p:cNvSpPr>
+            <a:spLocks noGrp="1"/>
+          </p:cNvSpPr>
+          <p:nvPr>
+            <p:ph type="title"/>
+          </p:nvPr>
+        </p:nvSpPr>
+        <p:spPr/>
+        <p:txBody>
+          <a:bodyPr/>
+          <a:lstStyle/>
+          <a:p>
+            <a:r>
+              <a:rPr lang="nl-NL" dirty="0" err="1"/>
+              <a:t>Trainingset</a:t>
+            </a:r>
+            <a:r>
+              <a:rPr lang="nl-NL" dirty="0"/>
+              <a:t> ??? Inputdata, preprocessing</a:t>
+            </a:r>
+          </a:p>
+        </p:txBody>
+      </p:sp>
+      <p:sp>
+        <p:nvSpPr>
+          <p:cNvPr id="3" name="Stroomdiagram: Meerdere documenten 2">
+            <a:extLst>
+              <a:ext uri="{FF2B5EF4-FFF2-40B4-BE49-F238E27FC236}">
+                <a16:creationId xmlns:a16="http://schemas.microsoft.com/office/drawing/2014/main" id="{C8D78EE2-39EA-493E-BBA7-AAFA299428F4}"/>
+              </a:ext>
+            </a:extLst>
+          </p:cNvPr>
+          <p:cNvSpPr/>
+          <p:nvPr/>
+        </p:nvSpPr>
+        <p:spPr>
+          <a:xfrm>
+            <a:off x="550245" y="1469264"/>
+            <a:ext cx="2497755" cy="2442144"/>
+          </a:xfrm>
+          <a:prstGeom prst="flowChartMultidocument">
+            <a:avLst/>
+          </a:prstGeom>
+        </p:spPr>
+        <p:style>
+          <a:lnRef idx="2">
+            <a:schemeClr val="accent4">
+              <a:shade val="50000"/>
+            </a:schemeClr>
+          </a:lnRef>
+          <a:fillRef idx="1">
+            <a:schemeClr val="accent4"/>
+          </a:fillRef>
+          <a:effectRef idx="0">
+            <a:schemeClr val="accent4"/>
+          </a:effectRef>
+          <a:fontRef idx="minor">
+            <a:schemeClr val="lt1"/>
+          </a:fontRef>
+        </p:style>
+        <p:txBody>
+          <a:bodyPr rtlCol="0" anchor="ctr"/>
+          <a:lstStyle/>
+          <a:p>
+            <a:pPr algn="ctr"/>
+            <a:r>
+              <a:rPr lang="nl-NL" dirty="0"/>
+              <a:t>Sample -file</a:t>
+            </a:r>
+          </a:p>
+        </p:txBody>
+      </p:sp>
+      <p:pic>
+        <p:nvPicPr>
+          <p:cNvPr id="7" name="Afbeelding 6">
+            <a:extLst>
+              <a:ext uri="{FF2B5EF4-FFF2-40B4-BE49-F238E27FC236}">
+                <a16:creationId xmlns:a16="http://schemas.microsoft.com/office/drawing/2014/main" id="{11C58A88-5EF2-4508-A245-F7B033F9E280}"/>
+              </a:ext>
+            </a:extLst>
+          </p:cNvPr>
+          <p:cNvPicPr>
+            <a:picLocks noChangeAspect="1"/>
+          </p:cNvPicPr>
+          <p:nvPr/>
+        </p:nvPicPr>
+        <p:blipFill rotWithShape="1">
+          <a:blip r:embed="rId2"/>
+          <a:srcRect r="46417" b="10815"/>
+          <a:stretch/>
+        </p:blipFill>
+        <p:spPr>
+          <a:xfrm>
+            <a:off x="2275548" y="1897863"/>
+            <a:ext cx="4633787" cy="4338320"/>
+          </a:xfrm>
+          <a:prstGeom prst="rect">
+            <a:avLst/>
+          </a:prstGeom>
+        </p:spPr>
+      </p:pic>
+      <p:sp>
+        <p:nvSpPr>
+          <p:cNvPr id="13" name="Tekstvak 12">
+            <a:extLst>
+              <a:ext uri="{FF2B5EF4-FFF2-40B4-BE49-F238E27FC236}">
+                <a16:creationId xmlns:a16="http://schemas.microsoft.com/office/drawing/2014/main" id="{FE13DB86-1981-4D6E-AD32-338227979C33}"/>
+              </a:ext>
+            </a:extLst>
+          </p:cNvPr>
+          <p:cNvSpPr txBox="1"/>
+          <p:nvPr/>
+        </p:nvSpPr>
+        <p:spPr>
+          <a:xfrm>
+            <a:off x="7995920" y="3513374"/>
+            <a:ext cx="3982720" cy="1384995"/>
+          </a:xfrm>
+          <a:prstGeom prst="rect">
+            <a:avLst/>
+          </a:prstGeom>
+          <a:noFill/>
+        </p:spPr>
+        <p:txBody>
+          <a:bodyPr wrap="square">
+            <a:spAutoFit/>
+          </a:bodyPr>
+          <a:lstStyle/>
+          <a:p>
+            <a:r>
+              <a:rPr lang="en-US" sz="1400" b="0" i="0" dirty="0">
+                <a:solidFill>
+                  <a:srgbClr val="FF0000"/>
+                </a:solidFill>
+                <a:effectLst/>
+                <a:latin typeface="Consolas" panose="020B0609020204030204" pitchFamily="49" charset="0"/>
+              </a:rPr>
+              <a:t>array([[ 1.4513, 1.2711, 1.7666, -22. ], [ 1.4513, 1.2711, 1.7666, -22. ], [ 1.4496, 1.2696, 1.7655, -22. ], ..., [ 2.7907, 1.7224, 1.0456, 0. ], [ 2.7907, 1.7224, 1.0456, 0. ], [ 2.8693, 1.6801, 1.2722, 0. ]])</a:t>
+            </a:r>
+            <a:endParaRPr lang="nl-NL" sz="1400" dirty="0">
+              <a:solidFill>
+                <a:srgbClr val="FF0000"/>
+              </a:solidFill>
+            </a:endParaRPr>
+          </a:p>
+        </p:txBody>
+      </p:sp>
+    </p:spTree>
+    <p:extLst>
+      <p:ext uri="{BB962C8B-B14F-4D97-AF65-F5344CB8AC3E}">
+        <p14:creationId xmlns:p14="http://schemas.microsoft.com/office/powerpoint/2010/main" val="2567964085"/>
+      </p:ext>
+    </p:extLst>
+  </p:cSld>
+  <p:clrMapOvr>
+    <a:masterClrMapping/>
+  </p:clrMapOvr>
+</p:sld>
+</file>
+
+<file path=ppt/slides/slide6.xml><?xml version="1.0" encoding="utf-8"?>
+<p:sld xmlns:a="http://schemas.openxmlformats.org/drawingml/2006/main" xmlns:r="http://schemas.openxmlformats.org/officeDocument/2006/relationships" xmlns:p="http://schemas.openxmlformats.org/presentationml/2006/main">
+  <p:cSld>
+    <p:spTree>
+      <p:nvGrpSpPr>
+        <p:cNvPr id="1" name=""/>
+        <p:cNvGrpSpPr/>
+        <p:nvPr/>
+      </p:nvGrpSpPr>
+      <p:grpSpPr>
+        <a:xfrm>
+          <a:off x="0" y="0"/>
+          <a:ext cx="0" cy="0"/>
+          <a:chOff x="0" y="0"/>
+          <a:chExt cx="0" cy="0"/>
+        </a:xfrm>
+      </p:grpSpPr>
+      <p:pic>
+        <p:nvPicPr>
+          <p:cNvPr id="3" name="Afbeelding 2">
+            <a:extLst>
+              <a:ext uri="{FF2B5EF4-FFF2-40B4-BE49-F238E27FC236}">
+                <a16:creationId xmlns:a16="http://schemas.microsoft.com/office/drawing/2014/main" id="{08C9E57F-FAA2-476A-BCF5-10D745FF3B84}"/>
+              </a:ext>
+            </a:extLst>
+          </p:cNvPr>
+          <p:cNvPicPr>
+            <a:picLocks noChangeAspect="1"/>
+          </p:cNvPicPr>
+          <p:nvPr/>
+        </p:nvPicPr>
+        <p:blipFill>
+          <a:blip r:embed="rId2">
+            <a:extLst>
+              <a:ext uri="{28A0092B-C50C-407E-A947-70E740481C1C}">
+                <a14:useLocalDpi xmlns:a14="http://schemas.microsoft.com/office/drawing/2010/main" val="0"/>
+              </a:ext>
+            </a:extLst>
+          </a:blip>
+          <a:stretch>
+            <a:fillRect/>
+          </a:stretch>
+        </p:blipFill>
+        <p:spPr>
+          <a:xfrm>
+            <a:off x="105284" y="863600"/>
+            <a:ext cx="11536639" cy="5333999"/>
+          </a:xfrm>
+          <a:prstGeom prst="rect">
+            <a:avLst/>
+          </a:prstGeom>
+          <a:solidFill>
+            <a:schemeClr val="bg1"/>
+          </a:solidFill>
+        </p:spPr>
+      </p:pic>
+      <p:sp>
+        <p:nvSpPr>
+          <p:cNvPr id="4" name="Rechthoek 3">
+            <a:extLst>
+              <a:ext uri="{FF2B5EF4-FFF2-40B4-BE49-F238E27FC236}">
+                <a16:creationId xmlns:a16="http://schemas.microsoft.com/office/drawing/2014/main" id="{559715F1-7FEA-4889-B8F1-4D74E30AC34F}"/>
+              </a:ext>
+            </a:extLst>
+          </p:cNvPr>
+          <p:cNvSpPr/>
+          <p:nvPr/>
+        </p:nvSpPr>
+        <p:spPr>
+          <a:xfrm>
+            <a:off x="10058400" y="3683000"/>
+            <a:ext cx="990600" cy="1447800"/>
+          </a:xfrm>
+          <a:prstGeom prst="rect">
+            <a:avLst/>
+          </a:prstGeom>
+          <a:solidFill>
+            <a:schemeClr val="bg1"/>
+          </a:solidFill>
+          <a:ln>
+            <a:noFill/>
+          </a:ln>
+        </p:spPr>
+        <p:style>
+          <a:lnRef idx="2">
+            <a:schemeClr val="accent1">
+              <a:shade val="50000"/>
+            </a:schemeClr>
+          </a:lnRef>
+          <a:fillRef idx="1">
+            <a:schemeClr val="accent1"/>
+          </a:fillRef>
+          <a:effectRef idx="0">
+            <a:schemeClr val="accent1"/>
+          </a:effectRef>
+          <a:fontRef idx="minor">
+            <a:schemeClr val="lt1"/>
+          </a:fontRef>
+        </p:style>
+        <p:txBody>
+          <a:bodyPr rtlCol="0" anchor="ctr"/>
+          <a:lstStyle/>
+          <a:p>
+            <a:pPr algn="ctr"/>
+            <a:endParaRPr lang="nl-NL"/>
+          </a:p>
+        </p:txBody>
+      </p:sp>
+      <p:sp>
+        <p:nvSpPr>
+          <p:cNvPr id="5" name="Rechthoek 4">
+            <a:extLst>
+              <a:ext uri="{FF2B5EF4-FFF2-40B4-BE49-F238E27FC236}">
+                <a16:creationId xmlns:a16="http://schemas.microsoft.com/office/drawing/2014/main" id="{8B566163-8109-4A47-AA87-1A332D144A03}"/>
+              </a:ext>
+            </a:extLst>
+          </p:cNvPr>
+          <p:cNvSpPr/>
+          <p:nvPr/>
+        </p:nvSpPr>
+        <p:spPr>
+          <a:xfrm rot="3985312">
+            <a:off x="9295218" y="4259975"/>
+            <a:ext cx="174765" cy="857855"/>
+          </a:xfrm>
+          <a:prstGeom prst="rect">
+            <a:avLst/>
+          </a:prstGeom>
+          <a:solidFill>
+            <a:schemeClr val="bg1"/>
+          </a:solidFill>
+          <a:ln>
+            <a:noFill/>
+          </a:ln>
+        </p:spPr>
+        <p:style>
+          <a:lnRef idx="2">
+            <a:schemeClr val="accent1">
+              <a:shade val="50000"/>
+            </a:schemeClr>
+          </a:lnRef>
+          <a:fillRef idx="1">
+            <a:schemeClr val="accent1"/>
+          </a:fillRef>
+          <a:effectRef idx="0">
+            <a:schemeClr val="accent1"/>
+          </a:effectRef>
+          <a:fontRef idx="minor">
+            <a:schemeClr val="lt1"/>
+          </a:fontRef>
+        </p:style>
+        <p:txBody>
+          <a:bodyPr rtlCol="0" anchor="ctr"/>
+          <a:lstStyle/>
+          <a:p>
+            <a:pPr algn="ctr"/>
+            <a:endParaRPr lang="nl-NL"/>
+          </a:p>
+        </p:txBody>
+      </p:sp>
+      <p:sp>
+        <p:nvSpPr>
+          <p:cNvPr id="6" name="Rechthoek 5">
+            <a:extLst>
+              <a:ext uri="{FF2B5EF4-FFF2-40B4-BE49-F238E27FC236}">
+                <a16:creationId xmlns:a16="http://schemas.microsoft.com/office/drawing/2014/main" id="{95E11E3C-C1B3-44F3-B175-5E963A3DACCE}"/>
+              </a:ext>
+            </a:extLst>
+          </p:cNvPr>
+          <p:cNvSpPr/>
+          <p:nvPr/>
+        </p:nvSpPr>
+        <p:spPr>
+          <a:xfrm rot="5172262">
+            <a:off x="9430569" y="3757335"/>
+            <a:ext cx="76839" cy="858024"/>
+          </a:xfrm>
+          <a:prstGeom prst="rect">
+            <a:avLst/>
+          </a:prstGeom>
+          <a:solidFill>
+            <a:schemeClr val="bg1"/>
+          </a:solidFill>
+          <a:ln>
+            <a:noFill/>
+          </a:ln>
+        </p:spPr>
+        <p:style>
+          <a:lnRef idx="2">
+            <a:schemeClr val="accent1">
+              <a:shade val="50000"/>
+            </a:schemeClr>
+          </a:lnRef>
+          <a:fillRef idx="1">
+            <a:schemeClr val="accent1"/>
+          </a:fillRef>
+          <a:effectRef idx="0">
+            <a:schemeClr val="accent1"/>
+          </a:effectRef>
+          <a:fontRef idx="minor">
+            <a:schemeClr val="lt1"/>
+          </a:fontRef>
+        </p:style>
+        <p:txBody>
+          <a:bodyPr rtlCol="0" anchor="ctr"/>
+          <a:lstStyle/>
+          <a:p>
+            <a:pPr algn="ctr"/>
+            <a:endParaRPr lang="nl-NL"/>
+          </a:p>
+        </p:txBody>
+      </p:sp>
+      <p:sp>
+        <p:nvSpPr>
+          <p:cNvPr id="7" name="Rechthoek 6">
+            <a:extLst>
+              <a:ext uri="{FF2B5EF4-FFF2-40B4-BE49-F238E27FC236}">
+                <a16:creationId xmlns:a16="http://schemas.microsoft.com/office/drawing/2014/main" id="{F4CFECEC-031A-48D1-9721-C47344E5FB75}"/>
+              </a:ext>
+            </a:extLst>
+          </p:cNvPr>
+          <p:cNvSpPr/>
+          <p:nvPr/>
+        </p:nvSpPr>
+        <p:spPr>
+          <a:xfrm rot="7586399">
+            <a:off x="9001936" y="2313720"/>
+            <a:ext cx="72874" cy="1302202"/>
+          </a:xfrm>
+          <a:prstGeom prst="rect">
+            <a:avLst/>
+          </a:prstGeom>
+          <a:solidFill>
+            <a:schemeClr val="bg1"/>
+          </a:solidFill>
+          <a:ln>
+            <a:noFill/>
+          </a:ln>
+        </p:spPr>
+        <p:style>
+          <a:lnRef idx="2">
+            <a:schemeClr val="accent1">
+              <a:shade val="50000"/>
+            </a:schemeClr>
+          </a:lnRef>
+          <a:fillRef idx="1">
+            <a:schemeClr val="accent1"/>
+          </a:fillRef>
+          <a:effectRef idx="0">
+            <a:schemeClr val="accent1"/>
+          </a:effectRef>
+          <a:fontRef idx="minor">
+            <a:schemeClr val="lt1"/>
+          </a:fontRef>
+        </p:style>
+        <p:txBody>
+          <a:bodyPr rtlCol="0" anchor="ctr"/>
+          <a:lstStyle/>
+          <a:p>
+            <a:pPr algn="ctr"/>
+            <a:endParaRPr lang="nl-NL"/>
+          </a:p>
+        </p:txBody>
+      </p:sp>
+    </p:spTree>
+    <p:extLst>
+      <p:ext uri="{BB962C8B-B14F-4D97-AF65-F5344CB8AC3E}">
+        <p14:creationId xmlns:p14="http://schemas.microsoft.com/office/powerpoint/2010/main" val="791945011"/>
       </p:ext>
     </p:extLst>
   </p:cSld>
@@ -7360,29 +6546,37 @@
             <p:ph type="title"/>
           </p:nvPr>
         </p:nvSpPr>
-        <p:spPr/>
-        <p:txBody>
-          <a:bodyPr/>
-          <a:lstStyle/>
-          <a:p>
-            <a:r>
-              <a:rPr lang="nl-NL" dirty="0"/>
+        <p:spPr>
+          <a:xfrm>
+            <a:off x="838200" y="125184"/>
+            <a:ext cx="10515600" cy="646331"/>
+          </a:xfrm>
+        </p:spPr>
+        <p:txBody>
+          <a:bodyPr>
+            <a:normAutofit fontScale="90000"/>
+          </a:bodyPr>
+          <a:lstStyle/>
+          <a:p>
+            <a:pPr algn="ctr"/>
+            <a:r>
+              <a:rPr lang="nl-NL" b="1" dirty="0"/>
               <a:t>Tensorflow en </a:t>
             </a:r>
             <a:r>
-              <a:rPr lang="nl-NL" dirty="0" err="1"/>
+              <a:rPr lang="nl-NL" b="1" dirty="0" err="1"/>
               <a:t>Scikit</a:t>
             </a:r>
             <a:r>
-              <a:rPr lang="nl-NL" dirty="0"/>
+              <a:rPr lang="nl-NL" b="1" dirty="0"/>
               <a:t> </a:t>
             </a:r>
             <a:r>
-              <a:rPr lang="nl-NL" dirty="0" err="1"/>
+              <a:rPr lang="nl-NL" b="1" dirty="0" err="1"/>
               <a:t>Learn</a:t>
             </a:r>
             <a:r>
-              <a:rPr lang="nl-NL" dirty="0"/>
+              <a:rPr lang="nl-NL" b="1" dirty="0"/>
               <a:t> </a:t>
             </a:r>
           </a:p>
@@ -7402,8 +6596,8 @@
         </p:nvSpPr>
         <p:spPr>
           <a:xfrm>
-            <a:off x="2242686" y="2435192"/>
-            <a:ext cx="6814687" cy="3693319"/>
+            <a:off x="-7040689" y="948690"/>
+            <a:ext cx="6814687" cy="5909310"/>
           </a:xfrm>
           <a:prstGeom prst="rect">
             <a:avLst/>
@@ -7418,8 +6612,49 @@
           <a:p>
             <a:r>
               <a:rPr lang="nl-NL" dirty="0"/>
-              <a:t>Python schil op rekenmodules</a:t>
-            </a:r>
+              <a:t>Ontdekkingstocht: wat is het? Hoe werkt het? Hoe en wat?</a:t>
+            </a:r>
+          </a:p>
+          <a:p>
+            <a:endParaRPr lang="nl-NL" dirty="0"/>
+          </a:p>
+          <a:p>
+            <a:r>
+              <a:rPr lang="nl-NL" dirty="0"/>
+              <a:t>Introductie </a:t>
+            </a:r>
+            <a:r>
+              <a:rPr lang="nl-NL" dirty="0" err="1"/>
+              <a:t>Tutorials</a:t>
+            </a:r>
+            <a:r>
+              <a:rPr lang="nl-NL" dirty="0"/>
+              <a:t>, Handleidingen</a:t>
+            </a:r>
+          </a:p>
+          <a:p>
+            <a:endParaRPr lang="nl-NL" dirty="0"/>
+          </a:p>
+          <a:p>
+            <a:r>
+              <a:rPr lang="nl-NL" dirty="0"/>
+              <a:t>De keuze is reuze</a:t>
+            </a:r>
+          </a:p>
+          <a:p>
+            <a:endParaRPr lang="nl-NL" dirty="0"/>
+          </a:p>
+          <a:p>
+            <a:r>
+              <a:rPr lang="nl-NL" dirty="0"/>
+              <a:t>Python schil op rekenmodules. </a:t>
+            </a:r>
+          </a:p>
+          <a:p>
+            <a:endParaRPr lang="nl-NL" dirty="0"/>
+          </a:p>
+          <a:p>
+            <a:endParaRPr lang="nl-NL" dirty="0"/>
           </a:p>
           <a:p>
             <a:endParaRPr lang="nl-NL" dirty="0"/>
@@ -7478,6 +6713,450 @@
           </a:p>
           <a:p>
             <a:endParaRPr lang="nl-NL" dirty="0"/>
+          </a:p>
+        </p:txBody>
+      </p:sp>
+      <p:pic>
+        <p:nvPicPr>
+          <p:cNvPr id="5" name="Afbeelding 4">
+            <a:extLst>
+              <a:ext uri="{FF2B5EF4-FFF2-40B4-BE49-F238E27FC236}">
+                <a16:creationId xmlns:a16="http://schemas.microsoft.com/office/drawing/2014/main" id="{BEBC26F4-4417-4ECF-94F2-373454D65969}"/>
+              </a:ext>
+            </a:extLst>
+          </p:cNvPr>
+          <p:cNvPicPr>
+            <a:picLocks noChangeAspect="1"/>
+          </p:cNvPicPr>
+          <p:nvPr/>
+        </p:nvPicPr>
+        <p:blipFill>
+          <a:blip r:embed="rId2">
+            <a:extLst>
+              <a:ext uri="{28A0092B-C50C-407E-A947-70E740481C1C}">
+                <a14:useLocalDpi xmlns:a14="http://schemas.microsoft.com/office/drawing/2010/main" val="0"/>
+              </a:ext>
+            </a:extLst>
+          </a:blip>
+          <a:stretch>
+            <a:fillRect/>
+          </a:stretch>
+        </p:blipFill>
+        <p:spPr>
+          <a:xfrm>
+            <a:off x="210917" y="58621"/>
+            <a:ext cx="2174430" cy="2326640"/>
+          </a:xfrm>
+          <a:prstGeom prst="rect">
+            <a:avLst/>
+          </a:prstGeom>
+        </p:spPr>
+      </p:pic>
+      <p:pic>
+        <p:nvPicPr>
+          <p:cNvPr id="7" name="Afbeelding 6">
+            <a:extLst>
+              <a:ext uri="{FF2B5EF4-FFF2-40B4-BE49-F238E27FC236}">
+                <a16:creationId xmlns:a16="http://schemas.microsoft.com/office/drawing/2014/main" id="{9E45A088-1BE0-41CC-AFA0-352DAE393507}"/>
+              </a:ext>
+            </a:extLst>
+          </p:cNvPr>
+          <p:cNvPicPr>
+            <a:picLocks noChangeAspect="1"/>
+          </p:cNvPicPr>
+          <p:nvPr/>
+        </p:nvPicPr>
+        <p:blipFill rotWithShape="1">
+          <a:blip r:embed="rId3">
+            <a:extLst>
+              <a:ext uri="{28A0092B-C50C-407E-A947-70E740481C1C}">
+                <a14:useLocalDpi xmlns:a14="http://schemas.microsoft.com/office/drawing/2010/main" val="0"/>
+              </a:ext>
+            </a:extLst>
+          </a:blip>
+          <a:srcRect l="10049" t="4952" r="12480" b="6212"/>
+          <a:stretch/>
+        </p:blipFill>
+        <p:spPr>
+          <a:xfrm>
+            <a:off x="9442803" y="90646"/>
+            <a:ext cx="2693531" cy="1737361"/>
+          </a:xfrm>
+          <a:prstGeom prst="rect">
+            <a:avLst/>
+          </a:prstGeom>
+        </p:spPr>
+      </p:pic>
+      <p:pic>
+        <p:nvPicPr>
+          <p:cNvPr id="9" name="Afbeelding 8" descr="Afbeelding met berg, lucht, buiten, natuur&#10;&#10;Automatisch gegenereerde beschrijving">
+            <a:extLst>
+              <a:ext uri="{FF2B5EF4-FFF2-40B4-BE49-F238E27FC236}">
+                <a16:creationId xmlns:a16="http://schemas.microsoft.com/office/drawing/2014/main" id="{12F69CF3-6B3B-4BCE-A9DE-27FD267ED1B1}"/>
+              </a:ext>
+            </a:extLst>
+          </p:cNvPr>
+          <p:cNvPicPr>
+            <a:picLocks noChangeAspect="1"/>
+          </p:cNvPicPr>
+          <p:nvPr/>
+        </p:nvPicPr>
+        <p:blipFill rotWithShape="1">
+          <a:blip r:embed="rId4">
+            <a:extLst>
+              <a:ext uri="{28A0092B-C50C-407E-A947-70E740481C1C}">
+                <a14:useLocalDpi xmlns:a14="http://schemas.microsoft.com/office/drawing/2010/main" val="0"/>
+              </a:ext>
+            </a:extLst>
+          </a:blip>
+          <a:srcRect t="1149" r="19503" b="20069"/>
+          <a:stretch/>
+        </p:blipFill>
+        <p:spPr>
+          <a:xfrm>
+            <a:off x="4922223" y="2073510"/>
+            <a:ext cx="6925586" cy="4506261"/>
+          </a:xfrm>
+          <a:prstGeom prst="rect">
+            <a:avLst/>
+          </a:prstGeom>
+        </p:spPr>
+      </p:pic>
+      <p:sp>
+        <p:nvSpPr>
+          <p:cNvPr id="12" name="Tekstvak 11">
+            <a:extLst>
+              <a:ext uri="{FF2B5EF4-FFF2-40B4-BE49-F238E27FC236}">
+                <a16:creationId xmlns:a16="http://schemas.microsoft.com/office/drawing/2014/main" id="{7C39EF5A-B76B-4BA9-A31C-8458C9F0BF83}"/>
+              </a:ext>
+            </a:extLst>
+          </p:cNvPr>
+          <p:cNvSpPr txBox="1"/>
+          <p:nvPr/>
+        </p:nvSpPr>
+        <p:spPr>
+          <a:xfrm>
+            <a:off x="565192" y="6250176"/>
+            <a:ext cx="4417255" cy="430887"/>
+          </a:xfrm>
+          <a:prstGeom prst="rect">
+            <a:avLst/>
+          </a:prstGeom>
+          <a:noFill/>
+          <a:ln>
+            <a:solidFill>
+              <a:schemeClr val="tx1"/>
+            </a:solidFill>
+          </a:ln>
+        </p:spPr>
+        <p:txBody>
+          <a:bodyPr wrap="square">
+            <a:spAutoFit/>
+          </a:bodyPr>
+          <a:lstStyle/>
+          <a:p>
+            <a:r>
+              <a:rPr lang="nl-NL" sz="2200" b="1" dirty="0"/>
+              <a:t>Neuraal netwerk? Wat is dat?</a:t>
+            </a:r>
+          </a:p>
+        </p:txBody>
+      </p:sp>
+      <p:sp>
+        <p:nvSpPr>
+          <p:cNvPr id="14" name="Tekstvak 13">
+            <a:extLst>
+              <a:ext uri="{FF2B5EF4-FFF2-40B4-BE49-F238E27FC236}">
+                <a16:creationId xmlns:a16="http://schemas.microsoft.com/office/drawing/2014/main" id="{2D2A77E7-AC02-4B76-A7F8-DFAA3C05A34F}"/>
+              </a:ext>
+            </a:extLst>
+          </p:cNvPr>
+          <p:cNvSpPr txBox="1"/>
+          <p:nvPr/>
+        </p:nvSpPr>
+        <p:spPr>
+          <a:xfrm>
+            <a:off x="889824" y="5768015"/>
+            <a:ext cx="2793448" cy="430887"/>
+          </a:xfrm>
+          <a:prstGeom prst="rect">
+            <a:avLst/>
+          </a:prstGeom>
+          <a:noFill/>
+          <a:ln>
+            <a:solidFill>
+              <a:schemeClr val="tx1"/>
+            </a:solidFill>
+          </a:ln>
+        </p:spPr>
+        <p:txBody>
+          <a:bodyPr wrap="square">
+            <a:spAutoFit/>
+          </a:bodyPr>
+          <a:lstStyle/>
+          <a:p>
+            <a:r>
+              <a:rPr lang="nl-NL" sz="2200" dirty="0" err="1"/>
+              <a:t>Tutorials</a:t>
+            </a:r>
+            <a:r>
+              <a:rPr lang="nl-NL" sz="2200" dirty="0"/>
+              <a:t> en websites  </a:t>
+            </a:r>
+          </a:p>
+        </p:txBody>
+      </p:sp>
+      <p:sp>
+        <p:nvSpPr>
+          <p:cNvPr id="17" name="Tekstvak 16">
+            <a:extLst>
+              <a:ext uri="{FF2B5EF4-FFF2-40B4-BE49-F238E27FC236}">
+                <a16:creationId xmlns:a16="http://schemas.microsoft.com/office/drawing/2014/main" id="{7F3BEB4D-49BB-48B8-B75A-7D6DB95EE06C}"/>
+              </a:ext>
+            </a:extLst>
+          </p:cNvPr>
+          <p:cNvSpPr txBox="1"/>
+          <p:nvPr/>
+        </p:nvSpPr>
+        <p:spPr>
+          <a:xfrm>
+            <a:off x="2449514" y="3115304"/>
+            <a:ext cx="2244742" cy="769441"/>
+          </a:xfrm>
+          <a:prstGeom prst="rect">
+            <a:avLst/>
+          </a:prstGeom>
+          <a:noFill/>
+          <a:ln>
+            <a:solidFill>
+              <a:schemeClr val="tx1"/>
+            </a:solidFill>
+          </a:ln>
+        </p:spPr>
+        <p:txBody>
+          <a:bodyPr wrap="square">
+            <a:spAutoFit/>
+          </a:bodyPr>
+          <a:lstStyle/>
+          <a:p>
+            <a:r>
+              <a:rPr lang="nl-NL" sz="2200" dirty="0" err="1"/>
+              <a:t>Inprogrammerenaansturing</a:t>
+            </a:r>
+            <a:r>
+              <a:rPr lang="nl-NL" sz="2200" dirty="0"/>
+              <a:t> auto</a:t>
+            </a:r>
+          </a:p>
+        </p:txBody>
+      </p:sp>
+      <p:sp>
+        <p:nvSpPr>
+          <p:cNvPr id="18" name="Tekstvak 17">
+            <a:extLst>
+              <a:ext uri="{FF2B5EF4-FFF2-40B4-BE49-F238E27FC236}">
+                <a16:creationId xmlns:a16="http://schemas.microsoft.com/office/drawing/2014/main" id="{A9A40EEB-141E-4508-AA2B-CB988ED5DE29}"/>
+              </a:ext>
+            </a:extLst>
+          </p:cNvPr>
+          <p:cNvSpPr txBox="1"/>
+          <p:nvPr/>
+        </p:nvSpPr>
+        <p:spPr>
+          <a:xfrm>
+            <a:off x="1793744" y="4521738"/>
+            <a:ext cx="1681139" cy="430887"/>
+          </a:xfrm>
+          <a:prstGeom prst="rect">
+            <a:avLst/>
+          </a:prstGeom>
+          <a:noFill/>
+          <a:ln>
+            <a:solidFill>
+              <a:schemeClr val="tx1"/>
+            </a:solidFill>
+          </a:ln>
+        </p:spPr>
+        <p:txBody>
+          <a:bodyPr wrap="square">
+            <a:spAutoFit/>
+          </a:bodyPr>
+          <a:lstStyle/>
+          <a:p>
+            <a:r>
+              <a:rPr lang="nl-NL" sz="2200" dirty="0"/>
+              <a:t>Bouw NN</a:t>
+            </a:r>
+          </a:p>
+        </p:txBody>
+      </p:sp>
+      <p:sp>
+        <p:nvSpPr>
+          <p:cNvPr id="19" name="Tekstvak 18">
+            <a:extLst>
+              <a:ext uri="{FF2B5EF4-FFF2-40B4-BE49-F238E27FC236}">
+                <a16:creationId xmlns:a16="http://schemas.microsoft.com/office/drawing/2014/main" id="{5C6E5110-7FFA-492D-BADA-678A27CCDE3A}"/>
+              </a:ext>
+            </a:extLst>
+          </p:cNvPr>
+          <p:cNvSpPr txBox="1"/>
+          <p:nvPr/>
+        </p:nvSpPr>
+        <p:spPr>
+          <a:xfrm>
+            <a:off x="2697480" y="2358376"/>
+            <a:ext cx="2046348" cy="769441"/>
+          </a:xfrm>
+          <a:prstGeom prst="rect">
+            <a:avLst/>
+          </a:prstGeom>
+          <a:noFill/>
+          <a:ln>
+            <a:solidFill>
+              <a:schemeClr val="tx1"/>
+            </a:solidFill>
+          </a:ln>
+        </p:spPr>
+        <p:txBody>
+          <a:bodyPr wrap="square">
+            <a:spAutoFit/>
+          </a:bodyPr>
+          <a:lstStyle/>
+          <a:p>
+            <a:r>
+              <a:rPr lang="nl-NL" sz="2200" dirty="0"/>
+              <a:t>Experimenteren </a:t>
+            </a:r>
+          </a:p>
+          <a:p>
+            <a:r>
+              <a:rPr lang="nl-NL" sz="2200" dirty="0"/>
+              <a:t>Instellingen NN</a:t>
+            </a:r>
+          </a:p>
+        </p:txBody>
+      </p:sp>
+      <p:sp>
+        <p:nvSpPr>
+          <p:cNvPr id="20" name="Tekstvak 19">
+            <a:extLst>
+              <a:ext uri="{FF2B5EF4-FFF2-40B4-BE49-F238E27FC236}">
+                <a16:creationId xmlns:a16="http://schemas.microsoft.com/office/drawing/2014/main" id="{A028E10C-CF4A-42BA-8A8A-E22D91268DFF}"/>
+              </a:ext>
+            </a:extLst>
+          </p:cNvPr>
+          <p:cNvSpPr txBox="1"/>
+          <p:nvPr/>
+        </p:nvSpPr>
+        <p:spPr>
+          <a:xfrm>
+            <a:off x="1237590" y="5221340"/>
+            <a:ext cx="2793448" cy="430887"/>
+          </a:xfrm>
+          <a:prstGeom prst="rect">
+            <a:avLst/>
+          </a:prstGeom>
+          <a:noFill/>
+          <a:ln>
+            <a:solidFill>
+              <a:schemeClr val="tx1"/>
+            </a:solidFill>
+          </a:ln>
+        </p:spPr>
+        <p:txBody>
+          <a:bodyPr wrap="square">
+            <a:spAutoFit/>
+          </a:bodyPr>
+          <a:lstStyle/>
+          <a:p>
+            <a:r>
+              <a:rPr lang="nl-NL" sz="2200" dirty="0"/>
+              <a:t>Installeren software</a:t>
+            </a:r>
+          </a:p>
+        </p:txBody>
+      </p:sp>
+      <p:sp>
+        <p:nvSpPr>
+          <p:cNvPr id="21" name="Tekstvak 20">
+            <a:extLst>
+              <a:ext uri="{FF2B5EF4-FFF2-40B4-BE49-F238E27FC236}">
+                <a16:creationId xmlns:a16="http://schemas.microsoft.com/office/drawing/2014/main" id="{892C5234-A492-4C24-8227-C004A98E079A}"/>
+              </a:ext>
+            </a:extLst>
+          </p:cNvPr>
+          <p:cNvSpPr txBox="1"/>
+          <p:nvPr/>
+        </p:nvSpPr>
+        <p:spPr>
+          <a:xfrm>
+            <a:off x="1987953" y="3900134"/>
+            <a:ext cx="2934270" cy="430887"/>
+          </a:xfrm>
+          <a:prstGeom prst="rect">
+            <a:avLst/>
+          </a:prstGeom>
+          <a:noFill/>
+          <a:ln>
+            <a:solidFill>
+              <a:schemeClr val="tx1"/>
+            </a:solidFill>
+          </a:ln>
+        </p:spPr>
+        <p:txBody>
+          <a:bodyPr wrap="square">
+            <a:spAutoFit/>
+          </a:bodyPr>
+          <a:lstStyle/>
+          <a:p>
+            <a:r>
+              <a:rPr lang="nl-NL" sz="2200" dirty="0"/>
+              <a:t>Generen Invoerdata NN </a:t>
+            </a:r>
+          </a:p>
+        </p:txBody>
+      </p:sp>
+      <p:sp>
+        <p:nvSpPr>
+          <p:cNvPr id="22" name="Tekstvak 21">
+            <a:extLst>
+              <a:ext uri="{FF2B5EF4-FFF2-40B4-BE49-F238E27FC236}">
+                <a16:creationId xmlns:a16="http://schemas.microsoft.com/office/drawing/2014/main" id="{128084E5-5043-4366-8C23-A649E074727A}"/>
+              </a:ext>
+            </a:extLst>
+          </p:cNvPr>
+          <p:cNvSpPr txBox="1"/>
+          <p:nvPr/>
+        </p:nvSpPr>
+        <p:spPr>
+          <a:xfrm>
+            <a:off x="4031038" y="1541331"/>
+            <a:ext cx="3029015" cy="430887"/>
+          </a:xfrm>
+          <a:prstGeom prst="rect">
+            <a:avLst/>
+          </a:prstGeom>
+          <a:noFill/>
+          <a:ln>
+            <a:solidFill>
+              <a:schemeClr val="tx1"/>
+            </a:solidFill>
+          </a:ln>
+        </p:spPr>
+        <p:txBody>
+          <a:bodyPr wrap="square">
+            <a:spAutoFit/>
+          </a:bodyPr>
+          <a:lstStyle/>
+          <a:p>
+            <a:r>
+              <a:rPr lang="nl-NL" sz="2200" b="1" dirty="0"/>
+              <a:t>Virtueel</a:t>
+            </a:r>
+            <a:r>
+              <a:rPr lang="nl-NL" b="1" dirty="0"/>
+              <a:t> rondrijdende auto</a:t>
+            </a:r>
           </a:p>
         </p:txBody>
       </p:sp>
@@ -7513,28 +7192,1338 @@
       </p:grpSpPr>
       <p:sp>
         <p:nvSpPr>
-          <p:cNvPr id="2" name="Titel 1">
-            <a:extLst>
-              <a:ext uri="{FF2B5EF4-FFF2-40B4-BE49-F238E27FC236}">
-                <a16:creationId xmlns:a16="http://schemas.microsoft.com/office/drawing/2014/main" id="{09BEC858-D036-491F-9FC1-885F82BBD4B0}"/>
-              </a:ext>
-            </a:extLst>
-          </p:cNvPr>
-          <p:cNvSpPr>
-            <a:spLocks noGrp="1"/>
-          </p:cNvSpPr>
-          <p:nvPr>
-            <p:ph type="title"/>
-          </p:nvPr>
-        </p:nvSpPr>
-        <p:spPr/>
-        <p:txBody>
-          <a:bodyPr/>
-          <a:lstStyle/>
-          <a:p>
+          <p:cNvPr id="3" name="Stroomdiagram: Proces 2">
+            <a:extLst>
+              <a:ext uri="{FF2B5EF4-FFF2-40B4-BE49-F238E27FC236}">
+                <a16:creationId xmlns:a16="http://schemas.microsoft.com/office/drawing/2014/main" id="{D4BE89FB-D05C-4906-AB89-73A6F2A0FACF}"/>
+              </a:ext>
+            </a:extLst>
+          </p:cNvPr>
+          <p:cNvSpPr/>
+          <p:nvPr/>
+        </p:nvSpPr>
+        <p:spPr>
+          <a:xfrm>
+            <a:off x="3245046" y="332852"/>
+            <a:ext cx="2006600" cy="977900"/>
+          </a:xfrm>
+          <a:prstGeom prst="flowChartProcess">
+            <a:avLst/>
+          </a:prstGeom>
+        </p:spPr>
+        <p:style>
+          <a:lnRef idx="2">
+            <a:schemeClr val="accent6"/>
+          </a:lnRef>
+          <a:fillRef idx="1">
+            <a:schemeClr val="lt1"/>
+          </a:fillRef>
+          <a:effectRef idx="0">
+            <a:schemeClr val="accent6"/>
+          </a:effectRef>
+          <a:fontRef idx="minor">
+            <a:schemeClr val="dk1"/>
+          </a:fontRef>
+        </p:style>
+        <p:txBody>
+          <a:bodyPr rtlCol="0" anchor="ctr"/>
+          <a:lstStyle/>
+          <a:p>
+            <a:pPr algn="ctr"/>
             <a:r>
               <a:rPr lang="nl-NL" dirty="0"/>
-              <a:t>The Black Box</a:t>
+              <a:t>Reken met nieuwe gewichtsfactoren</a:t>
+            </a:r>
+          </a:p>
+        </p:txBody>
+      </p:sp>
+      <p:sp>
+        <p:nvSpPr>
+          <p:cNvPr id="4" name="Stroomdiagram: Beslissing 3">
+            <a:extLst>
+              <a:ext uri="{FF2B5EF4-FFF2-40B4-BE49-F238E27FC236}">
+                <a16:creationId xmlns:a16="http://schemas.microsoft.com/office/drawing/2014/main" id="{8A5504F3-D4BC-4D10-A052-B9619A4DA4E9}"/>
+              </a:ext>
+            </a:extLst>
+          </p:cNvPr>
+          <p:cNvSpPr/>
+          <p:nvPr/>
+        </p:nvSpPr>
+        <p:spPr>
+          <a:xfrm>
+            <a:off x="4198063" y="5025062"/>
+            <a:ext cx="2286000" cy="1714500"/>
+          </a:xfrm>
+          <a:prstGeom prst="flowChartDecision">
+            <a:avLst/>
+          </a:prstGeom>
+        </p:spPr>
+        <p:style>
+          <a:lnRef idx="2">
+            <a:schemeClr val="accent6"/>
+          </a:lnRef>
+          <a:fillRef idx="1">
+            <a:schemeClr val="lt1"/>
+          </a:fillRef>
+          <a:effectRef idx="0">
+            <a:schemeClr val="accent6"/>
+          </a:effectRef>
+          <a:fontRef idx="minor">
+            <a:schemeClr val="dk1"/>
+          </a:fontRef>
+        </p:style>
+        <p:txBody>
+          <a:bodyPr rtlCol="0" anchor="ctr"/>
+          <a:lstStyle/>
+          <a:p>
+            <a:pPr algn="ctr"/>
+            <a:r>
+              <a:rPr lang="nl-NL" dirty="0"/>
+              <a:t>Beter resultaat?</a:t>
+            </a:r>
+          </a:p>
+        </p:txBody>
+      </p:sp>
+      <p:cxnSp>
+        <p:nvCxnSpPr>
+          <p:cNvPr id="6" name="Rechte verbindingslijn met pijl 5">
+            <a:extLst>
+              <a:ext uri="{FF2B5EF4-FFF2-40B4-BE49-F238E27FC236}">
+                <a16:creationId xmlns:a16="http://schemas.microsoft.com/office/drawing/2014/main" id="{EBC96097-8CDA-4746-AD09-E0ECFA522A49}"/>
+              </a:ext>
+            </a:extLst>
+          </p:cNvPr>
+          <p:cNvCxnSpPr>
+            <a:cxnSpLocks/>
+            <a:stCxn id="4" idx="3"/>
+            <a:endCxn id="17" idx="1"/>
+          </p:cNvCxnSpPr>
+          <p:nvPr/>
+        </p:nvCxnSpPr>
+        <p:spPr>
+          <a:xfrm flipV="1">
+            <a:off x="6484063" y="5808690"/>
+            <a:ext cx="2024567" cy="73622"/>
+          </a:xfrm>
+          <a:prstGeom prst="straightConnector1">
+            <a:avLst/>
+          </a:prstGeom>
+          <a:ln w="63500">
+            <a:tailEnd type="triangle"/>
+          </a:ln>
+        </p:spPr>
+        <p:style>
+          <a:lnRef idx="1">
+            <a:schemeClr val="accent1"/>
+          </a:lnRef>
+          <a:fillRef idx="0">
+            <a:schemeClr val="accent1"/>
+          </a:fillRef>
+          <a:effectRef idx="0">
+            <a:schemeClr val="accent1"/>
+          </a:effectRef>
+          <a:fontRef idx="minor">
+            <a:schemeClr val="tx1"/>
+          </a:fontRef>
+        </p:style>
+      </p:cxnSp>
+      <p:cxnSp>
+        <p:nvCxnSpPr>
+          <p:cNvPr id="7" name="Rechte verbindingslijn met pijl 6">
+            <a:extLst>
+              <a:ext uri="{FF2B5EF4-FFF2-40B4-BE49-F238E27FC236}">
+                <a16:creationId xmlns:a16="http://schemas.microsoft.com/office/drawing/2014/main" id="{60A25F6A-6C9C-4000-8A18-2C3D06FDF50E}"/>
+              </a:ext>
+            </a:extLst>
+          </p:cNvPr>
+          <p:cNvCxnSpPr>
+            <a:cxnSpLocks/>
+            <a:stCxn id="4" idx="1"/>
+            <a:endCxn id="16" idx="3"/>
+          </p:cNvCxnSpPr>
+          <p:nvPr/>
+        </p:nvCxnSpPr>
+        <p:spPr>
+          <a:xfrm flipH="1">
+            <a:off x="3731777" y="5882312"/>
+            <a:ext cx="466286" cy="215634"/>
+          </a:xfrm>
+          <a:prstGeom prst="straightConnector1">
+            <a:avLst/>
+          </a:prstGeom>
+          <a:ln w="63500">
+            <a:tailEnd type="triangle"/>
+          </a:ln>
+        </p:spPr>
+        <p:style>
+          <a:lnRef idx="1">
+            <a:schemeClr val="accent1"/>
+          </a:lnRef>
+          <a:fillRef idx="0">
+            <a:schemeClr val="accent1"/>
+          </a:fillRef>
+          <a:effectRef idx="0">
+            <a:schemeClr val="accent1"/>
+          </a:effectRef>
+          <a:fontRef idx="minor">
+            <a:schemeClr val="tx1"/>
+          </a:fontRef>
+        </p:style>
+      </p:cxnSp>
+      <p:sp>
+        <p:nvSpPr>
+          <p:cNvPr id="10" name="Tekstvak 9">
+            <a:extLst>
+              <a:ext uri="{FF2B5EF4-FFF2-40B4-BE49-F238E27FC236}">
+                <a16:creationId xmlns:a16="http://schemas.microsoft.com/office/drawing/2014/main" id="{1C7D93DE-AF49-4C83-87B9-0347E7AB12B7}"/>
+              </a:ext>
+            </a:extLst>
+          </p:cNvPr>
+          <p:cNvSpPr txBox="1"/>
+          <p:nvPr/>
+        </p:nvSpPr>
+        <p:spPr>
+          <a:xfrm>
+            <a:off x="7396322" y="5142668"/>
+            <a:ext cx="482600" cy="369331"/>
+          </a:xfrm>
+          <a:prstGeom prst="rect">
+            <a:avLst/>
+          </a:prstGeom>
+          <a:noFill/>
+        </p:spPr>
+        <p:txBody>
+          <a:bodyPr wrap="square" rtlCol="0">
+            <a:spAutoFit/>
+          </a:bodyPr>
+          <a:lstStyle/>
+          <a:p>
+            <a:r>
+              <a:rPr lang="nl-NL" dirty="0"/>
+              <a:t>ja</a:t>
+            </a:r>
+          </a:p>
+        </p:txBody>
+      </p:sp>
+      <p:sp>
+        <p:nvSpPr>
+          <p:cNvPr id="11" name="Tekstvak 10">
+            <a:extLst>
+              <a:ext uri="{FF2B5EF4-FFF2-40B4-BE49-F238E27FC236}">
+                <a16:creationId xmlns:a16="http://schemas.microsoft.com/office/drawing/2014/main" id="{24BF1C36-AAC4-4746-A44B-7C7CD57863FB}"/>
+              </a:ext>
+            </a:extLst>
+          </p:cNvPr>
+          <p:cNvSpPr txBox="1"/>
+          <p:nvPr/>
+        </p:nvSpPr>
+        <p:spPr>
+          <a:xfrm>
+            <a:off x="3301565" y="5007896"/>
+            <a:ext cx="860425" cy="369329"/>
+          </a:xfrm>
+          <a:prstGeom prst="rect">
+            <a:avLst/>
+          </a:prstGeom>
+          <a:noFill/>
+        </p:spPr>
+        <p:txBody>
+          <a:bodyPr wrap="square" rtlCol="0">
+            <a:spAutoFit/>
+          </a:bodyPr>
+          <a:lstStyle/>
+          <a:p>
+            <a:r>
+              <a:rPr lang="nl-NL" dirty="0"/>
+              <a:t>nee</a:t>
+            </a:r>
+          </a:p>
+        </p:txBody>
+      </p:sp>
+      <p:sp>
+        <p:nvSpPr>
+          <p:cNvPr id="12" name="Stroomdiagram: Gegevens 11">
+            <a:extLst>
+              <a:ext uri="{FF2B5EF4-FFF2-40B4-BE49-F238E27FC236}">
+                <a16:creationId xmlns:a16="http://schemas.microsoft.com/office/drawing/2014/main" id="{9C281F35-D601-44A1-BAC2-7FA90105636A}"/>
+              </a:ext>
+            </a:extLst>
+          </p:cNvPr>
+          <p:cNvSpPr/>
+          <p:nvPr/>
+        </p:nvSpPr>
+        <p:spPr>
+          <a:xfrm>
+            <a:off x="1635760" y="1902913"/>
+            <a:ext cx="2006600" cy="1628764"/>
+          </a:xfrm>
+          <a:prstGeom prst="flowChartInputOutput">
+            <a:avLst/>
+          </a:prstGeom>
+          <a:solidFill>
+            <a:schemeClr val="bg1"/>
+          </a:solidFill>
+        </p:spPr>
+        <p:style>
+          <a:lnRef idx="2">
+            <a:schemeClr val="accent1">
+              <a:shade val="50000"/>
+            </a:schemeClr>
+          </a:lnRef>
+          <a:fillRef idx="1">
+            <a:schemeClr val="accent1"/>
+          </a:fillRef>
+          <a:effectRef idx="0">
+            <a:schemeClr val="accent1"/>
+          </a:effectRef>
+          <a:fontRef idx="minor">
+            <a:schemeClr val="lt1"/>
+          </a:fontRef>
+        </p:style>
+        <p:txBody>
+          <a:bodyPr rtlCol="0" anchor="ctr"/>
+          <a:lstStyle/>
+          <a:p>
+            <a:pPr algn="ctr"/>
+            <a:r>
+              <a:rPr lang="nl-NL" dirty="0">
+                <a:solidFill>
+                  <a:schemeClr val="tx1"/>
+                </a:solidFill>
+              </a:rPr>
+              <a:t>Berekende </a:t>
+            </a:r>
+          </a:p>
+          <a:p>
+            <a:pPr algn="ctr"/>
+            <a:r>
+              <a:rPr lang="nl-NL" dirty="0">
+                <a:solidFill>
+                  <a:schemeClr val="tx1"/>
+                </a:solidFill>
+              </a:rPr>
+              <a:t>stuurhoek</a:t>
+            </a:r>
+          </a:p>
+        </p:txBody>
+      </p:sp>
+      <p:sp>
+        <p:nvSpPr>
+          <p:cNvPr id="13" name="Stroomdiagram: Gegevens 12">
+            <a:extLst>
+              <a:ext uri="{FF2B5EF4-FFF2-40B4-BE49-F238E27FC236}">
+                <a16:creationId xmlns:a16="http://schemas.microsoft.com/office/drawing/2014/main" id="{2D1793F6-D3F9-4D8F-B10E-3F5649D67E7C}"/>
+              </a:ext>
+            </a:extLst>
+          </p:cNvPr>
+          <p:cNvSpPr/>
+          <p:nvPr/>
+        </p:nvSpPr>
+        <p:spPr>
+          <a:xfrm>
+            <a:off x="9114616" y="2606664"/>
+            <a:ext cx="2006600" cy="1628764"/>
+          </a:xfrm>
+          <a:prstGeom prst="flowChartInputOutput">
+            <a:avLst/>
+          </a:prstGeom>
+          <a:solidFill>
+            <a:schemeClr val="bg1"/>
+          </a:solidFill>
+        </p:spPr>
+        <p:style>
+          <a:lnRef idx="2">
+            <a:schemeClr val="accent1">
+              <a:shade val="50000"/>
+            </a:schemeClr>
+          </a:lnRef>
+          <a:fillRef idx="1">
+            <a:schemeClr val="accent1"/>
+          </a:fillRef>
+          <a:effectRef idx="0">
+            <a:schemeClr val="accent1"/>
+          </a:effectRef>
+          <a:fontRef idx="minor">
+            <a:schemeClr val="lt1"/>
+          </a:fontRef>
+        </p:style>
+        <p:txBody>
+          <a:bodyPr rtlCol="0" anchor="ctr"/>
+          <a:lstStyle/>
+          <a:p>
+            <a:pPr algn="ctr"/>
+            <a:r>
+              <a:rPr lang="nl-NL" dirty="0">
+                <a:solidFill>
+                  <a:schemeClr val="tx1"/>
+                </a:solidFill>
+              </a:rPr>
+              <a:t>Stuurhoek</a:t>
+            </a:r>
+          </a:p>
+          <a:p>
+            <a:pPr algn="ctr"/>
+            <a:r>
+              <a:rPr lang="nl-NL" dirty="0">
+                <a:solidFill>
+                  <a:schemeClr val="tx1"/>
+                </a:solidFill>
+              </a:rPr>
+              <a:t>Set Training</a:t>
+            </a:r>
+          </a:p>
+        </p:txBody>
+      </p:sp>
+      <p:sp>
+        <p:nvSpPr>
+          <p:cNvPr id="14" name="Stroomdiagram: Gegevens 13">
+            <a:extLst>
+              <a:ext uri="{FF2B5EF4-FFF2-40B4-BE49-F238E27FC236}">
+                <a16:creationId xmlns:a16="http://schemas.microsoft.com/office/drawing/2014/main" id="{26A2316D-04C1-44FD-8211-0866BBFC914C}"/>
+              </a:ext>
+            </a:extLst>
+          </p:cNvPr>
+          <p:cNvSpPr/>
+          <p:nvPr/>
+        </p:nvSpPr>
+        <p:spPr>
+          <a:xfrm>
+            <a:off x="9315276" y="329944"/>
+            <a:ext cx="2235198" cy="1628764"/>
+          </a:xfrm>
+          <a:prstGeom prst="flowChartInputOutput">
+            <a:avLst/>
+          </a:prstGeom>
+          <a:solidFill>
+            <a:schemeClr val="bg1"/>
+          </a:solidFill>
+        </p:spPr>
+        <p:style>
+          <a:lnRef idx="2">
+            <a:schemeClr val="accent1">
+              <a:shade val="50000"/>
+            </a:schemeClr>
+          </a:lnRef>
+          <a:fillRef idx="1">
+            <a:schemeClr val="accent1"/>
+          </a:fillRef>
+          <a:effectRef idx="0">
+            <a:schemeClr val="accent1"/>
+          </a:effectRef>
+          <a:fontRef idx="minor">
+            <a:schemeClr val="lt1"/>
+          </a:fontRef>
+        </p:style>
+        <p:txBody>
+          <a:bodyPr rtlCol="0" anchor="ctr"/>
+          <a:lstStyle/>
+          <a:p>
+            <a:pPr algn="ctr"/>
+            <a:r>
+              <a:rPr lang="nl-NL" dirty="0">
+                <a:solidFill>
+                  <a:schemeClr val="tx1"/>
+                </a:solidFill>
+              </a:rPr>
+              <a:t>sonar</a:t>
+            </a:r>
+          </a:p>
+          <a:p>
+            <a:pPr algn="ctr"/>
+            <a:r>
+              <a:rPr lang="nl-NL" dirty="0" err="1">
+                <a:solidFill>
+                  <a:schemeClr val="tx1"/>
+                </a:solidFill>
+              </a:rPr>
+              <a:t>trainingsset</a:t>
+            </a:r>
+            <a:endParaRPr lang="nl-NL" dirty="0">
+              <a:solidFill>
+                <a:schemeClr val="tx1"/>
+              </a:solidFill>
+            </a:endParaRPr>
+          </a:p>
+        </p:txBody>
+      </p:sp>
+      <p:cxnSp>
+        <p:nvCxnSpPr>
+          <p:cNvPr id="15" name="Rechte verbindingslijn met pijl 14">
+            <a:extLst>
+              <a:ext uri="{FF2B5EF4-FFF2-40B4-BE49-F238E27FC236}">
+                <a16:creationId xmlns:a16="http://schemas.microsoft.com/office/drawing/2014/main" id="{DAD226EA-C7A5-4AC3-A9E6-316299D02883}"/>
+              </a:ext>
+            </a:extLst>
+          </p:cNvPr>
+          <p:cNvCxnSpPr>
+            <a:cxnSpLocks/>
+            <a:stCxn id="14" idx="2"/>
+            <a:endCxn id="21" idx="3"/>
+          </p:cNvCxnSpPr>
+          <p:nvPr/>
+        </p:nvCxnSpPr>
+        <p:spPr>
+          <a:xfrm flipH="1" flipV="1">
+            <a:off x="8018463" y="991825"/>
+            <a:ext cx="1520333" cy="152501"/>
+          </a:xfrm>
+          <a:prstGeom prst="straightConnector1">
+            <a:avLst/>
+          </a:prstGeom>
+          <a:ln w="63500">
+            <a:tailEnd type="triangle"/>
+          </a:ln>
+        </p:spPr>
+        <p:style>
+          <a:lnRef idx="1">
+            <a:schemeClr val="accent1"/>
+          </a:lnRef>
+          <a:fillRef idx="0">
+            <a:schemeClr val="accent1"/>
+          </a:fillRef>
+          <a:effectRef idx="0">
+            <a:schemeClr val="accent1"/>
+          </a:effectRef>
+          <a:fontRef idx="minor">
+            <a:schemeClr val="tx1"/>
+          </a:fontRef>
+        </p:style>
+      </p:cxnSp>
+      <p:cxnSp>
+        <p:nvCxnSpPr>
+          <p:cNvPr id="19" name="Rechte verbindingslijn met pijl 18">
+            <a:extLst>
+              <a:ext uri="{FF2B5EF4-FFF2-40B4-BE49-F238E27FC236}">
+                <a16:creationId xmlns:a16="http://schemas.microsoft.com/office/drawing/2014/main" id="{21C21419-5533-4E69-A61F-AF7222878AAE}"/>
+              </a:ext>
+            </a:extLst>
+          </p:cNvPr>
+          <p:cNvCxnSpPr>
+            <a:cxnSpLocks/>
+            <a:stCxn id="3" idx="2"/>
+            <a:endCxn id="12" idx="0"/>
+          </p:cNvCxnSpPr>
+          <p:nvPr/>
+        </p:nvCxnSpPr>
+        <p:spPr>
+          <a:xfrm flipH="1">
+            <a:off x="2839720" y="1310752"/>
+            <a:ext cx="1408626" cy="592161"/>
+          </a:xfrm>
+          <a:prstGeom prst="straightConnector1">
+            <a:avLst/>
+          </a:prstGeom>
+          <a:ln w="63500">
+            <a:tailEnd type="triangle"/>
+          </a:ln>
+        </p:spPr>
+        <p:style>
+          <a:lnRef idx="1">
+            <a:schemeClr val="accent1"/>
+          </a:lnRef>
+          <a:fillRef idx="0">
+            <a:schemeClr val="accent1"/>
+          </a:fillRef>
+          <a:effectRef idx="0">
+            <a:schemeClr val="accent1"/>
+          </a:effectRef>
+          <a:fontRef idx="minor">
+            <a:schemeClr val="tx1"/>
+          </a:fontRef>
+        </p:style>
+      </p:cxnSp>
+      <p:cxnSp>
+        <p:nvCxnSpPr>
+          <p:cNvPr id="22" name="Rechte verbindingslijn met pijl 21">
+            <a:extLst>
+              <a:ext uri="{FF2B5EF4-FFF2-40B4-BE49-F238E27FC236}">
+                <a16:creationId xmlns:a16="http://schemas.microsoft.com/office/drawing/2014/main" id="{974022EF-0F1C-4B9A-8431-BC21B4D768AC}"/>
+              </a:ext>
+            </a:extLst>
+          </p:cNvPr>
+          <p:cNvCxnSpPr>
+            <a:cxnSpLocks/>
+            <a:stCxn id="12" idx="3"/>
+            <a:endCxn id="4" idx="0"/>
+          </p:cNvCxnSpPr>
+          <p:nvPr/>
+        </p:nvCxnSpPr>
+        <p:spPr>
+          <a:xfrm>
+            <a:off x="2438400" y="3531677"/>
+            <a:ext cx="2902663" cy="1493385"/>
+          </a:xfrm>
+          <a:prstGeom prst="straightConnector1">
+            <a:avLst/>
+          </a:prstGeom>
+          <a:ln w="63500">
+            <a:tailEnd type="triangle"/>
+          </a:ln>
+        </p:spPr>
+        <p:style>
+          <a:lnRef idx="1">
+            <a:schemeClr val="accent1"/>
+          </a:lnRef>
+          <a:fillRef idx="0">
+            <a:schemeClr val="accent1"/>
+          </a:fillRef>
+          <a:effectRef idx="0">
+            <a:schemeClr val="accent1"/>
+          </a:effectRef>
+          <a:fontRef idx="minor">
+            <a:schemeClr val="tx1"/>
+          </a:fontRef>
+        </p:style>
+      </p:cxnSp>
+      <p:cxnSp>
+        <p:nvCxnSpPr>
+          <p:cNvPr id="25" name="Rechte verbindingslijn met pijl 24">
+            <a:extLst>
+              <a:ext uri="{FF2B5EF4-FFF2-40B4-BE49-F238E27FC236}">
+                <a16:creationId xmlns:a16="http://schemas.microsoft.com/office/drawing/2014/main" id="{97F5BA44-DFD9-43A4-82CC-8728875ADA2D}"/>
+              </a:ext>
+            </a:extLst>
+          </p:cNvPr>
+          <p:cNvCxnSpPr>
+            <a:cxnSpLocks/>
+            <a:stCxn id="91" idx="3"/>
+            <a:endCxn id="4" idx="0"/>
+          </p:cNvCxnSpPr>
+          <p:nvPr/>
+        </p:nvCxnSpPr>
+        <p:spPr>
+          <a:xfrm>
+            <a:off x="4592051" y="3830855"/>
+            <a:ext cx="749012" cy="1194207"/>
+          </a:xfrm>
+          <a:prstGeom prst="straightConnector1">
+            <a:avLst/>
+          </a:prstGeom>
+          <a:ln w="63500">
+            <a:tailEnd type="triangle"/>
+          </a:ln>
+        </p:spPr>
+        <p:style>
+          <a:lnRef idx="1">
+            <a:schemeClr val="accent1"/>
+          </a:lnRef>
+          <a:fillRef idx="0">
+            <a:schemeClr val="accent1"/>
+          </a:fillRef>
+          <a:effectRef idx="0">
+            <a:schemeClr val="accent1"/>
+          </a:effectRef>
+          <a:fontRef idx="minor">
+            <a:schemeClr val="tx1"/>
+          </a:fontRef>
+        </p:style>
+      </p:cxnSp>
+      <p:sp>
+        <p:nvSpPr>
+          <p:cNvPr id="16" name="Stroomdiagram: Proces 15">
+            <a:extLst>
+              <a:ext uri="{FF2B5EF4-FFF2-40B4-BE49-F238E27FC236}">
+                <a16:creationId xmlns:a16="http://schemas.microsoft.com/office/drawing/2014/main" id="{43244513-258D-4E1F-B1B9-69EF5C4D28DB}"/>
+              </a:ext>
+            </a:extLst>
+          </p:cNvPr>
+          <p:cNvSpPr/>
+          <p:nvPr/>
+        </p:nvSpPr>
+        <p:spPr>
+          <a:xfrm>
+            <a:off x="1725177" y="5547248"/>
+            <a:ext cx="2006600" cy="1101396"/>
+          </a:xfrm>
+          <a:prstGeom prst="flowChartProcess">
+            <a:avLst/>
+          </a:prstGeom>
+        </p:spPr>
+        <p:style>
+          <a:lnRef idx="2">
+            <a:schemeClr val="accent6"/>
+          </a:lnRef>
+          <a:fillRef idx="1">
+            <a:schemeClr val="lt1"/>
+          </a:fillRef>
+          <a:effectRef idx="0">
+            <a:schemeClr val="accent6"/>
+          </a:effectRef>
+          <a:fontRef idx="minor">
+            <a:schemeClr val="dk1"/>
+          </a:fontRef>
+        </p:style>
+        <p:txBody>
+          <a:bodyPr rtlCol="0" anchor="ctr"/>
+          <a:lstStyle/>
+          <a:p>
+            <a:pPr algn="ctr"/>
+            <a:r>
+              <a:rPr lang="nl-NL" dirty="0"/>
+              <a:t>Pas gewichtsfactoren in </a:t>
+            </a:r>
+            <a:r>
+              <a:rPr lang="nl-NL" u="sng" dirty="0"/>
+              <a:t>ene</a:t>
+            </a:r>
+            <a:r>
+              <a:rPr lang="nl-NL" dirty="0"/>
+              <a:t> richting af</a:t>
+            </a:r>
+          </a:p>
+          <a:p>
+            <a:pPr algn="ctr"/>
+            <a:endParaRPr lang="nl-NL" dirty="0"/>
+          </a:p>
+        </p:txBody>
+      </p:sp>
+      <p:sp>
+        <p:nvSpPr>
+          <p:cNvPr id="17" name="Stroomdiagram: Proces 16">
+            <a:extLst>
+              <a:ext uri="{FF2B5EF4-FFF2-40B4-BE49-F238E27FC236}">
+                <a16:creationId xmlns:a16="http://schemas.microsoft.com/office/drawing/2014/main" id="{D4172E3A-2B14-4B42-BC99-6D84450BEF9B}"/>
+              </a:ext>
+            </a:extLst>
+          </p:cNvPr>
+          <p:cNvSpPr/>
+          <p:nvPr/>
+        </p:nvSpPr>
+        <p:spPr>
+          <a:xfrm>
+            <a:off x="8508630" y="5257991"/>
+            <a:ext cx="2006600" cy="1101397"/>
+          </a:xfrm>
+          <a:prstGeom prst="flowChartProcess">
+            <a:avLst/>
+          </a:prstGeom>
+        </p:spPr>
+        <p:style>
+          <a:lnRef idx="2">
+            <a:schemeClr val="accent6"/>
+          </a:lnRef>
+          <a:fillRef idx="1">
+            <a:schemeClr val="lt1"/>
+          </a:fillRef>
+          <a:effectRef idx="0">
+            <a:schemeClr val="accent6"/>
+          </a:effectRef>
+          <a:fontRef idx="minor">
+            <a:schemeClr val="dk1"/>
+          </a:fontRef>
+        </p:style>
+        <p:txBody>
+          <a:bodyPr rtlCol="0" anchor="ctr"/>
+          <a:lstStyle/>
+          <a:p>
+            <a:pPr algn="ctr"/>
+            <a:r>
+              <a:rPr lang="nl-NL" dirty="0"/>
+              <a:t>Pas gewichtsfactoren in </a:t>
+            </a:r>
+            <a:r>
+              <a:rPr lang="nl-NL" u="sng" dirty="0"/>
+              <a:t>andere</a:t>
+            </a:r>
+            <a:r>
+              <a:rPr lang="nl-NL" dirty="0"/>
+              <a:t> richting af</a:t>
+            </a:r>
+          </a:p>
+          <a:p>
+            <a:pPr algn="ctr"/>
+            <a:endParaRPr lang="nl-NL" dirty="0"/>
+          </a:p>
+        </p:txBody>
+      </p:sp>
+      <p:sp>
+        <p:nvSpPr>
+          <p:cNvPr id="21" name="Stroomdiagram: Proces 20">
+            <a:extLst>
+              <a:ext uri="{FF2B5EF4-FFF2-40B4-BE49-F238E27FC236}">
+                <a16:creationId xmlns:a16="http://schemas.microsoft.com/office/drawing/2014/main" id="{9EC709CC-15CC-473B-9D51-06A4D1AC8923}"/>
+              </a:ext>
+            </a:extLst>
+          </p:cNvPr>
+          <p:cNvSpPr/>
+          <p:nvPr/>
+        </p:nvSpPr>
+        <p:spPr>
+          <a:xfrm>
+            <a:off x="6011863" y="502875"/>
+            <a:ext cx="2006600" cy="977900"/>
+          </a:xfrm>
+          <a:prstGeom prst="flowChartProcess">
+            <a:avLst/>
+          </a:prstGeom>
+        </p:spPr>
+        <p:style>
+          <a:lnRef idx="2">
+            <a:schemeClr val="accent6"/>
+          </a:lnRef>
+          <a:fillRef idx="1">
+            <a:schemeClr val="lt1"/>
+          </a:fillRef>
+          <a:effectRef idx="0">
+            <a:schemeClr val="accent6"/>
+          </a:effectRef>
+          <a:fontRef idx="minor">
+            <a:schemeClr val="dk1"/>
+          </a:fontRef>
+        </p:style>
+        <p:txBody>
+          <a:bodyPr rtlCol="0" anchor="ctr"/>
+          <a:lstStyle/>
+          <a:p>
+            <a:pPr algn="ctr"/>
+            <a:r>
+              <a:rPr lang="nl-NL" dirty="0"/>
+              <a:t>3 sonarwaardes uit </a:t>
+            </a:r>
+            <a:r>
+              <a:rPr lang="nl-NL" dirty="0" err="1"/>
+              <a:t>trainingsset</a:t>
+            </a:r>
+            <a:endParaRPr lang="nl-NL" dirty="0"/>
+          </a:p>
+          <a:p>
+            <a:pPr algn="ctr"/>
+            <a:endParaRPr lang="nl-NL" dirty="0"/>
+          </a:p>
+        </p:txBody>
+      </p:sp>
+      <p:cxnSp>
+        <p:nvCxnSpPr>
+          <p:cNvPr id="24" name="Rechte verbindingslijn met pijl 23">
+            <a:extLst>
+              <a:ext uri="{FF2B5EF4-FFF2-40B4-BE49-F238E27FC236}">
+                <a16:creationId xmlns:a16="http://schemas.microsoft.com/office/drawing/2014/main" id="{86F86A8A-2FDD-46AF-BC9B-937F78402C58}"/>
+              </a:ext>
+            </a:extLst>
+          </p:cNvPr>
+          <p:cNvCxnSpPr>
+            <a:cxnSpLocks/>
+            <a:stCxn id="21" idx="1"/>
+            <a:endCxn id="3" idx="3"/>
+          </p:cNvCxnSpPr>
+          <p:nvPr/>
+        </p:nvCxnSpPr>
+        <p:spPr>
+          <a:xfrm flipH="1" flipV="1">
+            <a:off x="5251646" y="821802"/>
+            <a:ext cx="760217" cy="170023"/>
+          </a:xfrm>
+          <a:prstGeom prst="straightConnector1">
+            <a:avLst/>
+          </a:prstGeom>
+          <a:ln w="63500">
+            <a:tailEnd type="triangle"/>
+          </a:ln>
+        </p:spPr>
+        <p:style>
+          <a:lnRef idx="1">
+            <a:schemeClr val="accent1"/>
+          </a:lnRef>
+          <a:fillRef idx="0">
+            <a:schemeClr val="accent1"/>
+          </a:fillRef>
+          <a:effectRef idx="0">
+            <a:schemeClr val="accent1"/>
+          </a:effectRef>
+          <a:fontRef idx="minor">
+            <a:schemeClr val="tx1"/>
+          </a:fontRef>
+        </p:style>
+      </p:cxnSp>
+      <p:cxnSp>
+        <p:nvCxnSpPr>
+          <p:cNvPr id="41" name="Rechte verbindingslijn met pijl 40">
+            <a:extLst>
+              <a:ext uri="{FF2B5EF4-FFF2-40B4-BE49-F238E27FC236}">
+                <a16:creationId xmlns:a16="http://schemas.microsoft.com/office/drawing/2014/main" id="{4FBA68BD-2C8B-43B1-BEA4-C9B9FE15940B}"/>
+              </a:ext>
+            </a:extLst>
+          </p:cNvPr>
+          <p:cNvCxnSpPr>
+            <a:cxnSpLocks/>
+            <a:stCxn id="13" idx="2"/>
+            <a:endCxn id="91" idx="5"/>
+          </p:cNvCxnSpPr>
+          <p:nvPr/>
+        </p:nvCxnSpPr>
+        <p:spPr>
+          <a:xfrm flipH="1" flipV="1">
+            <a:off x="5545888" y="3096699"/>
+            <a:ext cx="3769388" cy="324347"/>
+          </a:xfrm>
+          <a:prstGeom prst="straightConnector1">
+            <a:avLst/>
+          </a:prstGeom>
+          <a:ln w="63500">
+            <a:tailEnd type="triangle"/>
+          </a:ln>
+        </p:spPr>
+        <p:style>
+          <a:lnRef idx="1">
+            <a:schemeClr val="accent1"/>
+          </a:lnRef>
+          <a:fillRef idx="0">
+            <a:schemeClr val="accent1"/>
+          </a:fillRef>
+          <a:effectRef idx="0">
+            <a:schemeClr val="accent1"/>
+          </a:effectRef>
+          <a:fontRef idx="minor">
+            <a:schemeClr val="tx1"/>
+          </a:fontRef>
+        </p:style>
+      </p:cxnSp>
+      <p:cxnSp>
+        <p:nvCxnSpPr>
+          <p:cNvPr id="66" name="Rechte verbindingslijn met pijl 65">
+            <a:extLst>
+              <a:ext uri="{FF2B5EF4-FFF2-40B4-BE49-F238E27FC236}">
+                <a16:creationId xmlns:a16="http://schemas.microsoft.com/office/drawing/2014/main" id="{73C26EA3-8EE1-4691-9CBC-1CBA028B9316}"/>
+              </a:ext>
+            </a:extLst>
+          </p:cNvPr>
+          <p:cNvCxnSpPr>
+            <a:cxnSpLocks/>
+            <a:stCxn id="16" idx="0"/>
+            <a:endCxn id="3" idx="2"/>
+          </p:cNvCxnSpPr>
+          <p:nvPr/>
+        </p:nvCxnSpPr>
+        <p:spPr>
+          <a:xfrm flipV="1">
+            <a:off x="2728477" y="1310752"/>
+            <a:ext cx="1519869" cy="4236496"/>
+          </a:xfrm>
+          <a:prstGeom prst="straightConnector1">
+            <a:avLst/>
+          </a:prstGeom>
+          <a:ln w="63500">
+            <a:tailEnd type="triangle"/>
+          </a:ln>
+        </p:spPr>
+        <p:style>
+          <a:lnRef idx="1">
+            <a:schemeClr val="accent1"/>
+          </a:lnRef>
+          <a:fillRef idx="0">
+            <a:schemeClr val="accent1"/>
+          </a:fillRef>
+          <a:effectRef idx="0">
+            <a:schemeClr val="accent1"/>
+          </a:effectRef>
+          <a:fontRef idx="minor">
+            <a:schemeClr val="tx1"/>
+          </a:fontRef>
+        </p:style>
+      </p:cxnSp>
+      <p:cxnSp>
+        <p:nvCxnSpPr>
+          <p:cNvPr id="69" name="Rechte verbindingslijn met pijl 68">
+            <a:extLst>
+              <a:ext uri="{FF2B5EF4-FFF2-40B4-BE49-F238E27FC236}">
+                <a16:creationId xmlns:a16="http://schemas.microsoft.com/office/drawing/2014/main" id="{67C14B19-C553-4DE0-BBC8-25A4C0764DB0}"/>
+              </a:ext>
+            </a:extLst>
+          </p:cNvPr>
+          <p:cNvCxnSpPr>
+            <a:cxnSpLocks/>
+            <a:stCxn id="17" idx="0"/>
+            <a:endCxn id="3" idx="2"/>
+          </p:cNvCxnSpPr>
+          <p:nvPr/>
+        </p:nvCxnSpPr>
+        <p:spPr>
+          <a:xfrm flipH="1" flipV="1">
+            <a:off x="4248346" y="1310752"/>
+            <a:ext cx="5263584" cy="3947239"/>
+          </a:xfrm>
+          <a:prstGeom prst="straightConnector1">
+            <a:avLst/>
+          </a:prstGeom>
+          <a:ln w="63500">
+            <a:tailEnd type="triangle"/>
+          </a:ln>
+        </p:spPr>
+        <p:style>
+          <a:lnRef idx="1">
+            <a:schemeClr val="accent1"/>
+          </a:lnRef>
+          <a:fillRef idx="0">
+            <a:schemeClr val="accent1"/>
+          </a:fillRef>
+          <a:effectRef idx="0">
+            <a:schemeClr val="accent1"/>
+          </a:effectRef>
+          <a:fontRef idx="minor">
+            <a:schemeClr val="tx1"/>
+          </a:fontRef>
+        </p:style>
+      </p:cxnSp>
+      <p:sp>
+        <p:nvSpPr>
+          <p:cNvPr id="84" name="Tekstvak 83">
+            <a:extLst>
+              <a:ext uri="{FF2B5EF4-FFF2-40B4-BE49-F238E27FC236}">
+                <a16:creationId xmlns:a16="http://schemas.microsoft.com/office/drawing/2014/main" id="{C3DADC57-9460-4866-9B4C-A102C3CE9564}"/>
+              </a:ext>
+            </a:extLst>
+          </p:cNvPr>
+          <p:cNvSpPr txBox="1"/>
+          <p:nvPr/>
+        </p:nvSpPr>
+        <p:spPr>
+          <a:xfrm>
+            <a:off x="1926387" y="421531"/>
+            <a:ext cx="1115996" cy="646331"/>
+          </a:xfrm>
+          <a:prstGeom prst="rect">
+            <a:avLst/>
+          </a:prstGeom>
+          <a:noFill/>
+        </p:spPr>
+        <p:txBody>
+          <a:bodyPr wrap="square" rtlCol="0">
+            <a:spAutoFit/>
+          </a:bodyPr>
+          <a:lstStyle/>
+          <a:p>
+            <a:r>
+              <a:rPr lang="nl-NL" dirty="0" err="1"/>
+              <a:t>Hidden</a:t>
+            </a:r>
+            <a:endParaRPr lang="nl-NL" dirty="0"/>
+          </a:p>
+          <a:p>
+            <a:r>
+              <a:rPr lang="nl-NL" dirty="0" err="1"/>
+              <a:t>layers</a:t>
+            </a:r>
+            <a:endParaRPr lang="nl-NL" dirty="0"/>
+          </a:p>
+        </p:txBody>
+      </p:sp>
+      <p:sp>
+        <p:nvSpPr>
+          <p:cNvPr id="85" name="Tekstvak 84">
+            <a:extLst>
+              <a:ext uri="{FF2B5EF4-FFF2-40B4-BE49-F238E27FC236}">
+                <a16:creationId xmlns:a16="http://schemas.microsoft.com/office/drawing/2014/main" id="{677E02A1-2E9B-4816-9709-8BB6E6886107}"/>
+              </a:ext>
+            </a:extLst>
+          </p:cNvPr>
+          <p:cNvSpPr txBox="1"/>
+          <p:nvPr/>
+        </p:nvSpPr>
+        <p:spPr>
+          <a:xfrm>
+            <a:off x="917189" y="2435608"/>
+            <a:ext cx="1115996" cy="646331"/>
+          </a:xfrm>
+          <a:prstGeom prst="rect">
+            <a:avLst/>
+          </a:prstGeom>
+          <a:noFill/>
+        </p:spPr>
+        <p:txBody>
+          <a:bodyPr wrap="square" rtlCol="0">
+            <a:spAutoFit/>
+          </a:bodyPr>
+          <a:lstStyle/>
+          <a:p>
+            <a:r>
+              <a:rPr lang="nl-NL" dirty="0"/>
+              <a:t>Output</a:t>
+            </a:r>
+          </a:p>
+          <a:p>
+            <a:r>
+              <a:rPr lang="nl-NL" dirty="0" err="1"/>
+              <a:t>layer</a:t>
+            </a:r>
+            <a:endParaRPr lang="nl-NL" dirty="0"/>
+          </a:p>
+        </p:txBody>
+      </p:sp>
+      <p:sp>
+        <p:nvSpPr>
+          <p:cNvPr id="86" name="Tekstvak 85">
+            <a:extLst>
+              <a:ext uri="{FF2B5EF4-FFF2-40B4-BE49-F238E27FC236}">
+                <a16:creationId xmlns:a16="http://schemas.microsoft.com/office/drawing/2014/main" id="{ED709283-D1AB-4502-9B40-850861D2313C}"/>
+              </a:ext>
+            </a:extLst>
+          </p:cNvPr>
+          <p:cNvSpPr txBox="1"/>
+          <p:nvPr/>
+        </p:nvSpPr>
+        <p:spPr>
+          <a:xfrm>
+            <a:off x="10586940" y="5235981"/>
+            <a:ext cx="1115996" cy="646331"/>
+          </a:xfrm>
+          <a:prstGeom prst="rect">
+            <a:avLst/>
+          </a:prstGeom>
+          <a:noFill/>
+        </p:spPr>
+        <p:txBody>
+          <a:bodyPr wrap="square" rtlCol="0">
+            <a:spAutoFit/>
+          </a:bodyPr>
+          <a:lstStyle/>
+          <a:p>
+            <a:r>
+              <a:rPr lang="nl-NL" dirty="0" err="1"/>
+              <a:t>Hidden</a:t>
+            </a:r>
+            <a:endParaRPr lang="nl-NL" dirty="0"/>
+          </a:p>
+          <a:p>
+            <a:r>
+              <a:rPr lang="nl-NL" dirty="0" err="1"/>
+              <a:t>layers</a:t>
+            </a:r>
+            <a:endParaRPr lang="nl-NL" dirty="0"/>
+          </a:p>
+        </p:txBody>
+      </p:sp>
+      <p:sp>
+        <p:nvSpPr>
+          <p:cNvPr id="87" name="Tekstvak 86">
+            <a:extLst>
+              <a:ext uri="{FF2B5EF4-FFF2-40B4-BE49-F238E27FC236}">
+                <a16:creationId xmlns:a16="http://schemas.microsoft.com/office/drawing/2014/main" id="{DD685F7F-5CCD-4B65-B1BA-1CCA06195FB3}"/>
+              </a:ext>
+            </a:extLst>
+          </p:cNvPr>
+          <p:cNvSpPr txBox="1"/>
+          <p:nvPr/>
+        </p:nvSpPr>
+        <p:spPr>
+          <a:xfrm>
+            <a:off x="1194969" y="4912816"/>
+            <a:ext cx="1115996" cy="646331"/>
+          </a:xfrm>
+          <a:prstGeom prst="rect">
+            <a:avLst/>
+          </a:prstGeom>
+          <a:noFill/>
+        </p:spPr>
+        <p:txBody>
+          <a:bodyPr wrap="square" rtlCol="0">
+            <a:spAutoFit/>
+          </a:bodyPr>
+          <a:lstStyle/>
+          <a:p>
+            <a:r>
+              <a:rPr lang="nl-NL" dirty="0" err="1"/>
+              <a:t>Hidden</a:t>
+            </a:r>
+            <a:endParaRPr lang="nl-NL" dirty="0"/>
+          </a:p>
+          <a:p>
+            <a:r>
+              <a:rPr lang="nl-NL" dirty="0" err="1"/>
+              <a:t>layers</a:t>
+            </a:r>
+            <a:endParaRPr lang="nl-NL" dirty="0"/>
+          </a:p>
+        </p:txBody>
+      </p:sp>
+      <p:sp>
+        <p:nvSpPr>
+          <p:cNvPr id="88" name="Tekstvak 87">
+            <a:extLst>
+              <a:ext uri="{FF2B5EF4-FFF2-40B4-BE49-F238E27FC236}">
+                <a16:creationId xmlns:a16="http://schemas.microsoft.com/office/drawing/2014/main" id="{6ABB1FE1-9A1B-47D4-9D7F-32D5C95FBBD4}"/>
+              </a:ext>
+            </a:extLst>
+          </p:cNvPr>
+          <p:cNvSpPr txBox="1"/>
+          <p:nvPr/>
+        </p:nvSpPr>
+        <p:spPr>
+          <a:xfrm>
+            <a:off x="5912653" y="-78776"/>
+            <a:ext cx="1115996" cy="646331"/>
+          </a:xfrm>
+          <a:prstGeom prst="rect">
+            <a:avLst/>
+          </a:prstGeom>
+          <a:noFill/>
+        </p:spPr>
+        <p:txBody>
+          <a:bodyPr wrap="square" rtlCol="0">
+            <a:spAutoFit/>
+          </a:bodyPr>
+          <a:lstStyle/>
+          <a:p>
+            <a:r>
+              <a:rPr lang="nl-NL" dirty="0"/>
+              <a:t>Input</a:t>
+            </a:r>
+          </a:p>
+          <a:p>
+            <a:r>
+              <a:rPr lang="nl-NL" dirty="0" err="1"/>
+              <a:t>layer</a:t>
+            </a:r>
+            <a:endParaRPr lang="nl-NL" dirty="0"/>
+          </a:p>
+        </p:txBody>
+      </p:sp>
+      <p:sp>
+        <p:nvSpPr>
+          <p:cNvPr id="89" name="Tekstvak 88">
+            <a:extLst>
+              <a:ext uri="{FF2B5EF4-FFF2-40B4-BE49-F238E27FC236}">
+                <a16:creationId xmlns:a16="http://schemas.microsoft.com/office/drawing/2014/main" id="{F2BE6DFE-5115-41F3-9093-A2F833EA3046}"/>
+              </a:ext>
+            </a:extLst>
+          </p:cNvPr>
+          <p:cNvSpPr txBox="1"/>
+          <p:nvPr/>
+        </p:nvSpPr>
+        <p:spPr>
+          <a:xfrm>
+            <a:off x="5607281" y="1695254"/>
+            <a:ext cx="1115996" cy="646331"/>
+          </a:xfrm>
+          <a:prstGeom prst="rect">
+            <a:avLst/>
+          </a:prstGeom>
+          <a:noFill/>
+        </p:spPr>
+        <p:txBody>
+          <a:bodyPr wrap="square" rtlCol="0">
+            <a:spAutoFit/>
+          </a:bodyPr>
+          <a:lstStyle/>
+          <a:p>
+            <a:r>
+              <a:rPr lang="nl-NL" dirty="0"/>
+              <a:t>Input</a:t>
+            </a:r>
+          </a:p>
+          <a:p>
+            <a:r>
+              <a:rPr lang="nl-NL" dirty="0" err="1"/>
+              <a:t>layer</a:t>
+            </a:r>
+            <a:endParaRPr lang="nl-NL" dirty="0"/>
+          </a:p>
+        </p:txBody>
+      </p:sp>
+      <p:sp>
+        <p:nvSpPr>
+          <p:cNvPr id="90" name="Tekstvak 89">
+            <a:extLst>
+              <a:ext uri="{FF2B5EF4-FFF2-40B4-BE49-F238E27FC236}">
+                <a16:creationId xmlns:a16="http://schemas.microsoft.com/office/drawing/2014/main" id="{E6609F7B-1DF2-4B08-A922-23E4DA7A8787}"/>
+              </a:ext>
+            </a:extLst>
+          </p:cNvPr>
+          <p:cNvSpPr txBox="1"/>
+          <p:nvPr/>
+        </p:nvSpPr>
+        <p:spPr>
+          <a:xfrm>
+            <a:off x="5577985" y="3287145"/>
+            <a:ext cx="1115996" cy="646331"/>
+          </a:xfrm>
+          <a:prstGeom prst="rect">
+            <a:avLst/>
+          </a:prstGeom>
+          <a:noFill/>
+        </p:spPr>
+        <p:txBody>
+          <a:bodyPr wrap="square" rtlCol="0">
+            <a:spAutoFit/>
+          </a:bodyPr>
+          <a:lstStyle/>
+          <a:p>
+            <a:r>
+              <a:rPr lang="nl-NL" dirty="0"/>
+              <a:t>Output</a:t>
+            </a:r>
+          </a:p>
+          <a:p>
+            <a:r>
+              <a:rPr lang="nl-NL" dirty="0" err="1"/>
+              <a:t>layer</a:t>
+            </a:r>
+            <a:endParaRPr lang="nl-NL" dirty="0"/>
+          </a:p>
+        </p:txBody>
+      </p:sp>
+      <p:sp>
+        <p:nvSpPr>
+          <p:cNvPr id="91" name="Stroomdiagram: Gegevens 90">
+            <a:extLst>
+              <a:ext uri="{FF2B5EF4-FFF2-40B4-BE49-F238E27FC236}">
+                <a16:creationId xmlns:a16="http://schemas.microsoft.com/office/drawing/2014/main" id="{D76AAF11-9842-4D2F-B0CA-B12D66A2691A}"/>
+              </a:ext>
+            </a:extLst>
+          </p:cNvPr>
+          <p:cNvSpPr/>
+          <p:nvPr/>
+        </p:nvSpPr>
+        <p:spPr>
+          <a:xfrm>
+            <a:off x="3828981" y="2362542"/>
+            <a:ext cx="1907674" cy="1468313"/>
+          </a:xfrm>
+          <a:prstGeom prst="flowChartInputOutput">
+            <a:avLst/>
+          </a:prstGeom>
+          <a:solidFill>
+            <a:schemeClr val="bg1"/>
+          </a:solidFill>
+        </p:spPr>
+        <p:style>
+          <a:lnRef idx="2">
+            <a:schemeClr val="accent1">
+              <a:shade val="50000"/>
+            </a:schemeClr>
+          </a:lnRef>
+          <a:fillRef idx="1">
+            <a:schemeClr val="accent1"/>
+          </a:fillRef>
+          <a:effectRef idx="0">
+            <a:schemeClr val="accent1"/>
+          </a:effectRef>
+          <a:fontRef idx="minor">
+            <a:schemeClr val="lt1"/>
+          </a:fontRef>
+        </p:style>
+        <p:txBody>
+          <a:bodyPr rtlCol="0" anchor="ctr"/>
+          <a:lstStyle/>
+          <a:p>
+            <a:pPr algn="ctr"/>
+            <a:r>
+              <a:rPr lang="nl-NL" dirty="0">
+                <a:solidFill>
+                  <a:schemeClr val="tx1"/>
+                </a:solidFill>
+              </a:rPr>
+              <a:t>Stuurhoek</a:t>
+            </a:r>
+          </a:p>
+          <a:p>
+            <a:pPr algn="ctr"/>
+            <a:r>
+              <a:rPr lang="nl-NL" dirty="0">
+                <a:solidFill>
+                  <a:schemeClr val="tx1"/>
+                </a:solidFill>
+              </a:rPr>
+              <a:t>Uit training</a:t>
             </a:r>
           </a:p>
         </p:txBody>
@@ -7542,7 +8531,7 @@
     </p:spTree>
     <p:extLst>
       <p:ext uri="{BB962C8B-B14F-4D97-AF65-F5344CB8AC3E}">
-        <p14:creationId xmlns:p14="http://schemas.microsoft.com/office/powerpoint/2010/main" val="3495559347"/>
+        <p14:creationId xmlns:p14="http://schemas.microsoft.com/office/powerpoint/2010/main" val="3061699450"/>
       </p:ext>
     </p:extLst>
   </p:cSld>
@@ -7571,176 +8560,28 @@
       </p:grpSpPr>
       <p:sp>
         <p:nvSpPr>
-          <p:cNvPr id="3" name="Tekstvak 2">
-            <a:extLst>
-              <a:ext uri="{FF2B5EF4-FFF2-40B4-BE49-F238E27FC236}">
-                <a16:creationId xmlns:a16="http://schemas.microsoft.com/office/drawing/2014/main" id="{8FDFFC97-85F7-4435-8EC8-8F2CAC29E79B}"/>
-              </a:ext>
-            </a:extLst>
-          </p:cNvPr>
-          <p:cNvSpPr txBox="1"/>
-          <p:nvPr/>
-        </p:nvSpPr>
-        <p:spPr>
-          <a:xfrm>
-            <a:off x="3048802" y="2692742"/>
-            <a:ext cx="6097604" cy="1477328"/>
-          </a:xfrm>
-          <a:prstGeom prst="rect">
-            <a:avLst/>
-          </a:prstGeom>
-          <a:noFill/>
-        </p:spPr>
-        <p:txBody>
-          <a:bodyPr wrap="square">
-            <a:spAutoFit/>
-          </a:bodyPr>
-          <a:lstStyle/>
-          <a:p>
-            <a:pPr marL="342900" lvl="0" indent="-342900">
-              <a:buFont typeface="Symbol" panose="05050102010706020507" pitchFamily="18" charset="2"/>
-              <a:buChar char="-"/>
-            </a:pPr>
-            <a:r>
-              <a:rPr lang="nl-NL" sz="1800" dirty="0">
-                <a:effectLst/>
-                <a:latin typeface="Calibri" panose="020F0502020204030204" pitchFamily="34" charset="0"/>
-                <a:ea typeface="Calibri" panose="020F0502020204030204" pitchFamily="34" charset="0"/>
-                <a:cs typeface="Calibri" panose="020F0502020204030204" pitchFamily="34" charset="0"/>
-              </a:rPr>
-              <a:t>Aanmaken </a:t>
-            </a:r>
-            <a:r>
-              <a:rPr lang="nl-NL" sz="1800" dirty="0" err="1">
-                <a:effectLst/>
-                <a:latin typeface="Calibri" panose="020F0502020204030204" pitchFamily="34" charset="0"/>
-                <a:ea typeface="Calibri" panose="020F0502020204030204" pitchFamily="34" charset="0"/>
-                <a:cs typeface="Calibri" panose="020F0502020204030204" pitchFamily="34" charset="0"/>
-              </a:rPr>
-              <a:t>trainingsset</a:t>
-            </a:r>
-            <a:endParaRPr lang="nl-NL" sz="1800" dirty="0">
-              <a:effectLst/>
-              <a:latin typeface="Calibri" panose="020F0502020204030204" pitchFamily="34" charset="0"/>
-              <a:ea typeface="Calibri" panose="020F0502020204030204" pitchFamily="34" charset="0"/>
-              <a:cs typeface="Calibri" panose="020F0502020204030204" pitchFamily="34" charset="0"/>
-            </a:endParaRPr>
-          </a:p>
-          <a:p>
-            <a:pPr marL="342900" lvl="0" indent="-342900">
-              <a:buFont typeface="Symbol" panose="05050102010706020507" pitchFamily="18" charset="2"/>
-              <a:buChar char="-"/>
-            </a:pPr>
-            <a:r>
-              <a:rPr lang="nl-NL" sz="1800" dirty="0">
-                <a:effectLst/>
-                <a:latin typeface="Calibri" panose="020F0502020204030204" pitchFamily="34" charset="0"/>
-                <a:ea typeface="Calibri" panose="020F0502020204030204" pitchFamily="34" charset="0"/>
-                <a:cs typeface="Calibri" panose="020F0502020204030204" pitchFamily="34" charset="0"/>
-              </a:rPr>
-              <a:t>Bouwen topologie netwerk, (</a:t>
-            </a:r>
-            <a:r>
-              <a:rPr lang="nl-NL" sz="1800" dirty="0" err="1">
-                <a:effectLst/>
-                <a:latin typeface="Calibri" panose="020F0502020204030204" pitchFamily="34" charset="0"/>
-                <a:ea typeface="Calibri" panose="020F0502020204030204" pitchFamily="34" charset="0"/>
-                <a:cs typeface="Calibri" panose="020F0502020204030204" pitchFamily="34" charset="0"/>
-              </a:rPr>
-              <a:t>layers</a:t>
-            </a:r>
-            <a:r>
-              <a:rPr lang="nl-NL" sz="1800" dirty="0">
-                <a:effectLst/>
-                <a:latin typeface="Calibri" panose="020F0502020204030204" pitchFamily="34" charset="0"/>
-                <a:ea typeface="Calibri" panose="020F0502020204030204" pitchFamily="34" charset="0"/>
-                <a:cs typeface="Calibri" panose="020F0502020204030204" pitchFamily="34" charset="0"/>
-              </a:rPr>
-              <a:t>, </a:t>
-            </a:r>
-            <a:r>
-              <a:rPr lang="nl-NL" sz="1800" dirty="0" err="1">
-                <a:effectLst/>
-                <a:latin typeface="Calibri" panose="020F0502020204030204" pitchFamily="34" charset="0"/>
-                <a:ea typeface="Calibri" panose="020F0502020204030204" pitchFamily="34" charset="0"/>
-                <a:cs typeface="Calibri" panose="020F0502020204030204" pitchFamily="34" charset="0"/>
-              </a:rPr>
-              <a:t>nodes</a:t>
-            </a:r>
-            <a:r>
-              <a:rPr lang="nl-NL" sz="1800" dirty="0">
-                <a:effectLst/>
-                <a:latin typeface="Calibri" panose="020F0502020204030204" pitchFamily="34" charset="0"/>
-                <a:ea typeface="Calibri" panose="020F0502020204030204" pitchFamily="34" charset="0"/>
-                <a:cs typeface="Calibri" panose="020F0502020204030204" pitchFamily="34" charset="0"/>
-              </a:rPr>
-              <a:t>, links )</a:t>
-            </a:r>
-          </a:p>
-          <a:p>
-            <a:pPr marL="342900" lvl="0" indent="-342900">
-              <a:buFont typeface="Symbol" panose="05050102010706020507" pitchFamily="18" charset="2"/>
-              <a:buChar char="-"/>
-            </a:pPr>
-            <a:r>
-              <a:rPr lang="nl-NL" sz="1800" dirty="0">
-                <a:effectLst/>
-                <a:latin typeface="Calibri" panose="020F0502020204030204" pitchFamily="34" charset="0"/>
-                <a:ea typeface="Calibri" panose="020F0502020204030204" pitchFamily="34" charset="0"/>
-                <a:cs typeface="Calibri" panose="020F0502020204030204" pitchFamily="34" charset="0"/>
-              </a:rPr>
-              <a:t>Preprocessing input data (sonar en </a:t>
-            </a:r>
-            <a:r>
-              <a:rPr lang="nl-NL" sz="1800" dirty="0" err="1">
-                <a:effectLst/>
-                <a:latin typeface="Calibri" panose="020F0502020204030204" pitchFamily="34" charset="0"/>
-                <a:ea typeface="Calibri" panose="020F0502020204030204" pitchFamily="34" charset="0"/>
-                <a:cs typeface="Calibri" panose="020F0502020204030204" pitchFamily="34" charset="0"/>
-              </a:rPr>
-              <a:t>lidar</a:t>
-            </a:r>
-            <a:r>
-              <a:rPr lang="nl-NL" sz="1800" dirty="0">
-                <a:effectLst/>
-                <a:latin typeface="Calibri" panose="020F0502020204030204" pitchFamily="34" charset="0"/>
-                <a:ea typeface="Calibri" panose="020F0502020204030204" pitchFamily="34" charset="0"/>
-                <a:cs typeface="Calibri" panose="020F0502020204030204" pitchFamily="34" charset="0"/>
-              </a:rPr>
-              <a:t> data)</a:t>
-            </a:r>
-          </a:p>
-          <a:p>
-            <a:pPr marL="342900" lvl="0" indent="-342900">
-              <a:buFont typeface="Symbol" panose="05050102010706020507" pitchFamily="18" charset="2"/>
-              <a:buChar char="-"/>
-            </a:pPr>
-            <a:r>
-              <a:rPr lang="nl-NL" sz="1800" dirty="0">
-                <a:effectLst/>
-                <a:latin typeface="Calibri" panose="020F0502020204030204" pitchFamily="34" charset="0"/>
-                <a:ea typeface="Calibri" panose="020F0502020204030204" pitchFamily="34" charset="0"/>
-                <a:cs typeface="Calibri" panose="020F0502020204030204" pitchFamily="34" charset="0"/>
-              </a:rPr>
-              <a:t>Trainen model van het model </a:t>
-            </a:r>
-          </a:p>
-          <a:p>
-            <a:pPr marL="342900" lvl="0" indent="-342900">
-              <a:spcAft>
-                <a:spcPts val="800"/>
-              </a:spcAft>
-              <a:buFont typeface="Symbol" panose="05050102010706020507" pitchFamily="18" charset="2"/>
-              <a:buChar char="-"/>
-            </a:pPr>
-            <a:r>
-              <a:rPr lang="nl-NL" sz="1800" dirty="0">
-                <a:effectLst/>
-                <a:latin typeface="Calibri" panose="020F0502020204030204" pitchFamily="34" charset="0"/>
-                <a:ea typeface="Calibri" panose="020F0502020204030204" pitchFamily="34" charset="0"/>
-                <a:cs typeface="Calibri" panose="020F0502020204030204" pitchFamily="34" charset="0"/>
-              </a:rPr>
-              <a:t>Validatie van het model </a:t>
+          <p:cNvPr id="2" name="Titel 1">
+            <a:extLst>
+              <a:ext uri="{FF2B5EF4-FFF2-40B4-BE49-F238E27FC236}">
+                <a16:creationId xmlns:a16="http://schemas.microsoft.com/office/drawing/2014/main" id="{09BEC858-D036-491F-9FC1-885F82BBD4B0}"/>
+              </a:ext>
+            </a:extLst>
+          </p:cNvPr>
+          <p:cNvSpPr>
+            <a:spLocks noGrp="1"/>
+          </p:cNvSpPr>
+          <p:nvPr>
+            <p:ph type="title"/>
+          </p:nvPr>
+        </p:nvSpPr>
+        <p:spPr/>
+        <p:txBody>
+          <a:bodyPr/>
+          <a:lstStyle/>
+          <a:p>
+            <a:r>
+              <a:rPr lang="nl-NL" dirty="0"/>
+              <a:t>The Black Box</a:t>
             </a:r>
           </a:p>
         </p:txBody>
@@ -7748,7 +8589,7 @@
     </p:spTree>
     <p:extLst>
       <p:ext uri="{BB962C8B-B14F-4D97-AF65-F5344CB8AC3E}">
-        <p14:creationId xmlns:p14="http://schemas.microsoft.com/office/powerpoint/2010/main" val="3047693261"/>
+        <p14:creationId xmlns:p14="http://schemas.microsoft.com/office/powerpoint/2010/main" val="3495559347"/>
       </p:ext>
     </p:extLst>
   </p:cSld>

</xml_diff>

<commit_message>
project 1 afronding 221007
</commit_message>
<xml_diff>
--- a/simpylc/presentatie project 1/Presentatie project 1.pptx
+++ b/simpylc/presentatie project 1/Presentatie project 1.pptx
@@ -6940,12 +6940,8 @@
           <a:lstStyle/>
           <a:p>
             <a:r>
-              <a:rPr lang="nl-NL" sz="2200" dirty="0" err="1"/>
-              <a:t>Inprogrammerenaansturing</a:t>
-            </a:r>
-            <a:r>
               <a:rPr lang="nl-NL" sz="2200" dirty="0"/>
-              <a:t> auto</a:t>
+              <a:t>Inprogrammeren aansturing auto</a:t>
             </a:r>
           </a:p>
         </p:txBody>
@@ -6964,7 +6960,7 @@
         </p:nvSpPr>
         <p:spPr>
           <a:xfrm>
-            <a:off x="1793744" y="4521738"/>
+            <a:off x="1814064" y="4592858"/>
             <a:ext cx="1681139" cy="430887"/>
           </a:xfrm>
           <a:prstGeom prst="rect">
@@ -7004,7 +7000,7 @@
         </p:nvSpPr>
         <p:spPr>
           <a:xfrm>
-            <a:off x="2697480" y="2358376"/>
+            <a:off x="2697480" y="2195816"/>
             <a:ext cx="2046348" cy="769441"/>
           </a:xfrm>
           <a:prstGeom prst="rect">
@@ -7090,7 +7086,7 @@
         </p:nvSpPr>
         <p:spPr>
           <a:xfrm>
-            <a:off x="1987953" y="3900134"/>
+            <a:off x="1987953" y="4022054"/>
             <a:ext cx="2934270" cy="430887"/>
           </a:xfrm>
           <a:prstGeom prst="rect">

</xml_diff>